<commit_message>
Additional lectures on Ray and post class cleanup
</commit_message>
<xml_diff>
--- a/lectures/120_dockerize_python_app/Docker – an introduction.pptx
+++ b/lectures/120_dockerize_python_app/Docker – an introduction.pptx
@@ -124,7 +124,7 @@
 <file path=ppt/revisionInfo.xml><?xml version="1.0" encoding="utf-8"?>
 <p1510:revInfo xmlns:a="http://schemas.openxmlformats.org/drawingml/2006/main" xmlns:r="http://schemas.openxmlformats.org/officeDocument/2006/relationships" xmlns:p1510="http://schemas.microsoft.com/office/powerpoint/2015/10/main">
   <p1510:revLst>
-    <p1510:client id="{A8AD3515-4619-434F-814F-FFB8E0C707FB}" v="26" dt="2025-02-18T02:14:55.270"/>
+    <p1510:client id="{A8AD3515-4619-434F-814F-FFB8E0C707FB}" v="28" dt="2025-02-19T03:01:47.562"/>
   </p1510:revLst>
 </p1510:revInfo>
 </file>
@@ -134,7 +134,7 @@
   <pc:docChgLst>
     <pc:chgData name="Shahbaz Chaudhary" userId="fef21e47db54da50" providerId="LiveId" clId="{A8AD3515-4619-434F-814F-FFB8E0C707FB}"/>
     <pc:docChg chg="undo custSel addSld modSld sldOrd">
-      <pc:chgData name="Shahbaz Chaudhary" userId="fef21e47db54da50" providerId="LiveId" clId="{A8AD3515-4619-434F-814F-FFB8E0C707FB}" dt="2025-02-18T02:25:53.411" v="2931" actId="20577"/>
+      <pc:chgData name="Shahbaz Chaudhary" userId="fef21e47db54da50" providerId="LiveId" clId="{A8AD3515-4619-434F-814F-FFB8E0C707FB}" dt="2025-02-19T03:01:54.468" v="3067" actId="20577"/>
       <pc:docMkLst>
         <pc:docMk/>
       </pc:docMkLst>
@@ -170,7 +170,7 @@
         </pc:picChg>
       </pc:sldChg>
       <pc:sldChg chg="addSp delSp modSp new mod">
-        <pc:chgData name="Shahbaz Chaudhary" userId="fef21e47db54da50" providerId="LiveId" clId="{A8AD3515-4619-434F-814F-FFB8E0C707FB}" dt="2025-02-18T01:44:30.405" v="1013" actId="1037"/>
+        <pc:chgData name="Shahbaz Chaudhary" userId="fef21e47db54da50" providerId="LiveId" clId="{A8AD3515-4619-434F-814F-FFB8E0C707FB}" dt="2025-02-19T02:23:27.484" v="3038" actId="114"/>
         <pc:sldMkLst>
           <pc:docMk/>
           <pc:sldMk cId="1585039382" sldId="260"/>
@@ -200,7 +200,7 @@
           </ac:spMkLst>
         </pc:spChg>
         <pc:spChg chg="add mod">
-          <ac:chgData name="Shahbaz Chaudhary" userId="fef21e47db54da50" providerId="LiveId" clId="{A8AD3515-4619-434F-814F-FFB8E0C707FB}" dt="2025-02-18T01:44:30.405" v="1013" actId="1037"/>
+          <ac:chgData name="Shahbaz Chaudhary" userId="fef21e47db54da50" providerId="LiveId" clId="{A8AD3515-4619-434F-814F-FFB8E0C707FB}" dt="2025-02-19T02:23:27.484" v="3038" actId="114"/>
           <ac:spMkLst>
             <pc:docMk/>
             <pc:sldMk cId="1585039382" sldId="260"/>
@@ -256,7 +256,7 @@
         </pc:graphicFrameChg>
       </pc:sldChg>
       <pc:sldChg chg="addSp delSp modSp add mod">
-        <pc:chgData name="Shahbaz Chaudhary" userId="fef21e47db54da50" providerId="LiveId" clId="{A8AD3515-4619-434F-814F-FFB8E0C707FB}" dt="2025-02-18T01:54:50.821" v="1477" actId="1076"/>
+        <pc:chgData name="Shahbaz Chaudhary" userId="fef21e47db54da50" providerId="LiveId" clId="{A8AD3515-4619-434F-814F-FFB8E0C707FB}" dt="2025-02-19T03:01:54.468" v="3067" actId="20577"/>
         <pc:sldMkLst>
           <pc:docMk/>
           <pc:sldMk cId="1340917377" sldId="262"/>
@@ -294,7 +294,7 @@
           </ac:spMkLst>
         </pc:spChg>
         <pc:graphicFrameChg chg="mod modGraphic">
-          <ac:chgData name="Shahbaz Chaudhary" userId="fef21e47db54da50" providerId="LiveId" clId="{A8AD3515-4619-434F-814F-FFB8E0C707FB}" dt="2025-02-18T01:54:50.821" v="1477" actId="1076"/>
+          <ac:chgData name="Shahbaz Chaudhary" userId="fef21e47db54da50" providerId="LiveId" clId="{A8AD3515-4619-434F-814F-FFB8E0C707FB}" dt="2025-02-19T03:01:54.468" v="3067" actId="20577"/>
           <ac:graphicFrameMkLst>
             <pc:docMk/>
             <pc:sldMk cId="1340917377" sldId="262"/>
@@ -5995,7 +5995,15 @@
           <a:p>
             <a:r>
               <a:rPr lang="en-US" sz="2400" dirty="0"/>
-              <a:t>search | pull | list | build | remove</a:t>
+              <a:t>search | pull | </a:t>
+            </a:r>
+            <a:r>
+              <a:rPr lang="en-US" sz="2400" i="1" dirty="0"/>
+              <a:t>list</a:t>
+            </a:r>
+            <a:r>
+              <a:rPr lang="en-US" sz="2400" dirty="0"/>
+              <a:t> | build | remove</a:t>
             </a:r>
           </a:p>
         </p:txBody>
@@ -6712,14 +6720,14 @@
           <p:nvPr>
             <p:extLst>
               <p:ext uri="{D42A27DB-BD31-4B8C-83A1-F6EECF244321}">
-                <p14:modId xmlns:p14="http://schemas.microsoft.com/office/powerpoint/2010/main" val="519839496"/>
+                <p14:modId xmlns:p14="http://schemas.microsoft.com/office/powerpoint/2010/main" val="2448634754"/>
               </p:ext>
             </p:extLst>
           </p:nvPr>
         </p:nvGraphicFramePr>
         <p:xfrm>
-          <a:off x="699128" y="2633133"/>
-          <a:ext cx="10783148" cy="2194560"/>
+          <a:off x="699128" y="2532155"/>
+          <a:ext cx="10783148" cy="2987040"/>
         </p:xfrm>
         <a:graphic>
           <a:graphicData uri="http://schemas.openxmlformats.org/drawingml/2006/table">
@@ -6728,14 +6736,14 @@
                 <a:tableStyleId>{2D5ABB26-0587-4C30-8999-92F81FD0307C}</a:tableStyleId>
               </a:tblPr>
               <a:tblGrid>
-                <a:gridCol w="3556001">
+                <a:gridCol w="3070668">
                   <a:extLst>
                     <a:ext uri="{9D8B030D-6E8A-4147-A177-3AD203B41FA5}">
                       <a16:colId xmlns:a16="http://schemas.microsoft.com/office/drawing/2014/main" val="2599361820"/>
                     </a:ext>
                   </a:extLst>
                 </a:gridCol>
-                <a:gridCol w="7227147">
+                <a:gridCol w="7712480">
                   <a:extLst>
                     <a:ext uri="{9D8B030D-6E8A-4147-A177-3AD203B41FA5}">
                       <a16:colId xmlns:a16="http://schemas.microsoft.com/office/drawing/2014/main" val="1277741448"/>
@@ -7118,6 +7126,97 @@
                     <a:lstStyle/>
                     <a:p>
                       <a:pPr algn="r"/>
+                      <a:endParaRPr lang="en-US" sz="2000" dirty="0"/>
+                    </a:p>
+                  </a:txBody>
+                  <a:tcPr/>
+                </a:tc>
+                <a:tc>
+                  <a:txBody>
+                    <a:bodyPr/>
+                    <a:lstStyle/>
+                    <a:p>
+                      <a:pPr marL="0" marR="0" lvl="0" indent="0" algn="l" defTabSz="457200" rtl="0" eaLnBrk="1" fontAlgn="auto" latinLnBrk="0" hangingPunct="1">
+                        <a:lnSpc>
+                          <a:spcPct val="100000"/>
+                        </a:lnSpc>
+                        <a:spcBef>
+                          <a:spcPts val="0"/>
+                        </a:spcBef>
+                        <a:spcAft>
+                          <a:spcPts val="0"/>
+                        </a:spcAft>
+                        <a:buClrTx/>
+                        <a:buSzTx/>
+                        <a:buFontTx/>
+                        <a:buNone/>
+                        <a:tabLst/>
+                        <a:defRPr/>
+                      </a:pPr>
+                      <a:r>
+                        <a:rPr lang="en-US" sz="2000" b="0" dirty="0">
+                          <a:solidFill>
+                            <a:srgbClr val="679C00"/>
+                          </a:solidFill>
+                          <a:effectLst/>
+                          <a:latin typeface="Consolas" panose="020B0609020204030204" pitchFamily="49" charset="0"/>
+                        </a:rPr>
+                        <a:t>docker</a:t>
+                      </a:r>
+                      <a:r>
+                        <a:rPr lang="en-US" sz="2000" b="0" dirty="0">
+                          <a:solidFill>
+                            <a:srgbClr val="998F2F"/>
+                          </a:solidFill>
+                          <a:effectLst/>
+                          <a:latin typeface="Consolas" panose="020B0609020204030204" pitchFamily="49" charset="0"/>
+                        </a:rPr>
+                        <a:t> run –d –restart </a:t>
+                      </a:r>
+                      <a:r>
+                        <a:rPr lang="en-US" sz="2000" b="0" dirty="0" err="1">
+                          <a:solidFill>
+                            <a:srgbClr val="998F2F"/>
+                          </a:solidFill>
+                          <a:effectLst/>
+                          <a:latin typeface="Consolas" panose="020B0609020204030204" pitchFamily="49" charset="0"/>
+                        </a:rPr>
+                        <a:t>always|unless-stopped</a:t>
+                      </a:r>
+                      <a:r>
+                        <a:rPr lang="en-US" sz="2000" b="0" dirty="0">
+                          <a:solidFill>
+                            <a:srgbClr val="998F2F"/>
+                          </a:solidFill>
+                          <a:effectLst/>
+                          <a:latin typeface="Consolas" panose="020B0609020204030204" pitchFamily="49" charset="0"/>
+                        </a:rPr>
+                        <a:t>|.. …</a:t>
+                      </a:r>
+                      <a:endParaRPr lang="de-DE" sz="2000" b="0" dirty="0">
+                        <a:solidFill>
+                          <a:srgbClr val="333333"/>
+                        </a:solidFill>
+                        <a:effectLst/>
+                        <a:latin typeface="Consolas" panose="020B0609020204030204" pitchFamily="49" charset="0"/>
+                      </a:endParaRPr>
+                    </a:p>
+                  </a:txBody>
+                  <a:tcPr/>
+                </a:tc>
+                <a:extLst>
+                  <a:ext uri="{0D108BD9-81ED-4DB2-BD59-A6C34878D82A}">
+                    <a16:rowId xmlns:a16="http://schemas.microsoft.com/office/drawing/2014/main" val="3666959407"/>
+                  </a:ext>
+                </a:extLst>
+              </a:tr>
+              <a:tr h="370840">
+                <a:tc>
+                  <a:txBody>
+                    <a:bodyPr/>
+                    <a:lstStyle/>
+                    <a:p>
+                      <a:pPr algn="r"/>
                       <a:r>
                         <a:rPr lang="en-US" sz="2000" dirty="0"/>
                         <a:t>Start or stop a container</a:t>
@@ -7386,6 +7485,169 @@
                 <a:extLst>
                   <a:ext uri="{0D108BD9-81ED-4DB2-BD59-A6C34878D82A}">
                     <a16:rowId xmlns:a16="http://schemas.microsoft.com/office/drawing/2014/main" val="568291072"/>
+                  </a:ext>
+                </a:extLst>
+              </a:tr>
+              <a:tr h="370840">
+                <a:tc>
+                  <a:txBody>
+                    <a:bodyPr/>
+                    <a:lstStyle/>
+                    <a:p>
+                      <a:pPr algn="r"/>
+                      <a:r>
+                        <a:rPr lang="en-US" sz="2000" dirty="0"/>
+                        <a:t>“ssh” into </a:t>
+                      </a:r>
+                      <a:r>
+                        <a:rPr lang="en-US" sz="2000"/>
+                        <a:t>the container</a:t>
+                      </a:r>
+                      <a:endParaRPr lang="en-US" sz="2000" dirty="0"/>
+                    </a:p>
+                  </a:txBody>
+                  <a:tcPr/>
+                </a:tc>
+                <a:tc>
+                  <a:txBody>
+                    <a:bodyPr/>
+                    <a:lstStyle/>
+                    <a:p>
+                      <a:pPr marL="0" marR="0" lvl="0" indent="0" algn="l" defTabSz="457200" rtl="0" eaLnBrk="1" fontAlgn="auto" latinLnBrk="0" hangingPunct="1">
+                        <a:lnSpc>
+                          <a:spcPct val="100000"/>
+                        </a:lnSpc>
+                        <a:spcBef>
+                          <a:spcPts val="0"/>
+                        </a:spcBef>
+                        <a:spcAft>
+                          <a:spcPts val="0"/>
+                        </a:spcAft>
+                        <a:buClrTx/>
+                        <a:buSzTx/>
+                        <a:buFontTx/>
+                        <a:buNone/>
+                        <a:tabLst/>
+                        <a:defRPr/>
+                      </a:pPr>
+                      <a:r>
+                        <a:rPr lang="en-US" sz="2000" b="0" dirty="0">
+                          <a:solidFill>
+                            <a:srgbClr val="679C00"/>
+                          </a:solidFill>
+                          <a:effectLst/>
+                          <a:latin typeface="Consolas" panose="020B0609020204030204" pitchFamily="49" charset="0"/>
+                        </a:rPr>
+                        <a:t>docker</a:t>
+                      </a:r>
+                      <a:r>
+                        <a:rPr lang="en-US" sz="2000" b="0" dirty="0">
+                          <a:solidFill>
+                            <a:srgbClr val="333333"/>
+                          </a:solidFill>
+                          <a:effectLst/>
+                          <a:latin typeface="Consolas" panose="020B0609020204030204" pitchFamily="49" charset="0"/>
+                        </a:rPr>
+                        <a:t> </a:t>
+                      </a:r>
+                      <a:r>
+                        <a:rPr lang="en-US" sz="2000" b="0" dirty="0">
+                          <a:solidFill>
+                            <a:srgbClr val="998F2F"/>
+                          </a:solidFill>
+                          <a:effectLst/>
+                          <a:latin typeface="Consolas" panose="020B0609020204030204" pitchFamily="49" charset="0"/>
+                        </a:rPr>
+                        <a:t>exec</a:t>
+                      </a:r>
+                      <a:r>
+                        <a:rPr lang="en-US" sz="2000" b="0" dirty="0">
+                          <a:solidFill>
+                            <a:srgbClr val="333333"/>
+                          </a:solidFill>
+                          <a:effectLst/>
+                          <a:latin typeface="Consolas" panose="020B0609020204030204" pitchFamily="49" charset="0"/>
+                        </a:rPr>
+                        <a:t> </a:t>
+                      </a:r>
+                      <a:r>
+                        <a:rPr lang="en-US" sz="2000" b="0" dirty="0">
+                          <a:solidFill>
+                            <a:srgbClr val="684D99"/>
+                          </a:solidFill>
+                          <a:effectLst/>
+                          <a:latin typeface="Consolas" panose="020B0609020204030204" pitchFamily="49" charset="0"/>
+                        </a:rPr>
+                        <a:t>-it</a:t>
+                      </a:r>
+                      <a:r>
+                        <a:rPr lang="en-US" sz="2000" b="0" dirty="0">
+                          <a:solidFill>
+                            <a:srgbClr val="333333"/>
+                          </a:solidFill>
+                          <a:effectLst/>
+                          <a:latin typeface="Consolas" panose="020B0609020204030204" pitchFamily="49" charset="0"/>
+                        </a:rPr>
+                        <a:t> </a:t>
+                      </a:r>
+                      <a:r>
+                        <a:rPr lang="en-US" sz="2000" b="0" dirty="0">
+                          <a:solidFill>
+                            <a:srgbClr val="F9005A"/>
+                          </a:solidFill>
+                          <a:effectLst/>
+                          <a:latin typeface="Consolas" panose="020B0609020204030204" pitchFamily="49" charset="0"/>
+                        </a:rPr>
+                        <a:t>&lt;</a:t>
+                      </a:r>
+                      <a:r>
+                        <a:rPr lang="en-US" sz="2000" b="0" dirty="0" err="1">
+                          <a:solidFill>
+                            <a:srgbClr val="998F2F"/>
+                          </a:solidFill>
+                          <a:effectLst/>
+                          <a:latin typeface="Consolas" panose="020B0609020204030204" pitchFamily="49" charset="0"/>
+                        </a:rPr>
+                        <a:t>container_name</a:t>
+                      </a:r>
+                      <a:r>
+                        <a:rPr lang="en-US" sz="2000" b="0" dirty="0">
+                          <a:solidFill>
+                            <a:srgbClr val="F9005A"/>
+                          </a:solidFill>
+                          <a:effectLst/>
+                          <a:latin typeface="Consolas" panose="020B0609020204030204" pitchFamily="49" charset="0"/>
+                        </a:rPr>
+                        <a:t>&gt;</a:t>
+                      </a:r>
+                      <a:r>
+                        <a:rPr lang="en-US" sz="2000" b="0" dirty="0">
+                          <a:solidFill>
+                            <a:srgbClr val="333333"/>
+                          </a:solidFill>
+                          <a:effectLst/>
+                          <a:latin typeface="Consolas" panose="020B0609020204030204" pitchFamily="49" charset="0"/>
+                        </a:rPr>
+                        <a:t> </a:t>
+                      </a:r>
+                      <a:r>
+                        <a:rPr lang="en-US" sz="2000" b="0" dirty="0" err="1">
+                          <a:solidFill>
+                            <a:srgbClr val="998F2F"/>
+                          </a:solidFill>
+                          <a:effectLst/>
+                          <a:latin typeface="Consolas" panose="020B0609020204030204" pitchFamily="49" charset="0"/>
+                        </a:rPr>
+                        <a:t>sh</a:t>
+                      </a:r>
+                      <a:endParaRPr lang="en-US" sz="2000" dirty="0"/>
+                    </a:p>
+                  </a:txBody>
+                  <a:tcPr/>
+                </a:tc>
+                <a:extLst>
+                  <a:ext uri="{0D108BD9-81ED-4DB2-BD59-A6C34878D82A}">
+                    <a16:rowId xmlns:a16="http://schemas.microsoft.com/office/drawing/2014/main" val="3679444656"/>
                   </a:ext>
                 </a:extLst>
               </a:tr>
@@ -10627,15 +10889,6 @@
 </file>
 
 <file path=customXml/item1.xml><?xml version="1.0" encoding="utf-8"?>
-<?mso-contentType ?>
-<FormTemplates xmlns="http://schemas.microsoft.com/sharepoint/v3/contenttype/forms">
-  <Display>DocumentLibraryForm</Display>
-  <Edit>DocumentLibraryForm</Edit>
-  <New>DocumentLibraryForm</New>
-</FormTemplates>
-</file>
-
-<file path=customXml/item2.xml><?xml version="1.0" encoding="utf-8"?>
 <ct:contentTypeSchema xmlns:ct="http://schemas.microsoft.com/office/2006/metadata/contentType" xmlns:ma="http://schemas.microsoft.com/office/2006/metadata/properties/metaAttributes" ct:_="" ma:_="" ma:contentTypeName="Document" ma:contentTypeID="0x01010079F111ED35F8CC479449609E8A0923A6" ma:contentTypeVersion="12" ma:contentTypeDescription="Create a new document." ma:contentTypeScope="" ma:versionID="a410dd7f93c95333ffa1b60ed6adedd1">
   <xsd:schema xmlns:xsd="http://www.w3.org/2001/XMLSchema" xmlns:xs="http://www.w3.org/2001/XMLSchema" xmlns:p="http://schemas.microsoft.com/office/2006/metadata/properties" xmlns:ns2="71af3243-3dd4-4a8d-8c0d-dd76da1f02a5" xmlns:ns3="16c05727-aa75-4e4a-9b5f-8a80a1165891" targetNamespace="http://schemas.microsoft.com/office/2006/metadata/properties" ma:root="true" ma:fieldsID="a936d9baba76aa3866493feff160faab" ns2:_="" ns3:_="">
     <xsd:import namespace="71af3243-3dd4-4a8d-8c0d-dd76da1f02a5"/>
@@ -10856,6 +11109,15 @@
 </ct:contentTypeSchema>
 </file>
 
+<file path=customXml/item2.xml><?xml version="1.0" encoding="utf-8"?>
+<?mso-contentType ?>
+<FormTemplates xmlns="http://schemas.microsoft.com/sharepoint/v3/contenttype/forms">
+  <Display>DocumentLibraryForm</Display>
+  <Edit>DocumentLibraryForm</Edit>
+  <New>DocumentLibraryForm</New>
+</FormTemplates>
+</file>
+
 <file path=customXml/item3.xml><?xml version="1.0" encoding="utf-8"?>
 <p:properties xmlns:p="http://schemas.microsoft.com/office/2006/metadata/properties" xmlns:xsi="http://www.w3.org/2001/XMLSchema-instance" xmlns:pc="http://schemas.microsoft.com/office/infopath/2007/PartnerControls">
   <documentManagement>
@@ -10866,14 +11128,6 @@
 </file>
 
 <file path=customXml/itemProps1.xml><?xml version="1.0" encoding="utf-8"?>
-<ds:datastoreItem xmlns:ds="http://schemas.openxmlformats.org/officeDocument/2006/customXml" ds:itemID="{927BD4C1-B6B1-4715-ABF9-E660A51A4EA0}">
-  <ds:schemaRefs>
-    <ds:schemaRef ds:uri="http://schemas.microsoft.com/sharepoint/v3/contenttype/forms"/>
-  </ds:schemaRefs>
-</ds:datastoreItem>
-</file>
-
-<file path=customXml/itemProps2.xml><?xml version="1.0" encoding="utf-8"?>
 <ds:datastoreItem xmlns:ds="http://schemas.openxmlformats.org/officeDocument/2006/customXml" ds:itemID="{41E7CA09-9778-4414-AE97-8064B12DA30E}">
   <ds:schemaRefs>
     <ds:schemaRef ds:uri="http://schemas.microsoft.com/office/2006/metadata/contentType"/>
@@ -10892,6 +11146,14 @@
 </ds:datastoreItem>
 </file>
 
+<file path=customXml/itemProps2.xml><?xml version="1.0" encoding="utf-8"?>
+<ds:datastoreItem xmlns:ds="http://schemas.openxmlformats.org/officeDocument/2006/customXml" ds:itemID="{927BD4C1-B6B1-4715-ABF9-E660A51A4EA0}">
+  <ds:schemaRefs>
+    <ds:schemaRef ds:uri="http://schemas.microsoft.com/sharepoint/v3/contenttype/forms"/>
+  </ds:schemaRefs>
+</ds:datastoreItem>
+</file>
+
 <file path=customXml/itemProps3.xml><?xml version="1.0" encoding="utf-8"?>
 <ds:datastoreItem xmlns:ds="http://schemas.openxmlformats.org/officeDocument/2006/customXml" ds:itemID="{8D289AE2-D2AE-49D1-AFAC-3A79F6794255}">
   <ds:schemaRefs>

</xml_diff>

<commit_message>
Update Docker presentation to include more detail
</commit_message>
<xml_diff>
--- a/lectures/120_dockerize_python_app/Docker – an introduction.pptx
+++ b/lectures/120_dockerize_python_app/Docker – an introduction.pptx
@@ -14,7 +14,20 @@
     <p:sldId id="263" r:id="rId11"/>
     <p:sldId id="264" r:id="rId12"/>
     <p:sldId id="265" r:id="rId13"/>
-    <p:sldId id="266" r:id="rId14"/>
+    <p:sldId id="271" r:id="rId14"/>
+    <p:sldId id="267" r:id="rId15"/>
+    <p:sldId id="268" r:id="rId16"/>
+    <p:sldId id="269" r:id="rId17"/>
+    <p:sldId id="270" r:id="rId18"/>
+    <p:sldId id="272" r:id="rId19"/>
+    <p:sldId id="273" r:id="rId20"/>
+    <p:sldId id="274" r:id="rId21"/>
+    <p:sldId id="275" r:id="rId22"/>
+    <p:sldId id="276" r:id="rId23"/>
+    <p:sldId id="277" r:id="rId24"/>
+    <p:sldId id="266" r:id="rId25"/>
+    <p:sldId id="278" r:id="rId26"/>
+    <p:sldId id="279" r:id="rId27"/>
   </p:sldIdLst>
   <p:sldSz cx="12192000" cy="6858000"/>
   <p:notesSz cx="6858000" cy="9144000"/>
@@ -853,7 +866,7 @@
           <a:p>
             <a:fld id="{ED291B17-9318-49DB-B28B-6E5994AE9581}" type="datetime1">
               <a:rPr lang="en-US" smtClean="0"/>
-              <a:t>2/17/2025</a:t>
+              <a:t>7/23/25</a:t>
             </a:fld>
             <a:endParaRPr lang="en-US" dirty="0"/>
           </a:p>
@@ -1056,7 +1069,7 @@
           <a:p>
             <a:fld id="{2CED4963-E985-44C4-B8C4-FDD613B7C2F8}" type="datetime1">
               <a:rPr lang="en-US" smtClean="0"/>
-              <a:t>2/17/2025</a:t>
+              <a:t>7/23/25</a:t>
             </a:fld>
             <a:endParaRPr lang="en-US" dirty="0"/>
           </a:p>
@@ -1418,7 +1431,7 @@
           <a:p>
             <a:fld id="{ED291B17-9318-49DB-B28B-6E5994AE9581}" type="datetime1">
               <a:rPr lang="en-US" smtClean="0"/>
-              <a:t>2/17/2025</a:t>
+              <a:t>7/23/25</a:t>
             </a:fld>
             <a:endParaRPr lang="en-US" dirty="0"/>
           </a:p>
@@ -1616,7 +1629,7 @@
           <a:p>
             <a:fld id="{78DD82B9-B8EE-4375-B6FF-88FA6ABB15D9}" type="datetime1">
               <a:rPr lang="en-US" smtClean="0"/>
-              <a:t>2/17/2025</a:t>
+              <a:t>7/23/25</a:t>
             </a:fld>
             <a:endParaRPr lang="en-US" dirty="0"/>
           </a:p>
@@ -1928,7 +1941,7 @@
           <a:p>
             <a:fld id="{B2497495-0637-405E-AE64-5CC7506D51F5}" type="datetime1">
               <a:rPr lang="en-US" smtClean="0"/>
-              <a:t>2/17/2025</a:t>
+              <a:t>7/23/25</a:t>
             </a:fld>
             <a:endParaRPr lang="en-US" dirty="0"/>
           </a:p>
@@ -2181,7 +2194,7 @@
           <a:p>
             <a:fld id="{7BFFD690-9426-415D-8B65-26881E07B2D4}" type="datetime1">
               <a:rPr lang="en-US" smtClean="0"/>
-              <a:t>2/17/2025</a:t>
+              <a:t>7/23/25</a:t>
             </a:fld>
             <a:endParaRPr lang="en-US" dirty="0"/>
           </a:p>
@@ -2603,7 +2616,7 @@
           <a:p>
             <a:fld id="{04C4989A-474C-40DE-95B9-011C28B71673}" type="datetime1">
               <a:rPr lang="en-US" smtClean="0"/>
-              <a:t>2/17/2025</a:t>
+              <a:t>7/23/25</a:t>
             </a:fld>
             <a:endParaRPr lang="en-US" dirty="0"/>
           </a:p>
@@ -2726,7 +2739,7 @@
           <a:p>
             <a:fld id="{5DB4ED54-5B5E-4A04-93D3-5772E3CE3818}" type="datetime1">
               <a:rPr lang="en-US" smtClean="0"/>
-              <a:t>2/17/2025</a:t>
+              <a:t>7/23/25</a:t>
             </a:fld>
             <a:endParaRPr lang="en-US" dirty="0"/>
           </a:p>
@@ -2821,7 +2834,7 @@
           <a:p>
             <a:fld id="{4EDE50D6-574B-40AF-946F-D52A04ADE379}" type="datetime1">
               <a:rPr lang="en-US" smtClean="0"/>
-              <a:t>2/17/2025</a:t>
+              <a:t>7/23/25</a:t>
             </a:fld>
             <a:endParaRPr lang="en-US" dirty="0"/>
           </a:p>
@@ -3198,7 +3211,7 @@
           <a:p>
             <a:fld id="{D82884F1-FFEA-405F-9602-3DCA865EDA4E}" type="datetime1">
               <a:rPr lang="en-US" smtClean="0"/>
-              <a:t>2/17/2025</a:t>
+              <a:t>7/23/25</a:t>
             </a:fld>
             <a:endParaRPr lang="en-US" dirty="0"/>
           </a:p>
@@ -3491,7 +3504,7 @@
           <a:p>
             <a:fld id="{7E18DB4A-8810-4A10-AD5C-D5E2C667F5B3}" type="datetime1">
               <a:rPr lang="en-US" smtClean="0"/>
-              <a:t>2/17/2025</a:t>
+              <a:t>7/23/25</a:t>
             </a:fld>
             <a:endParaRPr lang="en-US" dirty="0"/>
           </a:p>
@@ -3706,7 +3719,7 @@
           <a:p>
             <a:fld id="{ED291B17-9318-49DB-B28B-6E5994AE9581}" type="datetime1">
               <a:rPr lang="en-US" smtClean="0"/>
-              <a:t>2/17/2025</a:t>
+              <a:t>7/23/25</a:t>
             </a:fld>
             <a:endParaRPr lang="en-US" dirty="0"/>
           </a:p>
@@ -4729,7 +4742,7 @@
           <p:cNvPr id="2" name="Title 1">
             <a:extLst>
               <a:ext uri="{FF2B5EF4-FFF2-40B4-BE49-F238E27FC236}">
-                <a16:creationId xmlns:a16="http://schemas.microsoft.com/office/drawing/2014/main" id="{92827A17-55A8-A889-FC18-6CBCDDF09CB9}"/>
+                <a16:creationId xmlns:a16="http://schemas.microsoft.com/office/drawing/2014/main" id="{7A36656B-D2B9-7652-819C-311DE74EC21B}"/>
               </a:ext>
             </a:extLst>
           </p:cNvPr>
@@ -4747,17 +4760,17 @@
           <a:p>
             <a:r>
               <a:rPr lang="en-US" dirty="0"/>
-              <a:t>Using and abusing Docker</a:t>
+              <a:t>Use “Docker run” and its many variations</a:t>
             </a:r>
           </a:p>
         </p:txBody>
       </p:sp>
       <p:sp>
         <p:nvSpPr>
-          <p:cNvPr id="3" name="Content Placeholder 2">
+          <p:cNvPr id="3" name="Text Placeholder 2">
             <a:extLst>
               <a:ext uri="{FF2B5EF4-FFF2-40B4-BE49-F238E27FC236}">
-                <a16:creationId xmlns:a16="http://schemas.microsoft.com/office/drawing/2014/main" id="{E227966A-464E-4CEB-29B6-305DE2C019BD}"/>
+                <a16:creationId xmlns:a16="http://schemas.microsoft.com/office/drawing/2014/main" id="{06C51DE4-D91E-6D8A-BB92-7AE1ADF94B9B}"/>
               </a:ext>
             </a:extLst>
           </p:cNvPr>
@@ -4765,67 +4778,132 @@
             <a:spLocks noGrp="1"/>
           </p:cNvSpPr>
           <p:nvPr>
-            <p:ph idx="1"/>
+            <p:ph type="body" idx="1"/>
           </p:nvPr>
         </p:nvSpPr>
         <p:spPr/>
         <p:txBody>
-          <a:bodyPr anchor="t"/>
+          <a:bodyPr/>
           <a:lstStyle/>
           <a:p>
             <a:r>
               <a:rPr lang="en-US" dirty="0"/>
-              <a:t>Docker is based on a set of </a:t>
-            </a:r>
-            <a:r>
-              <a:rPr lang="en-US" dirty="0" err="1"/>
-              <a:t>linux</a:t>
+              <a:t>Docker </a:t>
+            </a:r>
+            <a:r>
+              <a:rPr lang="en-US" i="1" dirty="0"/>
+              <a:t>exec</a:t>
             </a:r>
             <a:r>
               <a:rPr lang="en-US" dirty="0"/>
-              <a:t> technologies which allow the operating system to isolate processes and make them believe they are the only ones running.</a:t>
-            </a:r>
-          </a:p>
-          <a:p>
-            <a:pPr lvl="1"/>
+              <a:t> to connect to a running container</a:t>
+            </a:r>
+          </a:p>
+        </p:txBody>
+      </p:sp>
+    </p:spTree>
+    <p:extLst>
+      <p:ext uri="{BB962C8B-B14F-4D97-AF65-F5344CB8AC3E}">
+        <p14:creationId xmlns:p14="http://schemas.microsoft.com/office/powerpoint/2010/main" val="1583864659"/>
+      </p:ext>
+    </p:extLst>
+  </p:cSld>
+  <p:clrMapOvr>
+    <a:masterClrMapping/>
+  </p:clrMapOvr>
+</p:sld>
+</file>
+
+<file path=ppt/slides/slide11.xml><?xml version="1.0" encoding="utf-8"?>
+<p:sld xmlns:a="http://schemas.openxmlformats.org/drawingml/2006/main" xmlns:r="http://schemas.openxmlformats.org/officeDocument/2006/relationships" xmlns:p="http://schemas.openxmlformats.org/presentationml/2006/main">
+  <p:cSld>
+    <p:spTree>
+      <p:nvGrpSpPr>
+        <p:cNvPr id="1" name=""/>
+        <p:cNvGrpSpPr/>
+        <p:nvPr/>
+      </p:nvGrpSpPr>
+      <p:grpSpPr>
+        <a:xfrm>
+          <a:off x="0" y="0"/>
+          <a:ext cx="0" cy="0"/>
+          <a:chOff x="0" y="0"/>
+          <a:chExt cx="0" cy="0"/>
+        </a:xfrm>
+      </p:grpSpPr>
+      <p:sp>
+        <p:nvSpPr>
+          <p:cNvPr id="2" name="Title 1">
+            <a:extLst>
+              <a:ext uri="{FF2B5EF4-FFF2-40B4-BE49-F238E27FC236}">
+                <a16:creationId xmlns:a16="http://schemas.microsoft.com/office/drawing/2014/main" id="{467D925E-47DC-F5D9-76D8-79C812B63384}"/>
+              </a:ext>
+            </a:extLst>
+          </p:cNvPr>
+          <p:cNvSpPr>
+            <a:spLocks noGrp="1"/>
+          </p:cNvSpPr>
+          <p:nvPr>
+            <p:ph type="title"/>
+          </p:nvPr>
+        </p:nvSpPr>
+        <p:spPr/>
+        <p:txBody>
+          <a:bodyPr/>
+          <a:lstStyle/>
+          <a:p>
             <a:r>
               <a:rPr lang="en-US" dirty="0"/>
-              <a:t>Compare this with normal </a:t>
-            </a:r>
-            <a:r>
-              <a:rPr lang="en-US" dirty="0" err="1"/>
-              <a:t>linux</a:t>
-            </a:r>
-            <a:r>
-              <a:rPr lang="en-US" dirty="0"/>
-              <a:t> accounts where you can see that there are other user on </a:t>
-            </a:r>
-            <a:r>
-              <a:rPr lang="en-US" b="0" dirty="0">
+              <a:t>Run a container, exit when the command exits</a:t>
+            </a:r>
+          </a:p>
+        </p:txBody>
+      </p:sp>
+      <p:sp>
+        <p:nvSpPr>
+          <p:cNvPr id="4" name="TextBox 3">
+            <a:extLst>
+              <a:ext uri="{FF2B5EF4-FFF2-40B4-BE49-F238E27FC236}">
+                <a16:creationId xmlns:a16="http://schemas.microsoft.com/office/drawing/2014/main" id="{8B9A9C3D-685B-8116-2517-1BC6B1F96ED2}"/>
+              </a:ext>
+            </a:extLst>
+          </p:cNvPr>
+          <p:cNvSpPr txBox="1"/>
+          <p:nvPr/>
+        </p:nvSpPr>
+        <p:spPr>
+          <a:xfrm>
+            <a:off x="771942" y="3683339"/>
+            <a:ext cx="10637520" cy="345736"/>
+          </a:xfrm>
+          <a:prstGeom prst="rect">
+            <a:avLst/>
+          </a:prstGeom>
+          <a:noFill/>
+        </p:spPr>
+        <p:txBody>
+          <a:bodyPr wrap="square">
+            <a:spAutoFit/>
+          </a:bodyPr>
+          <a:lstStyle/>
+          <a:p>
+            <a:pPr>
+              <a:lnSpc>
+                <a:spcPts val="1425"/>
+              </a:lnSpc>
+            </a:pPr>
+            <a:r>
+              <a:rPr lang="en-US" sz="3600" b="1" dirty="0">
                 <a:solidFill>
                   <a:srgbClr val="679C00"/>
                 </a:solidFill>
                 <a:effectLst/>
                 <a:latin typeface="Consolas" panose="020B0609020204030204" pitchFamily="49" charset="0"/>
               </a:rPr>
-              <a:t>/home</a:t>
-            </a:r>
-            <a:r>
-              <a:rPr lang="en-US" dirty="0"/>
-              <a:t> and other processes running via </a:t>
-            </a:r>
-            <a:r>
-              <a:rPr lang="en-US" b="0" dirty="0" err="1">
-                <a:solidFill>
-                  <a:srgbClr val="679C00"/>
-                </a:solidFill>
-                <a:effectLst/>
-                <a:latin typeface="Consolas" panose="020B0609020204030204" pitchFamily="49" charset="0"/>
-              </a:rPr>
-              <a:t>ps</a:t>
-            </a:r>
-            <a:r>
-              <a:rPr lang="en-US" b="0" dirty="0">
+              <a:t>docker</a:t>
+            </a:r>
+            <a:r>
+              <a:rPr lang="en-US" sz="3600" b="1" dirty="0">
                 <a:solidFill>
                   <a:srgbClr val="333333"/>
                 </a:solidFill>
@@ -4835,26 +4913,36 @@
               <a:t> </a:t>
             </a:r>
             <a:r>
-              <a:rPr lang="en-US" b="0" dirty="0">
-                <a:solidFill>
-                  <a:srgbClr val="684D99"/>
-                </a:solidFill>
-                <a:effectLst/>
-                <a:latin typeface="Consolas" panose="020B0609020204030204" pitchFamily="49" charset="0"/>
-              </a:rPr>
-              <a:t>-</a:t>
-            </a:r>
-            <a:r>
-              <a:rPr lang="en-US" b="0" dirty="0" err="1">
-                <a:solidFill>
-                  <a:srgbClr val="684D99"/>
-                </a:solidFill>
-                <a:effectLst/>
-                <a:latin typeface="Consolas" panose="020B0609020204030204" pitchFamily="49" charset="0"/>
-              </a:rPr>
-              <a:t>ef</a:t>
-            </a:r>
-            <a:endParaRPr lang="en-US" b="0" dirty="0">
+              <a:rPr lang="en-US" sz="3600" b="1" dirty="0">
+                <a:solidFill>
+                  <a:srgbClr val="998F2F"/>
+                </a:solidFill>
+                <a:effectLst/>
+                <a:latin typeface="Consolas" panose="020B0609020204030204" pitchFamily="49" charset="0"/>
+              </a:rPr>
+              <a:t>run</a:t>
+            </a:r>
+            <a:r>
+              <a:rPr lang="en-US" sz="3600" b="1" dirty="0">
+                <a:solidFill>
+                  <a:srgbClr val="333333"/>
+                </a:solidFill>
+                <a:effectLst/>
+                <a:latin typeface="Consolas" panose="020B0609020204030204" pitchFamily="49" charset="0"/>
+              </a:rPr>
+              <a:t> </a:t>
+            </a:r>
+            <a:r>
+              <a:rPr lang="en-US" sz="3600" b="1" dirty="0" err="1">
+                <a:solidFill>
+                  <a:srgbClr val="998F2F"/>
+                </a:solidFill>
+                <a:effectLst/>
+                <a:latin typeface="Consolas" panose="020B0609020204030204" pitchFamily="49" charset="0"/>
+              </a:rPr>
+              <a:t>hello_app</a:t>
+            </a:r>
+            <a:endParaRPr lang="en-US" sz="3600" b="1" dirty="0">
               <a:solidFill>
                 <a:srgbClr val="333333"/>
               </a:solidFill>
@@ -4862,171 +4950,3201 @@
               <a:latin typeface="Consolas" panose="020B0609020204030204" pitchFamily="49" charset="0"/>
             </a:endParaRPr>
           </a:p>
-          <a:p>
-            <a:pPr lvl="1"/>
-            <a:r>
-              <a:rPr lang="en-US" b="1" dirty="0"/>
-              <a:t>When we run Docker on Windows or Mac, </a:t>
-            </a:r>
-            <a:r>
-              <a:rPr lang="en-US" b="1" dirty="0" err="1"/>
-              <a:t>linux</a:t>
-            </a:r>
-            <a:r>
-              <a:rPr lang="en-US" b="1" dirty="0"/>
-              <a:t> is being virtualized first, then docker is being run inside it!</a:t>
-            </a:r>
-          </a:p>
-          <a:p>
-            <a:pPr lvl="1"/>
-            <a:endParaRPr lang="en-US" dirty="0"/>
-          </a:p>
-          <a:p>
-            <a:r>
-              <a:rPr lang="en-US" dirty="0"/>
-              <a:t>Docker environment </a:t>
-            </a:r>
-            <a:r>
-              <a:rPr lang="en-US" b="1" dirty="0"/>
-              <a:t>should be set up entirely via </a:t>
-            </a:r>
-            <a:r>
-              <a:rPr lang="en-US" b="1" dirty="0" err="1"/>
-              <a:t>Dockerfile</a:t>
-            </a:r>
-            <a:r>
-              <a:rPr lang="en-US" dirty="0"/>
-              <a:t>. Do NOT execute commands on the shell to update the environment. That defeats the purpose of docker. I have seen this in online tutorials</a:t>
-            </a:r>
-          </a:p>
-          <a:p>
-            <a:pPr lvl="1"/>
-            <a:r>
-              <a:rPr lang="en-US" dirty="0"/>
-              <a:t>But you can enter the shell, as if you were ssh into a remote machine: </a:t>
-            </a:r>
-            <a:r>
-              <a:rPr lang="en-US" b="0" dirty="0">
-                <a:solidFill>
-                  <a:srgbClr val="679C00"/>
-                </a:solidFill>
-                <a:effectLst/>
-                <a:latin typeface="Consolas" panose="020B0609020204030204" pitchFamily="49" charset="0"/>
-              </a:rPr>
-              <a:t>docker</a:t>
-            </a:r>
-            <a:r>
-              <a:rPr lang="en-US" b="0" dirty="0">
-                <a:solidFill>
-                  <a:srgbClr val="333333"/>
-                </a:solidFill>
-                <a:effectLst/>
-                <a:latin typeface="Consolas" panose="020B0609020204030204" pitchFamily="49" charset="0"/>
-              </a:rPr>
-              <a:t> </a:t>
-            </a:r>
-            <a:r>
-              <a:rPr lang="en-US" b="0" dirty="0">
-                <a:solidFill>
-                  <a:srgbClr val="998F2F"/>
-                </a:solidFill>
-                <a:effectLst/>
-                <a:latin typeface="Consolas" panose="020B0609020204030204" pitchFamily="49" charset="0"/>
-              </a:rPr>
-              <a:t>exec</a:t>
-            </a:r>
-            <a:r>
-              <a:rPr lang="en-US" b="0" dirty="0">
-                <a:solidFill>
-                  <a:srgbClr val="333333"/>
-                </a:solidFill>
-                <a:effectLst/>
-                <a:latin typeface="Consolas" panose="020B0609020204030204" pitchFamily="49" charset="0"/>
-              </a:rPr>
-              <a:t> </a:t>
-            </a:r>
-            <a:r>
-              <a:rPr lang="en-US" b="0" dirty="0">
-                <a:solidFill>
-                  <a:srgbClr val="684D99"/>
-                </a:solidFill>
-                <a:effectLst/>
-                <a:latin typeface="Consolas" panose="020B0609020204030204" pitchFamily="49" charset="0"/>
-              </a:rPr>
-              <a:t>-it</a:t>
-            </a:r>
-            <a:r>
-              <a:rPr lang="en-US" b="0" dirty="0">
-                <a:solidFill>
-                  <a:srgbClr val="333333"/>
-                </a:solidFill>
-                <a:effectLst/>
-                <a:latin typeface="Consolas" panose="020B0609020204030204" pitchFamily="49" charset="0"/>
-              </a:rPr>
-              <a:t> </a:t>
-            </a:r>
-            <a:r>
-              <a:rPr lang="en-US" b="0" dirty="0">
-                <a:solidFill>
-                  <a:srgbClr val="F9005A"/>
-                </a:solidFill>
-                <a:effectLst/>
-                <a:latin typeface="Consolas" panose="020B0609020204030204" pitchFamily="49" charset="0"/>
-              </a:rPr>
-              <a:t>&lt;</a:t>
-            </a:r>
-            <a:r>
-              <a:rPr lang="en-US" b="0" dirty="0" err="1">
-                <a:solidFill>
-                  <a:srgbClr val="998F2F"/>
-                </a:solidFill>
-                <a:effectLst/>
-                <a:latin typeface="Consolas" panose="020B0609020204030204" pitchFamily="49" charset="0"/>
-              </a:rPr>
-              <a:t>container_name</a:t>
-            </a:r>
-            <a:r>
-              <a:rPr lang="en-US" b="0" dirty="0">
-                <a:solidFill>
-                  <a:srgbClr val="F9005A"/>
-                </a:solidFill>
-                <a:effectLst/>
-                <a:latin typeface="Consolas" panose="020B0609020204030204" pitchFamily="49" charset="0"/>
-              </a:rPr>
-              <a:t>&gt;</a:t>
-            </a:r>
-            <a:r>
-              <a:rPr lang="en-US" b="0" dirty="0">
-                <a:solidFill>
-                  <a:srgbClr val="333333"/>
-                </a:solidFill>
-                <a:effectLst/>
-                <a:latin typeface="Consolas" panose="020B0609020204030204" pitchFamily="49" charset="0"/>
-              </a:rPr>
-              <a:t> </a:t>
-            </a:r>
-            <a:r>
-              <a:rPr lang="en-US" b="0" dirty="0" err="1">
-                <a:solidFill>
-                  <a:srgbClr val="998F2F"/>
-                </a:solidFill>
-                <a:effectLst/>
-                <a:latin typeface="Consolas" panose="020B0609020204030204" pitchFamily="49" charset="0"/>
-              </a:rPr>
-              <a:t>sh</a:t>
-            </a:r>
-            <a:endParaRPr lang="en-US" dirty="0"/>
-          </a:p>
-          <a:p>
-            <a:pPr lvl="1"/>
-            <a:endParaRPr lang="en-US" dirty="0"/>
-          </a:p>
         </p:txBody>
       </p:sp>
     </p:spTree>
     <p:extLst>
       <p:ext uri="{BB962C8B-B14F-4D97-AF65-F5344CB8AC3E}">
-        <p14:creationId xmlns:p14="http://schemas.microsoft.com/office/powerpoint/2010/main" val="692693259"/>
+        <p14:creationId xmlns:p14="http://schemas.microsoft.com/office/powerpoint/2010/main" val="4193865266"/>
+      </p:ext>
+    </p:extLst>
+  </p:cSld>
+  <p:clrMapOvr>
+    <a:masterClrMapping/>
+  </p:clrMapOvr>
+</p:sld>
+</file>
+
+<file path=ppt/slides/slide12.xml><?xml version="1.0" encoding="utf-8"?>
+<p:sld xmlns:a="http://schemas.openxmlformats.org/drawingml/2006/main" xmlns:r="http://schemas.openxmlformats.org/officeDocument/2006/relationships" xmlns:p="http://schemas.openxmlformats.org/presentationml/2006/main">
+  <p:cSld>
+    <p:spTree>
+      <p:nvGrpSpPr>
+        <p:cNvPr id="1" name="">
+          <a:extLst>
+            <a:ext uri="{FF2B5EF4-FFF2-40B4-BE49-F238E27FC236}">
+              <a16:creationId xmlns:a16="http://schemas.microsoft.com/office/drawing/2014/main" id="{921F36AA-9673-EF54-3AA2-B572B0103652}"/>
+            </a:ext>
+          </a:extLst>
+        </p:cNvPr>
+        <p:cNvGrpSpPr/>
+        <p:nvPr/>
+      </p:nvGrpSpPr>
+      <p:grpSpPr>
+        <a:xfrm>
+          <a:off x="0" y="0"/>
+          <a:ext cx="0" cy="0"/>
+          <a:chOff x="0" y="0"/>
+          <a:chExt cx="0" cy="0"/>
+        </a:xfrm>
+      </p:grpSpPr>
+      <p:sp>
+        <p:nvSpPr>
+          <p:cNvPr id="2" name="Title 1">
+            <a:extLst>
+              <a:ext uri="{FF2B5EF4-FFF2-40B4-BE49-F238E27FC236}">
+                <a16:creationId xmlns:a16="http://schemas.microsoft.com/office/drawing/2014/main" id="{1E01349A-6D0A-F6B1-0F5E-12BB27FEB962}"/>
+              </a:ext>
+            </a:extLst>
+          </p:cNvPr>
+          <p:cNvSpPr>
+            <a:spLocks noGrp="1"/>
+          </p:cNvSpPr>
+          <p:nvPr>
+            <p:ph type="title"/>
+          </p:nvPr>
+        </p:nvSpPr>
+        <p:spPr/>
+        <p:txBody>
+          <a:bodyPr/>
+          <a:lstStyle/>
+          <a:p>
+            <a:r>
+              <a:rPr lang="en-US" dirty="0"/>
+              <a:t>Start a container, connect to it interactively</a:t>
+            </a:r>
+          </a:p>
+        </p:txBody>
+      </p:sp>
+      <p:sp>
+        <p:nvSpPr>
+          <p:cNvPr id="4" name="TextBox 3">
+            <a:extLst>
+              <a:ext uri="{FF2B5EF4-FFF2-40B4-BE49-F238E27FC236}">
+                <a16:creationId xmlns:a16="http://schemas.microsoft.com/office/drawing/2014/main" id="{81DA660C-48F8-F7D0-CA6D-E3D654E9CCC7}"/>
+              </a:ext>
+            </a:extLst>
+          </p:cNvPr>
+          <p:cNvSpPr txBox="1"/>
+          <p:nvPr/>
+        </p:nvSpPr>
+        <p:spPr>
+          <a:xfrm>
+            <a:off x="777240" y="3704770"/>
+            <a:ext cx="10637520" cy="345736"/>
+          </a:xfrm>
+          <a:prstGeom prst="rect">
+            <a:avLst/>
+          </a:prstGeom>
+          <a:noFill/>
+        </p:spPr>
+        <p:txBody>
+          <a:bodyPr wrap="square">
+            <a:spAutoFit/>
+          </a:bodyPr>
+          <a:lstStyle/>
+          <a:p>
+            <a:pPr>
+              <a:lnSpc>
+                <a:spcPts val="1425"/>
+              </a:lnSpc>
+            </a:pPr>
+            <a:r>
+              <a:rPr lang="en-US" sz="3600" b="1" dirty="0">
+                <a:solidFill>
+                  <a:srgbClr val="679C00"/>
+                </a:solidFill>
+                <a:effectLst/>
+                <a:latin typeface="Consolas" panose="020B0609020204030204" pitchFamily="49" charset="0"/>
+              </a:rPr>
+              <a:t>docker</a:t>
+            </a:r>
+            <a:r>
+              <a:rPr lang="en-US" sz="3600" b="1" dirty="0">
+                <a:solidFill>
+                  <a:srgbClr val="333333"/>
+                </a:solidFill>
+                <a:effectLst/>
+                <a:latin typeface="Consolas" panose="020B0609020204030204" pitchFamily="49" charset="0"/>
+              </a:rPr>
+              <a:t> </a:t>
+            </a:r>
+            <a:r>
+              <a:rPr lang="en-US" sz="3600" b="1" dirty="0">
+                <a:solidFill>
+                  <a:srgbClr val="998F2F"/>
+                </a:solidFill>
+                <a:effectLst/>
+                <a:latin typeface="Consolas" panose="020B0609020204030204" pitchFamily="49" charset="0"/>
+              </a:rPr>
+              <a:t>run</a:t>
+            </a:r>
+            <a:r>
+              <a:rPr lang="en-US" sz="3600" b="1" dirty="0">
+                <a:solidFill>
+                  <a:srgbClr val="333333"/>
+                </a:solidFill>
+                <a:effectLst/>
+                <a:latin typeface="Consolas" panose="020B0609020204030204" pitchFamily="49" charset="0"/>
+              </a:rPr>
+              <a:t> –it </a:t>
+            </a:r>
+            <a:r>
+              <a:rPr lang="en-US" sz="3600" b="1" dirty="0" err="1">
+                <a:solidFill>
+                  <a:srgbClr val="998F2F"/>
+                </a:solidFill>
+                <a:effectLst/>
+                <a:latin typeface="Consolas" panose="020B0609020204030204" pitchFamily="49" charset="0"/>
+              </a:rPr>
+              <a:t>hello_app</a:t>
+            </a:r>
+            <a:r>
+              <a:rPr lang="en-US" sz="3600" b="1" dirty="0">
+                <a:solidFill>
+                  <a:srgbClr val="998F2F"/>
+                </a:solidFill>
+                <a:effectLst/>
+                <a:latin typeface="Consolas" panose="020B0609020204030204" pitchFamily="49" charset="0"/>
+              </a:rPr>
+              <a:t> </a:t>
+            </a:r>
+            <a:r>
+              <a:rPr lang="en-US" sz="3600" b="1" dirty="0">
+                <a:solidFill>
+                  <a:schemeClr val="tx2"/>
+                </a:solidFill>
+                <a:effectLst/>
+                <a:latin typeface="Consolas" panose="020B0609020204030204" pitchFamily="49" charset="0"/>
+              </a:rPr>
+              <a:t>bash</a:t>
+            </a:r>
+          </a:p>
+        </p:txBody>
+      </p:sp>
+      <p:sp>
+        <p:nvSpPr>
+          <p:cNvPr id="3" name="Up Arrow 2">
+            <a:extLst>
+              <a:ext uri="{FF2B5EF4-FFF2-40B4-BE49-F238E27FC236}">
+                <a16:creationId xmlns:a16="http://schemas.microsoft.com/office/drawing/2014/main" id="{4C276D2A-8AC3-30DE-D321-12FCEC98CCFC}"/>
+              </a:ext>
+            </a:extLst>
+          </p:cNvPr>
+          <p:cNvSpPr/>
+          <p:nvPr/>
+        </p:nvSpPr>
+        <p:spPr>
+          <a:xfrm rot="1752690">
+            <a:off x="3743643" y="3949859"/>
+            <a:ext cx="132080" cy="396240"/>
+          </a:xfrm>
+          <a:prstGeom prst="upArrow">
+            <a:avLst/>
+          </a:prstGeom>
+        </p:spPr>
+        <p:style>
+          <a:lnRef idx="2">
+            <a:schemeClr val="accent1">
+              <a:shade val="15000"/>
+            </a:schemeClr>
+          </a:lnRef>
+          <a:fillRef idx="1">
+            <a:schemeClr val="accent1"/>
+          </a:fillRef>
+          <a:effectRef idx="0">
+            <a:schemeClr val="accent1"/>
+          </a:effectRef>
+          <a:fontRef idx="minor">
+            <a:schemeClr val="lt1"/>
+          </a:fontRef>
+        </p:style>
+        <p:txBody>
+          <a:bodyPr rtlCol="0" anchor="ctr"/>
+          <a:lstStyle/>
+          <a:p>
+            <a:pPr algn="ctr"/>
+            <a:endParaRPr lang="en-US"/>
+          </a:p>
+        </p:txBody>
+      </p:sp>
+      <p:sp>
+        <p:nvSpPr>
+          <p:cNvPr id="5" name="TextBox 4">
+            <a:extLst>
+              <a:ext uri="{FF2B5EF4-FFF2-40B4-BE49-F238E27FC236}">
+                <a16:creationId xmlns:a16="http://schemas.microsoft.com/office/drawing/2014/main" id="{F7BC054C-4327-C909-6604-48A54D19BDB5}"/>
+              </a:ext>
+            </a:extLst>
+          </p:cNvPr>
+          <p:cNvSpPr txBox="1"/>
+          <p:nvPr/>
+        </p:nvSpPr>
+        <p:spPr>
+          <a:xfrm>
+            <a:off x="2405195" y="4353133"/>
+            <a:ext cx="1847717" cy="1200329"/>
+          </a:xfrm>
+          <a:prstGeom prst="rect">
+            <a:avLst/>
+          </a:prstGeom>
+          <a:noFill/>
+        </p:spPr>
+        <p:txBody>
+          <a:bodyPr wrap="square" rtlCol="0">
+            <a:spAutoFit/>
+          </a:bodyPr>
+          <a:lstStyle/>
+          <a:p>
+            <a:r>
+              <a:rPr lang="en-US" dirty="0"/>
+              <a:t>Run container </a:t>
+            </a:r>
+            <a:r>
+              <a:rPr lang="en-US" i="1" dirty="0"/>
+              <a:t>interactively</a:t>
+            </a:r>
+            <a:r>
+              <a:rPr lang="en-US" dirty="0"/>
+              <a:t>, accept keyboard input, etc.</a:t>
+            </a:r>
+          </a:p>
+        </p:txBody>
+      </p:sp>
+      <p:sp>
+        <p:nvSpPr>
+          <p:cNvPr id="6" name="Up Arrow 5">
+            <a:extLst>
+              <a:ext uri="{FF2B5EF4-FFF2-40B4-BE49-F238E27FC236}">
+                <a16:creationId xmlns:a16="http://schemas.microsoft.com/office/drawing/2014/main" id="{22C1D6D2-6DB3-00F3-2469-6AF9C4715CD7}"/>
+              </a:ext>
+            </a:extLst>
+          </p:cNvPr>
+          <p:cNvSpPr/>
+          <p:nvPr/>
+        </p:nvSpPr>
+        <p:spPr>
+          <a:xfrm rot="13716098">
+            <a:off x="4379159" y="3204023"/>
+            <a:ext cx="132080" cy="396240"/>
+          </a:xfrm>
+          <a:prstGeom prst="upArrow">
+            <a:avLst/>
+          </a:prstGeom>
+        </p:spPr>
+        <p:style>
+          <a:lnRef idx="2">
+            <a:schemeClr val="accent1">
+              <a:shade val="15000"/>
+            </a:schemeClr>
+          </a:lnRef>
+          <a:fillRef idx="1">
+            <a:schemeClr val="accent1"/>
+          </a:fillRef>
+          <a:effectRef idx="0">
+            <a:schemeClr val="accent1"/>
+          </a:effectRef>
+          <a:fontRef idx="minor">
+            <a:schemeClr val="lt1"/>
+          </a:fontRef>
+        </p:style>
+        <p:txBody>
+          <a:bodyPr rtlCol="0" anchor="ctr"/>
+          <a:lstStyle/>
+          <a:p>
+            <a:pPr algn="ctr"/>
+            <a:endParaRPr lang="en-US"/>
+          </a:p>
+        </p:txBody>
+      </p:sp>
+      <p:sp>
+        <p:nvSpPr>
+          <p:cNvPr id="7" name="TextBox 6">
+            <a:extLst>
+              <a:ext uri="{FF2B5EF4-FFF2-40B4-BE49-F238E27FC236}">
+                <a16:creationId xmlns:a16="http://schemas.microsoft.com/office/drawing/2014/main" id="{3B9B4887-899D-81A3-C95E-80AADFF242E9}"/>
+              </a:ext>
+            </a:extLst>
+          </p:cNvPr>
+          <p:cNvSpPr txBox="1"/>
+          <p:nvPr/>
+        </p:nvSpPr>
+        <p:spPr>
+          <a:xfrm>
+            <a:off x="4111364" y="2575258"/>
+            <a:ext cx="2684723" cy="646331"/>
+          </a:xfrm>
+          <a:prstGeom prst="rect">
+            <a:avLst/>
+          </a:prstGeom>
+          <a:noFill/>
+        </p:spPr>
+        <p:txBody>
+          <a:bodyPr wrap="square" rtlCol="0">
+            <a:spAutoFit/>
+          </a:bodyPr>
+          <a:lstStyle/>
+          <a:p>
+            <a:r>
+              <a:rPr lang="en-US" dirty="0"/>
+              <a:t>Connect a fake ”console” to the container</a:t>
+            </a:r>
+          </a:p>
+        </p:txBody>
+      </p:sp>
+      <p:sp>
+        <p:nvSpPr>
+          <p:cNvPr id="8" name="Up Arrow 7">
+            <a:extLst>
+              <a:ext uri="{FF2B5EF4-FFF2-40B4-BE49-F238E27FC236}">
+                <a16:creationId xmlns:a16="http://schemas.microsoft.com/office/drawing/2014/main" id="{E4696663-16CB-A697-7D58-B83883E79504}"/>
+              </a:ext>
+            </a:extLst>
+          </p:cNvPr>
+          <p:cNvSpPr/>
+          <p:nvPr/>
+        </p:nvSpPr>
+        <p:spPr>
+          <a:xfrm rot="19557309">
+            <a:off x="7718719" y="4003701"/>
+            <a:ext cx="132080" cy="396240"/>
+          </a:xfrm>
+          <a:prstGeom prst="upArrow">
+            <a:avLst/>
+          </a:prstGeom>
+        </p:spPr>
+        <p:style>
+          <a:lnRef idx="2">
+            <a:schemeClr val="accent1">
+              <a:shade val="15000"/>
+            </a:schemeClr>
+          </a:lnRef>
+          <a:fillRef idx="1">
+            <a:schemeClr val="accent1"/>
+          </a:fillRef>
+          <a:effectRef idx="0">
+            <a:schemeClr val="accent1"/>
+          </a:effectRef>
+          <a:fontRef idx="minor">
+            <a:schemeClr val="lt1"/>
+          </a:fontRef>
+        </p:style>
+        <p:txBody>
+          <a:bodyPr rtlCol="0" anchor="ctr"/>
+          <a:lstStyle/>
+          <a:p>
+            <a:pPr algn="ctr"/>
+            <a:endParaRPr lang="en-US"/>
+          </a:p>
+        </p:txBody>
+      </p:sp>
+      <p:sp>
+        <p:nvSpPr>
+          <p:cNvPr id="9" name="TextBox 8">
+            <a:extLst>
+              <a:ext uri="{FF2B5EF4-FFF2-40B4-BE49-F238E27FC236}">
+                <a16:creationId xmlns:a16="http://schemas.microsoft.com/office/drawing/2014/main" id="{5648BA1D-8FBD-1144-4907-ECCDB935E692}"/>
+              </a:ext>
+            </a:extLst>
+          </p:cNvPr>
+          <p:cNvSpPr txBox="1"/>
+          <p:nvPr/>
+        </p:nvSpPr>
+        <p:spPr>
+          <a:xfrm>
+            <a:off x="7102082" y="4402956"/>
+            <a:ext cx="2684723" cy="1477328"/>
+          </a:xfrm>
+          <a:prstGeom prst="rect">
+            <a:avLst/>
+          </a:prstGeom>
+          <a:noFill/>
+        </p:spPr>
+        <p:txBody>
+          <a:bodyPr wrap="square" rtlCol="0">
+            <a:spAutoFit/>
+          </a:bodyPr>
+          <a:lstStyle/>
+          <a:p>
+            <a:r>
+              <a:rPr lang="en-US" dirty="0"/>
+              <a:t>Run this command inside the container. </a:t>
+            </a:r>
+          </a:p>
+          <a:p>
+            <a:endParaRPr lang="en-US" dirty="0"/>
+          </a:p>
+          <a:p>
+            <a:r>
+              <a:rPr lang="en-US" dirty="0"/>
+              <a:t>As if you </a:t>
+            </a:r>
+            <a:r>
+              <a:rPr lang="en-US" i="1" dirty="0"/>
+              <a:t>ssh</a:t>
+            </a:r>
+            <a:r>
+              <a:rPr lang="en-US" dirty="0"/>
+              <a:t> into a machine</a:t>
+            </a:r>
+          </a:p>
+        </p:txBody>
+      </p:sp>
+      <p:sp>
+        <p:nvSpPr>
+          <p:cNvPr id="10" name="TextBox 9">
+            <a:extLst>
+              <a:ext uri="{FF2B5EF4-FFF2-40B4-BE49-F238E27FC236}">
+                <a16:creationId xmlns:a16="http://schemas.microsoft.com/office/drawing/2014/main" id="{B1A55090-D3F8-8BCD-F706-AE7A37AC0292}"/>
+              </a:ext>
+            </a:extLst>
+          </p:cNvPr>
+          <p:cNvSpPr txBox="1"/>
+          <p:nvPr/>
+        </p:nvSpPr>
+        <p:spPr>
+          <a:xfrm>
+            <a:off x="771942" y="6128342"/>
+            <a:ext cx="4429786" cy="292965"/>
+          </a:xfrm>
+          <a:prstGeom prst="rect">
+            <a:avLst/>
+          </a:prstGeom>
+          <a:noFill/>
+        </p:spPr>
+        <p:txBody>
+          <a:bodyPr wrap="square">
+            <a:spAutoFit/>
+          </a:bodyPr>
+          <a:lstStyle/>
+          <a:p>
+            <a:pPr>
+              <a:lnSpc>
+                <a:spcPts val="1425"/>
+              </a:lnSpc>
+            </a:pPr>
+            <a:r>
+              <a:rPr lang="en-US" sz="2000" b="1" dirty="0">
+                <a:solidFill>
+                  <a:srgbClr val="679C00"/>
+                </a:solidFill>
+                <a:effectLst/>
+                <a:latin typeface="Consolas" panose="020B0609020204030204" pitchFamily="49" charset="0"/>
+              </a:rPr>
+              <a:t>docker</a:t>
+            </a:r>
+            <a:r>
+              <a:rPr lang="en-US" sz="2000" b="1" dirty="0">
+                <a:solidFill>
+                  <a:srgbClr val="333333"/>
+                </a:solidFill>
+                <a:effectLst/>
+                <a:latin typeface="Consolas" panose="020B0609020204030204" pitchFamily="49" charset="0"/>
+              </a:rPr>
+              <a:t> </a:t>
+            </a:r>
+            <a:r>
+              <a:rPr lang="en-US" sz="2000" b="1" dirty="0">
+                <a:solidFill>
+                  <a:srgbClr val="998F2F"/>
+                </a:solidFill>
+                <a:effectLst/>
+                <a:highlight>
+                  <a:srgbClr val="FFFF00"/>
+                </a:highlight>
+                <a:latin typeface="Consolas" panose="020B0609020204030204" pitchFamily="49" charset="0"/>
+              </a:rPr>
+              <a:t>exec</a:t>
+            </a:r>
+            <a:r>
+              <a:rPr lang="en-US" sz="2000" b="1" dirty="0">
+                <a:solidFill>
+                  <a:srgbClr val="333333"/>
+                </a:solidFill>
+                <a:effectLst/>
+                <a:latin typeface="Consolas" panose="020B0609020204030204" pitchFamily="49" charset="0"/>
+              </a:rPr>
+              <a:t> –it </a:t>
+            </a:r>
+            <a:r>
+              <a:rPr lang="en-US" sz="2000" b="1" dirty="0" err="1">
+                <a:solidFill>
+                  <a:srgbClr val="998F2F"/>
+                </a:solidFill>
+                <a:effectLst/>
+                <a:latin typeface="Consolas" panose="020B0609020204030204" pitchFamily="49" charset="0"/>
+              </a:rPr>
+              <a:t>hello_app</a:t>
+            </a:r>
+            <a:r>
+              <a:rPr lang="en-US" sz="2000" b="1" dirty="0">
+                <a:solidFill>
+                  <a:srgbClr val="998F2F"/>
+                </a:solidFill>
+                <a:effectLst/>
+                <a:latin typeface="Consolas" panose="020B0609020204030204" pitchFamily="49" charset="0"/>
+              </a:rPr>
+              <a:t> </a:t>
+            </a:r>
+            <a:r>
+              <a:rPr lang="en-US" sz="2000" b="1" dirty="0">
+                <a:solidFill>
+                  <a:schemeClr val="tx2"/>
+                </a:solidFill>
+                <a:effectLst/>
+                <a:latin typeface="Consolas" panose="020B0609020204030204" pitchFamily="49" charset="0"/>
+              </a:rPr>
+              <a:t>bash</a:t>
+            </a:r>
+          </a:p>
+        </p:txBody>
+      </p:sp>
+      <p:sp>
+        <p:nvSpPr>
+          <p:cNvPr id="11" name="TextBox 10">
+            <a:extLst>
+              <a:ext uri="{FF2B5EF4-FFF2-40B4-BE49-F238E27FC236}">
+                <a16:creationId xmlns:a16="http://schemas.microsoft.com/office/drawing/2014/main" id="{60298A90-054E-2BD9-7B50-5EC4420CD74D}"/>
+              </a:ext>
+            </a:extLst>
+          </p:cNvPr>
+          <p:cNvSpPr txBox="1"/>
+          <p:nvPr/>
+        </p:nvSpPr>
+        <p:spPr>
+          <a:xfrm>
+            <a:off x="690362" y="5291852"/>
+            <a:ext cx="1568183" cy="523220"/>
+          </a:xfrm>
+          <a:prstGeom prst="rect">
+            <a:avLst/>
+          </a:prstGeom>
+          <a:noFill/>
+        </p:spPr>
+        <p:txBody>
+          <a:bodyPr wrap="square" rtlCol="0">
+            <a:spAutoFit/>
+          </a:bodyPr>
+          <a:lstStyle/>
+          <a:p>
+            <a:r>
+              <a:rPr lang="en-US" sz="1400" dirty="0"/>
+              <a:t>If the container is already running</a:t>
+            </a:r>
+          </a:p>
+        </p:txBody>
+      </p:sp>
+      <p:sp>
+        <p:nvSpPr>
+          <p:cNvPr id="12" name="Up Arrow 11">
+            <a:extLst>
+              <a:ext uri="{FF2B5EF4-FFF2-40B4-BE49-F238E27FC236}">
+                <a16:creationId xmlns:a16="http://schemas.microsoft.com/office/drawing/2014/main" id="{14F6B5EC-FFE8-F523-BA6B-BD5D47F6AC33}"/>
+              </a:ext>
+            </a:extLst>
+          </p:cNvPr>
+          <p:cNvSpPr/>
+          <p:nvPr/>
+        </p:nvSpPr>
+        <p:spPr>
+          <a:xfrm rot="8943183">
+            <a:off x="2030748" y="5673848"/>
+            <a:ext cx="114813" cy="282448"/>
+          </a:xfrm>
+          <a:prstGeom prst="upArrow">
+            <a:avLst/>
+          </a:prstGeom>
+        </p:spPr>
+        <p:style>
+          <a:lnRef idx="2">
+            <a:schemeClr val="accent1">
+              <a:shade val="15000"/>
+            </a:schemeClr>
+          </a:lnRef>
+          <a:fillRef idx="1">
+            <a:schemeClr val="accent1"/>
+          </a:fillRef>
+          <a:effectRef idx="0">
+            <a:schemeClr val="accent1"/>
+          </a:effectRef>
+          <a:fontRef idx="minor">
+            <a:schemeClr val="lt1"/>
+          </a:fontRef>
+        </p:style>
+        <p:txBody>
+          <a:bodyPr rtlCol="0" anchor="ctr"/>
+          <a:lstStyle/>
+          <a:p>
+            <a:pPr algn="ctr"/>
+            <a:endParaRPr lang="en-US"/>
+          </a:p>
+        </p:txBody>
+      </p:sp>
+    </p:spTree>
+    <p:extLst>
+      <p:ext uri="{BB962C8B-B14F-4D97-AF65-F5344CB8AC3E}">
+        <p14:creationId xmlns:p14="http://schemas.microsoft.com/office/powerpoint/2010/main" val="565864204"/>
+      </p:ext>
+    </p:extLst>
+  </p:cSld>
+  <p:clrMapOvr>
+    <a:masterClrMapping/>
+  </p:clrMapOvr>
+</p:sld>
+</file>
+
+<file path=ppt/slides/slide13.xml><?xml version="1.0" encoding="utf-8"?>
+<p:sld xmlns:a="http://schemas.openxmlformats.org/drawingml/2006/main" xmlns:r="http://schemas.openxmlformats.org/officeDocument/2006/relationships" xmlns:p="http://schemas.openxmlformats.org/presentationml/2006/main">
+  <p:cSld>
+    <p:spTree>
+      <p:nvGrpSpPr>
+        <p:cNvPr id="1" name="">
+          <a:extLst>
+            <a:ext uri="{FF2B5EF4-FFF2-40B4-BE49-F238E27FC236}">
+              <a16:creationId xmlns:a16="http://schemas.microsoft.com/office/drawing/2014/main" id="{956102A7-E562-53CA-636A-95DDF9A23444}"/>
+            </a:ext>
+          </a:extLst>
+        </p:cNvPr>
+        <p:cNvGrpSpPr/>
+        <p:nvPr/>
+      </p:nvGrpSpPr>
+      <p:grpSpPr>
+        <a:xfrm>
+          <a:off x="0" y="0"/>
+          <a:ext cx="0" cy="0"/>
+          <a:chOff x="0" y="0"/>
+          <a:chExt cx="0" cy="0"/>
+        </a:xfrm>
+      </p:grpSpPr>
+      <p:sp>
+        <p:nvSpPr>
+          <p:cNvPr id="2" name="Title 1">
+            <a:extLst>
+              <a:ext uri="{FF2B5EF4-FFF2-40B4-BE49-F238E27FC236}">
+                <a16:creationId xmlns:a16="http://schemas.microsoft.com/office/drawing/2014/main" id="{12F54400-4524-74BF-AB6D-A66E06E77D29}"/>
+              </a:ext>
+            </a:extLst>
+          </p:cNvPr>
+          <p:cNvSpPr>
+            <a:spLocks noGrp="1"/>
+          </p:cNvSpPr>
+          <p:nvPr>
+            <p:ph type="title"/>
+          </p:nvPr>
+        </p:nvSpPr>
+        <p:spPr/>
+        <p:txBody>
+          <a:bodyPr/>
+          <a:lstStyle/>
+          <a:p>
+            <a:r>
+              <a:rPr lang="en-US" dirty="0"/>
+              <a:t>Start a container, run a service inside it</a:t>
+            </a:r>
+          </a:p>
+        </p:txBody>
+      </p:sp>
+      <p:sp>
+        <p:nvSpPr>
+          <p:cNvPr id="4" name="TextBox 3">
+            <a:extLst>
+              <a:ext uri="{FF2B5EF4-FFF2-40B4-BE49-F238E27FC236}">
+                <a16:creationId xmlns:a16="http://schemas.microsoft.com/office/drawing/2014/main" id="{DDB43ADF-F638-5823-ED97-1E490C31B128}"/>
+              </a:ext>
+            </a:extLst>
+          </p:cNvPr>
+          <p:cNvSpPr txBox="1"/>
+          <p:nvPr/>
+        </p:nvSpPr>
+        <p:spPr>
+          <a:xfrm>
+            <a:off x="777240" y="3704770"/>
+            <a:ext cx="10637520" cy="345736"/>
+          </a:xfrm>
+          <a:prstGeom prst="rect">
+            <a:avLst/>
+          </a:prstGeom>
+          <a:noFill/>
+        </p:spPr>
+        <p:txBody>
+          <a:bodyPr wrap="square">
+            <a:spAutoFit/>
+          </a:bodyPr>
+          <a:lstStyle/>
+          <a:p>
+            <a:pPr>
+              <a:lnSpc>
+                <a:spcPts val="1425"/>
+              </a:lnSpc>
+            </a:pPr>
+            <a:r>
+              <a:rPr lang="en-US" sz="3600" b="1" dirty="0">
+                <a:solidFill>
+                  <a:srgbClr val="679C00"/>
+                </a:solidFill>
+                <a:effectLst/>
+                <a:latin typeface="Consolas" panose="020B0609020204030204" pitchFamily="49" charset="0"/>
+              </a:rPr>
+              <a:t>docker</a:t>
+            </a:r>
+            <a:r>
+              <a:rPr lang="en-US" sz="3600" b="1" dirty="0">
+                <a:solidFill>
+                  <a:srgbClr val="333333"/>
+                </a:solidFill>
+                <a:effectLst/>
+                <a:latin typeface="Consolas" panose="020B0609020204030204" pitchFamily="49" charset="0"/>
+              </a:rPr>
+              <a:t> </a:t>
+            </a:r>
+            <a:r>
+              <a:rPr lang="en-US" sz="3600" b="1" dirty="0">
+                <a:solidFill>
+                  <a:srgbClr val="998F2F"/>
+                </a:solidFill>
+                <a:effectLst/>
+                <a:latin typeface="Consolas" panose="020B0609020204030204" pitchFamily="49" charset="0"/>
+              </a:rPr>
+              <a:t>run</a:t>
+            </a:r>
+            <a:r>
+              <a:rPr lang="en-US" sz="3600" b="1" dirty="0">
+                <a:solidFill>
+                  <a:srgbClr val="333333"/>
+                </a:solidFill>
+                <a:effectLst/>
+                <a:latin typeface="Consolas" panose="020B0609020204030204" pitchFamily="49" charset="0"/>
+              </a:rPr>
+              <a:t> –d –p </a:t>
+            </a:r>
+            <a:r>
+              <a:rPr lang="en-US" sz="3600" b="1" dirty="0">
+                <a:solidFill>
+                  <a:schemeClr val="accent5"/>
+                </a:solidFill>
+                <a:latin typeface="Consolas" panose="020B0609020204030204" pitchFamily="49" charset="0"/>
+              </a:rPr>
+              <a:t>8000</a:t>
+            </a:r>
+            <a:r>
+              <a:rPr lang="en-US" sz="3600" b="1" dirty="0">
+                <a:solidFill>
+                  <a:schemeClr val="tx2"/>
+                </a:solidFill>
+                <a:latin typeface="Consolas" panose="020B0609020204030204" pitchFamily="49" charset="0"/>
+              </a:rPr>
+              <a:t>:8000</a:t>
+            </a:r>
+            <a:r>
+              <a:rPr lang="en-US" sz="3600" b="1" dirty="0">
+                <a:solidFill>
+                  <a:srgbClr val="333333"/>
+                </a:solidFill>
+                <a:effectLst/>
+                <a:latin typeface="Consolas" panose="020B0609020204030204" pitchFamily="49" charset="0"/>
+              </a:rPr>
+              <a:t> </a:t>
+            </a:r>
+            <a:r>
+              <a:rPr lang="en-US" sz="3600" b="1" dirty="0" err="1">
+                <a:solidFill>
+                  <a:srgbClr val="998F2F"/>
+                </a:solidFill>
+                <a:effectLst/>
+                <a:latin typeface="Consolas" panose="020B0609020204030204" pitchFamily="49" charset="0"/>
+              </a:rPr>
+              <a:t>minimal_server</a:t>
+            </a:r>
+            <a:endParaRPr lang="en-US" sz="3600" b="1" dirty="0">
+              <a:solidFill>
+                <a:schemeClr val="tx2"/>
+              </a:solidFill>
+              <a:effectLst/>
+              <a:latin typeface="Consolas" panose="020B0609020204030204" pitchFamily="49" charset="0"/>
+            </a:endParaRPr>
+          </a:p>
+        </p:txBody>
+      </p:sp>
+      <p:sp>
+        <p:nvSpPr>
+          <p:cNvPr id="3" name="Up Arrow 2">
+            <a:extLst>
+              <a:ext uri="{FF2B5EF4-FFF2-40B4-BE49-F238E27FC236}">
+                <a16:creationId xmlns:a16="http://schemas.microsoft.com/office/drawing/2014/main" id="{412A0D2D-A523-DA95-614B-E9FDF2D7CF83}"/>
+              </a:ext>
+            </a:extLst>
+          </p:cNvPr>
+          <p:cNvSpPr/>
+          <p:nvPr/>
+        </p:nvSpPr>
+        <p:spPr>
+          <a:xfrm rot="1752690">
+            <a:off x="3743643" y="3949859"/>
+            <a:ext cx="132080" cy="396240"/>
+          </a:xfrm>
+          <a:prstGeom prst="upArrow">
+            <a:avLst/>
+          </a:prstGeom>
+        </p:spPr>
+        <p:style>
+          <a:lnRef idx="2">
+            <a:schemeClr val="accent1">
+              <a:shade val="15000"/>
+            </a:schemeClr>
+          </a:lnRef>
+          <a:fillRef idx="1">
+            <a:schemeClr val="accent1"/>
+          </a:fillRef>
+          <a:effectRef idx="0">
+            <a:schemeClr val="accent1"/>
+          </a:effectRef>
+          <a:fontRef idx="minor">
+            <a:schemeClr val="lt1"/>
+          </a:fontRef>
+        </p:style>
+        <p:txBody>
+          <a:bodyPr rtlCol="0" anchor="ctr"/>
+          <a:lstStyle/>
+          <a:p>
+            <a:pPr algn="ctr"/>
+            <a:endParaRPr lang="en-US"/>
+          </a:p>
+        </p:txBody>
+      </p:sp>
+      <p:sp>
+        <p:nvSpPr>
+          <p:cNvPr id="5" name="TextBox 4">
+            <a:extLst>
+              <a:ext uri="{FF2B5EF4-FFF2-40B4-BE49-F238E27FC236}">
+                <a16:creationId xmlns:a16="http://schemas.microsoft.com/office/drawing/2014/main" id="{40DFE73B-CF83-696A-EB09-96453DED826C}"/>
+              </a:ext>
+            </a:extLst>
+          </p:cNvPr>
+          <p:cNvSpPr txBox="1"/>
+          <p:nvPr/>
+        </p:nvSpPr>
+        <p:spPr>
+          <a:xfrm>
+            <a:off x="2405195" y="4353133"/>
+            <a:ext cx="3145499" cy="1200329"/>
+          </a:xfrm>
+          <a:prstGeom prst="rect">
+            <a:avLst/>
+          </a:prstGeom>
+          <a:noFill/>
+        </p:spPr>
+        <p:txBody>
+          <a:bodyPr wrap="square" rtlCol="0">
+            <a:spAutoFit/>
+          </a:bodyPr>
+          <a:lstStyle/>
+          <a:p>
+            <a:r>
+              <a:rPr lang="en-US" dirty="0"/>
+              <a:t>Run container in “detached” mode, so you don’t have to keep the terminal window open</a:t>
+            </a:r>
+          </a:p>
+        </p:txBody>
+      </p:sp>
+      <p:sp>
+        <p:nvSpPr>
+          <p:cNvPr id="7" name="TextBox 6">
+            <a:extLst>
+              <a:ext uri="{FF2B5EF4-FFF2-40B4-BE49-F238E27FC236}">
+                <a16:creationId xmlns:a16="http://schemas.microsoft.com/office/drawing/2014/main" id="{66268BCD-D7DB-6E33-495C-599724EA4E77}"/>
+              </a:ext>
+            </a:extLst>
+          </p:cNvPr>
+          <p:cNvSpPr txBox="1"/>
+          <p:nvPr/>
+        </p:nvSpPr>
+        <p:spPr>
+          <a:xfrm>
+            <a:off x="4668582" y="2575258"/>
+            <a:ext cx="3175256" cy="646331"/>
+          </a:xfrm>
+          <a:prstGeom prst="rect">
+            <a:avLst/>
+          </a:prstGeom>
+          <a:noFill/>
+        </p:spPr>
+        <p:txBody>
+          <a:bodyPr wrap="square" rtlCol="0">
+            <a:spAutoFit/>
+          </a:bodyPr>
+          <a:lstStyle/>
+          <a:p>
+            <a:r>
+              <a:rPr lang="en-US" dirty="0"/>
+              <a:t>Map port inside </a:t>
+            </a:r>
+            <a:r>
+              <a:rPr lang="en-US" dirty="0">
+                <a:solidFill>
+                  <a:schemeClr val="tx2"/>
+                </a:solidFill>
+              </a:rPr>
+              <a:t>container</a:t>
+            </a:r>
+            <a:r>
+              <a:rPr lang="en-US" dirty="0"/>
+              <a:t> to a port on the </a:t>
+            </a:r>
+            <a:r>
+              <a:rPr lang="en-US" dirty="0">
+                <a:solidFill>
+                  <a:schemeClr val="accent5"/>
+                </a:solidFill>
+              </a:rPr>
+              <a:t>host machine</a:t>
+            </a:r>
+          </a:p>
+        </p:txBody>
+      </p:sp>
+      <p:sp>
+        <p:nvSpPr>
+          <p:cNvPr id="8" name="Up Arrow 7">
+            <a:extLst>
+              <a:ext uri="{FF2B5EF4-FFF2-40B4-BE49-F238E27FC236}">
+                <a16:creationId xmlns:a16="http://schemas.microsoft.com/office/drawing/2014/main" id="{CE15EC6C-12C7-A7DC-1C15-93F9F55D5A16}"/>
+              </a:ext>
+            </a:extLst>
+          </p:cNvPr>
+          <p:cNvSpPr/>
+          <p:nvPr/>
+        </p:nvSpPr>
+        <p:spPr>
+          <a:xfrm rot="19557309">
+            <a:off x="7718719" y="4003701"/>
+            <a:ext cx="132080" cy="396240"/>
+          </a:xfrm>
+          <a:prstGeom prst="upArrow">
+            <a:avLst/>
+          </a:prstGeom>
+        </p:spPr>
+        <p:style>
+          <a:lnRef idx="2">
+            <a:schemeClr val="accent1">
+              <a:shade val="15000"/>
+            </a:schemeClr>
+          </a:lnRef>
+          <a:fillRef idx="1">
+            <a:schemeClr val="accent1"/>
+          </a:fillRef>
+          <a:effectRef idx="0">
+            <a:schemeClr val="accent1"/>
+          </a:effectRef>
+          <a:fontRef idx="minor">
+            <a:schemeClr val="lt1"/>
+          </a:fontRef>
+        </p:style>
+        <p:txBody>
+          <a:bodyPr rtlCol="0" anchor="ctr"/>
+          <a:lstStyle/>
+          <a:p>
+            <a:pPr algn="ctr"/>
+            <a:endParaRPr lang="en-US"/>
+          </a:p>
+        </p:txBody>
+      </p:sp>
+      <p:sp>
+        <p:nvSpPr>
+          <p:cNvPr id="9" name="TextBox 8">
+            <a:extLst>
+              <a:ext uri="{FF2B5EF4-FFF2-40B4-BE49-F238E27FC236}">
+                <a16:creationId xmlns:a16="http://schemas.microsoft.com/office/drawing/2014/main" id="{AA4A970A-9388-3079-3625-6586595AE5CA}"/>
+              </a:ext>
+            </a:extLst>
+          </p:cNvPr>
+          <p:cNvSpPr txBox="1"/>
+          <p:nvPr/>
+        </p:nvSpPr>
+        <p:spPr>
+          <a:xfrm>
+            <a:off x="7102082" y="4402956"/>
+            <a:ext cx="2684723" cy="1477328"/>
+          </a:xfrm>
+          <a:prstGeom prst="rect">
+            <a:avLst/>
+          </a:prstGeom>
+          <a:noFill/>
+        </p:spPr>
+        <p:txBody>
+          <a:bodyPr wrap="square" rtlCol="0">
+            <a:spAutoFit/>
+          </a:bodyPr>
+          <a:lstStyle/>
+          <a:p>
+            <a:r>
+              <a:rPr lang="en-US" dirty="0"/>
+              <a:t>Run this command inside the container. </a:t>
+            </a:r>
+          </a:p>
+          <a:p>
+            <a:endParaRPr lang="en-US" dirty="0"/>
+          </a:p>
+          <a:p>
+            <a:r>
+              <a:rPr lang="en-US" dirty="0"/>
+              <a:t>As if you </a:t>
+            </a:r>
+            <a:r>
+              <a:rPr lang="en-US" i="1" dirty="0"/>
+              <a:t>ssh</a:t>
+            </a:r>
+            <a:r>
+              <a:rPr lang="en-US" dirty="0"/>
+              <a:t> into a machine</a:t>
+            </a:r>
+          </a:p>
+        </p:txBody>
+      </p:sp>
+      <p:pic>
+        <p:nvPicPr>
+          <p:cNvPr id="11" name="Graphic 10" descr="Laptop with solid fill">
+            <a:extLst>
+              <a:ext uri="{FF2B5EF4-FFF2-40B4-BE49-F238E27FC236}">
+                <a16:creationId xmlns:a16="http://schemas.microsoft.com/office/drawing/2014/main" id="{8EEDB630-0539-4FB1-0665-57625AFDB7A8}"/>
+              </a:ext>
+            </a:extLst>
+          </p:cNvPr>
+          <p:cNvPicPr>
+            <a:picLocks noChangeAspect="1"/>
+          </p:cNvPicPr>
+          <p:nvPr/>
+        </p:nvPicPr>
+        <p:blipFill>
+          <a:blip r:embed="rId2">
+            <a:extLst>
+              <a:ext uri="{96DAC541-7B7A-43D3-8B79-37D633B846F1}">
+                <asvg:svgBlip xmlns:asvg="http://schemas.microsoft.com/office/drawing/2016/SVG/main" r:embed="rId3"/>
+              </a:ext>
+            </a:extLst>
+          </a:blip>
+          <a:stretch>
+            <a:fillRect/>
+          </a:stretch>
+        </p:blipFill>
+        <p:spPr>
+          <a:xfrm>
+            <a:off x="9191582" y="1497021"/>
+            <a:ext cx="988332" cy="988332"/>
+          </a:xfrm>
+          <a:prstGeom prst="rect">
+            <a:avLst/>
+          </a:prstGeom>
+        </p:spPr>
+      </p:pic>
+      <p:pic>
+        <p:nvPicPr>
+          <p:cNvPr id="15" name="Graphic 14" descr="Laptop outline">
+            <a:extLst>
+              <a:ext uri="{FF2B5EF4-FFF2-40B4-BE49-F238E27FC236}">
+                <a16:creationId xmlns:a16="http://schemas.microsoft.com/office/drawing/2014/main" id="{EB120499-2761-A967-DA19-CCD8A8E78E66}"/>
+              </a:ext>
+            </a:extLst>
+          </p:cNvPr>
+          <p:cNvPicPr>
+            <a:picLocks noChangeAspect="1"/>
+          </p:cNvPicPr>
+          <p:nvPr/>
+        </p:nvPicPr>
+        <p:blipFill>
+          <a:blip r:embed="rId4">
+            <a:extLst>
+              <a:ext uri="{96DAC541-7B7A-43D3-8B79-37D633B846F1}">
+                <asvg:svgBlip xmlns:asvg="http://schemas.microsoft.com/office/drawing/2016/SVG/main" r:embed="rId5"/>
+              </a:ext>
+            </a:extLst>
+          </a:blip>
+          <a:stretch>
+            <a:fillRect/>
+          </a:stretch>
+        </p:blipFill>
+        <p:spPr>
+          <a:xfrm>
+            <a:off x="8430254" y="353289"/>
+            <a:ext cx="3175256" cy="3175256"/>
+          </a:xfrm>
+          <a:prstGeom prst="rect">
+            <a:avLst/>
+          </a:prstGeom>
+        </p:spPr>
+      </p:pic>
+      <p:pic>
+        <p:nvPicPr>
+          <p:cNvPr id="17" name="Graphic 16" descr="Connected outline">
+            <a:extLst>
+              <a:ext uri="{FF2B5EF4-FFF2-40B4-BE49-F238E27FC236}">
+                <a16:creationId xmlns:a16="http://schemas.microsoft.com/office/drawing/2014/main" id="{6B9CB1FA-4A67-11E0-8E9D-F63D647B4134}"/>
+              </a:ext>
+            </a:extLst>
+          </p:cNvPr>
+          <p:cNvPicPr>
+            <a:picLocks noChangeAspect="1"/>
+          </p:cNvPicPr>
+          <p:nvPr/>
+        </p:nvPicPr>
+        <p:blipFill>
+          <a:blip r:embed="rId6">
+            <a:extLst>
+              <a:ext uri="{96DAC541-7B7A-43D3-8B79-37D633B846F1}">
+                <asvg:svgBlip xmlns:asvg="http://schemas.microsoft.com/office/drawing/2016/SVG/main" r:embed="rId7"/>
+              </a:ext>
+            </a:extLst>
+          </a:blip>
+          <a:stretch>
+            <a:fillRect/>
+          </a:stretch>
+        </p:blipFill>
+        <p:spPr>
+          <a:xfrm>
+            <a:off x="8532360" y="1218503"/>
+            <a:ext cx="988332" cy="914400"/>
+          </a:xfrm>
+          <a:prstGeom prst="rect">
+            <a:avLst/>
+          </a:prstGeom>
+        </p:spPr>
+      </p:pic>
+      <p:sp>
+        <p:nvSpPr>
+          <p:cNvPr id="18" name="Left Brace 17">
+            <a:extLst>
+              <a:ext uri="{FF2B5EF4-FFF2-40B4-BE49-F238E27FC236}">
+                <a16:creationId xmlns:a16="http://schemas.microsoft.com/office/drawing/2014/main" id="{CF508E86-508F-71A1-6817-A8C7AF3E2B87}"/>
+              </a:ext>
+            </a:extLst>
+          </p:cNvPr>
+          <p:cNvSpPr/>
+          <p:nvPr/>
+        </p:nvSpPr>
+        <p:spPr>
+          <a:xfrm rot="5400000">
+            <a:off x="5881807" y="2031743"/>
+            <a:ext cx="265844" cy="2692293"/>
+          </a:xfrm>
+          <a:prstGeom prst="leftBrace">
+            <a:avLst/>
+          </a:prstGeom>
+        </p:spPr>
+        <p:style>
+          <a:lnRef idx="1">
+            <a:schemeClr val="accent1"/>
+          </a:lnRef>
+          <a:fillRef idx="0">
+            <a:schemeClr val="accent1"/>
+          </a:fillRef>
+          <a:effectRef idx="0">
+            <a:schemeClr val="accent1"/>
+          </a:effectRef>
+          <a:fontRef idx="minor">
+            <a:schemeClr val="tx1"/>
+          </a:fontRef>
+        </p:style>
+        <p:txBody>
+          <a:bodyPr rtlCol="0" anchor="ctr"/>
+          <a:lstStyle/>
+          <a:p>
+            <a:pPr algn="ctr"/>
+            <a:endParaRPr lang="en-US"/>
+          </a:p>
+        </p:txBody>
+      </p:sp>
+    </p:spTree>
+    <p:extLst>
+      <p:ext uri="{BB962C8B-B14F-4D97-AF65-F5344CB8AC3E}">
+        <p14:creationId xmlns:p14="http://schemas.microsoft.com/office/powerpoint/2010/main" val="998803350"/>
+      </p:ext>
+    </p:extLst>
+  </p:cSld>
+  <p:clrMapOvr>
+    <a:masterClrMapping/>
+  </p:clrMapOvr>
+</p:sld>
+</file>
+
+<file path=ppt/slides/slide14.xml><?xml version="1.0" encoding="utf-8"?>
+<p:sld xmlns:a="http://schemas.openxmlformats.org/drawingml/2006/main" xmlns:r="http://schemas.openxmlformats.org/officeDocument/2006/relationships" xmlns:p="http://schemas.openxmlformats.org/presentationml/2006/main">
+  <p:cSld>
+    <p:spTree>
+      <p:nvGrpSpPr>
+        <p:cNvPr id="1" name="">
+          <a:extLst>
+            <a:ext uri="{FF2B5EF4-FFF2-40B4-BE49-F238E27FC236}">
+              <a16:creationId xmlns:a16="http://schemas.microsoft.com/office/drawing/2014/main" id="{BCC12E07-CDDE-9AD9-693F-75B51F19EE84}"/>
+            </a:ext>
+          </a:extLst>
+        </p:cNvPr>
+        <p:cNvGrpSpPr/>
+        <p:nvPr/>
+      </p:nvGrpSpPr>
+      <p:grpSpPr>
+        <a:xfrm>
+          <a:off x="0" y="0"/>
+          <a:ext cx="0" cy="0"/>
+          <a:chOff x="0" y="0"/>
+          <a:chExt cx="0" cy="0"/>
+        </a:xfrm>
+      </p:grpSpPr>
+      <p:sp>
+        <p:nvSpPr>
+          <p:cNvPr id="2" name="Title 1">
+            <a:extLst>
+              <a:ext uri="{FF2B5EF4-FFF2-40B4-BE49-F238E27FC236}">
+                <a16:creationId xmlns:a16="http://schemas.microsoft.com/office/drawing/2014/main" id="{2AC4F541-3A45-76BC-89AB-334A911AC025}"/>
+              </a:ext>
+            </a:extLst>
+          </p:cNvPr>
+          <p:cNvSpPr>
+            <a:spLocks noGrp="1"/>
+          </p:cNvSpPr>
+          <p:nvPr>
+            <p:ph type="title"/>
+          </p:nvPr>
+        </p:nvSpPr>
+        <p:spPr/>
+        <p:txBody>
+          <a:bodyPr/>
+          <a:lstStyle/>
+          <a:p>
+            <a:r>
+              <a:rPr lang="en-US" dirty="0"/>
+              <a:t>Share a folder between host and container</a:t>
+            </a:r>
+          </a:p>
+        </p:txBody>
+      </p:sp>
+      <p:sp>
+        <p:nvSpPr>
+          <p:cNvPr id="4" name="TextBox 3">
+            <a:extLst>
+              <a:ext uri="{FF2B5EF4-FFF2-40B4-BE49-F238E27FC236}">
+                <a16:creationId xmlns:a16="http://schemas.microsoft.com/office/drawing/2014/main" id="{0500CE66-37B2-5C03-7A6D-C6FFD43143E6}"/>
+              </a:ext>
+            </a:extLst>
+          </p:cNvPr>
+          <p:cNvSpPr txBox="1"/>
+          <p:nvPr/>
+        </p:nvSpPr>
+        <p:spPr>
+          <a:xfrm>
+            <a:off x="777240" y="3704770"/>
+            <a:ext cx="10637520" cy="319318"/>
+          </a:xfrm>
+          <a:prstGeom prst="rect">
+            <a:avLst/>
+          </a:prstGeom>
+          <a:noFill/>
+        </p:spPr>
+        <p:txBody>
+          <a:bodyPr wrap="square">
+            <a:spAutoFit/>
+          </a:bodyPr>
+          <a:lstStyle/>
+          <a:p>
+            <a:pPr>
+              <a:lnSpc>
+                <a:spcPts val="1425"/>
+              </a:lnSpc>
+            </a:pPr>
+            <a:r>
+              <a:rPr lang="en-US" sz="2800" b="1" dirty="0">
+                <a:solidFill>
+                  <a:srgbClr val="679C00"/>
+                </a:solidFill>
+                <a:effectLst/>
+                <a:latin typeface="Consolas" panose="020B0609020204030204" pitchFamily="49" charset="0"/>
+              </a:rPr>
+              <a:t>docker</a:t>
+            </a:r>
+            <a:r>
+              <a:rPr lang="en-US" sz="2800" b="1" dirty="0">
+                <a:solidFill>
+                  <a:srgbClr val="333333"/>
+                </a:solidFill>
+                <a:effectLst/>
+                <a:latin typeface="Consolas" panose="020B0609020204030204" pitchFamily="49" charset="0"/>
+              </a:rPr>
+              <a:t> </a:t>
+            </a:r>
+            <a:r>
+              <a:rPr lang="en-US" sz="2800" b="1" dirty="0">
+                <a:solidFill>
+                  <a:srgbClr val="998F2F"/>
+                </a:solidFill>
+                <a:effectLst/>
+                <a:latin typeface="Consolas" panose="020B0609020204030204" pitchFamily="49" charset="0"/>
+              </a:rPr>
+              <a:t>run</a:t>
+            </a:r>
+            <a:r>
+              <a:rPr lang="en-US" sz="2800" b="1" dirty="0">
+                <a:solidFill>
+                  <a:srgbClr val="333333"/>
+                </a:solidFill>
+                <a:effectLst/>
+                <a:latin typeface="Consolas" panose="020B0609020204030204" pitchFamily="49" charset="0"/>
+              </a:rPr>
+              <a:t> –d –v /host/path:/container/path </a:t>
+            </a:r>
+            <a:r>
+              <a:rPr lang="en-US" sz="2800" b="1" dirty="0" err="1">
+                <a:solidFill>
+                  <a:srgbClr val="998F2F"/>
+                </a:solidFill>
+                <a:effectLst/>
+                <a:latin typeface="Consolas" panose="020B0609020204030204" pitchFamily="49" charset="0"/>
+              </a:rPr>
+              <a:t>hello_app</a:t>
+            </a:r>
+            <a:endParaRPr lang="en-US" sz="2800" b="1" dirty="0">
+              <a:solidFill>
+                <a:schemeClr val="tx2"/>
+              </a:solidFill>
+              <a:effectLst/>
+              <a:latin typeface="Consolas" panose="020B0609020204030204" pitchFamily="49" charset="0"/>
+            </a:endParaRPr>
+          </a:p>
+        </p:txBody>
+      </p:sp>
+      <p:sp>
+        <p:nvSpPr>
+          <p:cNvPr id="5" name="TextBox 4">
+            <a:extLst>
+              <a:ext uri="{FF2B5EF4-FFF2-40B4-BE49-F238E27FC236}">
+                <a16:creationId xmlns:a16="http://schemas.microsoft.com/office/drawing/2014/main" id="{41E718A0-B54F-E156-2BB2-748BBB6680A0}"/>
+              </a:ext>
+            </a:extLst>
+          </p:cNvPr>
+          <p:cNvSpPr txBox="1"/>
+          <p:nvPr/>
+        </p:nvSpPr>
+        <p:spPr>
+          <a:xfrm>
+            <a:off x="4734326" y="4300360"/>
+            <a:ext cx="3797197" cy="646331"/>
+          </a:xfrm>
+          <a:prstGeom prst="rect">
+            <a:avLst/>
+          </a:prstGeom>
+          <a:noFill/>
+        </p:spPr>
+        <p:txBody>
+          <a:bodyPr wrap="square" rtlCol="0">
+            <a:spAutoFit/>
+          </a:bodyPr>
+          <a:lstStyle/>
+          <a:p>
+            <a:r>
+              <a:rPr lang="en-US" dirty="0"/>
+              <a:t>The volume flag shares a folder between the host and the container</a:t>
+            </a:r>
+          </a:p>
+        </p:txBody>
+      </p:sp>
+      <p:pic>
+        <p:nvPicPr>
+          <p:cNvPr id="15" name="Graphic 14" descr="Laptop with solid fill">
+            <a:extLst>
+              <a:ext uri="{FF2B5EF4-FFF2-40B4-BE49-F238E27FC236}">
+                <a16:creationId xmlns:a16="http://schemas.microsoft.com/office/drawing/2014/main" id="{45884F7D-B0FF-99B3-CE88-CB326108FE06}"/>
+              </a:ext>
+            </a:extLst>
+          </p:cNvPr>
+          <p:cNvPicPr>
+            <a:picLocks noChangeAspect="1"/>
+          </p:cNvPicPr>
+          <p:nvPr/>
+        </p:nvPicPr>
+        <p:blipFill>
+          <a:blip r:embed="rId2">
+            <a:extLst>
+              <a:ext uri="{96DAC541-7B7A-43D3-8B79-37D633B846F1}">
+                <asvg:svgBlip xmlns:asvg="http://schemas.microsoft.com/office/drawing/2016/SVG/main" r:embed="rId3"/>
+              </a:ext>
+            </a:extLst>
+          </a:blip>
+          <a:stretch>
+            <a:fillRect/>
+          </a:stretch>
+        </p:blipFill>
+        <p:spPr>
+          <a:xfrm>
+            <a:off x="9855816" y="1199278"/>
+            <a:ext cx="988332" cy="988332"/>
+          </a:xfrm>
+          <a:prstGeom prst="rect">
+            <a:avLst/>
+          </a:prstGeom>
+        </p:spPr>
+      </p:pic>
+      <p:pic>
+        <p:nvPicPr>
+          <p:cNvPr id="16" name="Graphic 15" descr="Laptop outline">
+            <a:extLst>
+              <a:ext uri="{FF2B5EF4-FFF2-40B4-BE49-F238E27FC236}">
+                <a16:creationId xmlns:a16="http://schemas.microsoft.com/office/drawing/2014/main" id="{E7394276-A013-2AEE-02CE-743D7B5B059C}"/>
+              </a:ext>
+            </a:extLst>
+          </p:cNvPr>
+          <p:cNvPicPr>
+            <a:picLocks noChangeAspect="1"/>
+          </p:cNvPicPr>
+          <p:nvPr/>
+        </p:nvPicPr>
+        <p:blipFill>
+          <a:blip r:embed="rId4">
+            <a:extLst>
+              <a:ext uri="{96DAC541-7B7A-43D3-8B79-37D633B846F1}">
+                <asvg:svgBlip xmlns:asvg="http://schemas.microsoft.com/office/drawing/2016/SVG/main" r:embed="rId5"/>
+              </a:ext>
+            </a:extLst>
+          </a:blip>
+          <a:stretch>
+            <a:fillRect/>
+          </a:stretch>
+        </p:blipFill>
+        <p:spPr>
+          <a:xfrm>
+            <a:off x="8430254" y="353289"/>
+            <a:ext cx="3175256" cy="3175256"/>
+          </a:xfrm>
+          <a:prstGeom prst="rect">
+            <a:avLst/>
+          </a:prstGeom>
+        </p:spPr>
+      </p:pic>
+      <p:pic>
+        <p:nvPicPr>
+          <p:cNvPr id="18" name="Graphic 17" descr="Database outline">
+            <a:extLst>
+              <a:ext uri="{FF2B5EF4-FFF2-40B4-BE49-F238E27FC236}">
+                <a16:creationId xmlns:a16="http://schemas.microsoft.com/office/drawing/2014/main" id="{D114FA06-82CF-50F9-27AF-BB20E0F6CAFE}"/>
+              </a:ext>
+            </a:extLst>
+          </p:cNvPr>
+          <p:cNvPicPr>
+            <a:picLocks noChangeAspect="1"/>
+          </p:cNvPicPr>
+          <p:nvPr/>
+        </p:nvPicPr>
+        <p:blipFill>
+          <a:blip r:embed="rId6">
+            <a:extLst>
+              <a:ext uri="{96DAC541-7B7A-43D3-8B79-37D633B846F1}">
+                <asvg:svgBlip xmlns:asvg="http://schemas.microsoft.com/office/drawing/2016/SVG/main" r:embed="rId7"/>
+              </a:ext>
+            </a:extLst>
+          </a:blip>
+          <a:stretch>
+            <a:fillRect/>
+          </a:stretch>
+        </p:blipFill>
+        <p:spPr>
+          <a:xfrm>
+            <a:off x="7211692" y="2018555"/>
+            <a:ext cx="914400" cy="914400"/>
+          </a:xfrm>
+          <a:prstGeom prst="rect">
+            <a:avLst/>
+          </a:prstGeom>
+        </p:spPr>
+      </p:pic>
+      <p:cxnSp>
+        <p:nvCxnSpPr>
+          <p:cNvPr id="20" name="Straight Arrow Connector 19">
+            <a:extLst>
+              <a:ext uri="{FF2B5EF4-FFF2-40B4-BE49-F238E27FC236}">
+                <a16:creationId xmlns:a16="http://schemas.microsoft.com/office/drawing/2014/main" id="{E18E5743-5B98-F242-AF03-54891B78F59C}"/>
+              </a:ext>
+            </a:extLst>
+          </p:cNvPr>
+          <p:cNvCxnSpPr/>
+          <p:nvPr/>
+        </p:nvCxnSpPr>
+        <p:spPr>
+          <a:xfrm>
+            <a:off x="8005313" y="2682815"/>
+            <a:ext cx="424941" cy="0"/>
+          </a:xfrm>
+          <a:prstGeom prst="straightConnector1">
+            <a:avLst/>
+          </a:prstGeom>
+          <a:ln>
+            <a:tailEnd type="triangle"/>
+          </a:ln>
+        </p:spPr>
+        <p:style>
+          <a:lnRef idx="1">
+            <a:schemeClr val="accent1"/>
+          </a:lnRef>
+          <a:fillRef idx="0">
+            <a:schemeClr val="accent1"/>
+          </a:fillRef>
+          <a:effectRef idx="0">
+            <a:schemeClr val="accent1"/>
+          </a:effectRef>
+          <a:fontRef idx="minor">
+            <a:schemeClr val="tx1"/>
+          </a:fontRef>
+        </p:style>
+      </p:cxnSp>
+      <p:cxnSp>
+        <p:nvCxnSpPr>
+          <p:cNvPr id="21" name="Straight Arrow Connector 20">
+            <a:extLst>
+              <a:ext uri="{FF2B5EF4-FFF2-40B4-BE49-F238E27FC236}">
+                <a16:creationId xmlns:a16="http://schemas.microsoft.com/office/drawing/2014/main" id="{3471E1AC-968A-7948-C93B-EFFDE0D5B1DC}"/>
+              </a:ext>
+            </a:extLst>
+          </p:cNvPr>
+          <p:cNvCxnSpPr>
+            <a:cxnSpLocks/>
+          </p:cNvCxnSpPr>
+          <p:nvPr/>
+        </p:nvCxnSpPr>
+        <p:spPr>
+          <a:xfrm flipV="1">
+            <a:off x="8005313" y="1950571"/>
+            <a:ext cx="1839316" cy="644132"/>
+          </a:xfrm>
+          <a:prstGeom prst="straightConnector1">
+            <a:avLst/>
+          </a:prstGeom>
+          <a:ln>
+            <a:tailEnd type="triangle"/>
+          </a:ln>
+        </p:spPr>
+        <p:style>
+          <a:lnRef idx="1">
+            <a:schemeClr val="accent1"/>
+          </a:lnRef>
+          <a:fillRef idx="0">
+            <a:schemeClr val="accent1"/>
+          </a:fillRef>
+          <a:effectRef idx="0">
+            <a:schemeClr val="accent1"/>
+          </a:effectRef>
+          <a:fontRef idx="minor">
+            <a:schemeClr val="tx1"/>
+          </a:fontRef>
+        </p:style>
+      </p:cxnSp>
+      <p:sp>
+        <p:nvSpPr>
+          <p:cNvPr id="23" name="Right Brace 22">
+            <a:extLst>
+              <a:ext uri="{FF2B5EF4-FFF2-40B4-BE49-F238E27FC236}">
+                <a16:creationId xmlns:a16="http://schemas.microsoft.com/office/drawing/2014/main" id="{B6DBE896-31F9-DA28-7163-E43B0006D428}"/>
+              </a:ext>
+            </a:extLst>
+          </p:cNvPr>
+          <p:cNvSpPr/>
+          <p:nvPr/>
+        </p:nvSpPr>
+        <p:spPr>
+          <a:xfrm rot="5400000">
+            <a:off x="6352406" y="1318380"/>
+            <a:ext cx="232914" cy="5627023"/>
+          </a:xfrm>
+          <a:prstGeom prst="rightBrace">
+            <a:avLst/>
+          </a:prstGeom>
+        </p:spPr>
+        <p:style>
+          <a:lnRef idx="1">
+            <a:schemeClr val="accent1"/>
+          </a:lnRef>
+          <a:fillRef idx="0">
+            <a:schemeClr val="accent1"/>
+          </a:fillRef>
+          <a:effectRef idx="0">
+            <a:schemeClr val="accent1"/>
+          </a:effectRef>
+          <a:fontRef idx="minor">
+            <a:schemeClr val="tx1"/>
+          </a:fontRef>
+        </p:style>
+        <p:txBody>
+          <a:bodyPr rtlCol="0" anchor="ctr"/>
+          <a:lstStyle/>
+          <a:p>
+            <a:pPr algn="ctr"/>
+            <a:endParaRPr lang="en-US"/>
+          </a:p>
+        </p:txBody>
+      </p:sp>
+    </p:spTree>
+    <p:extLst>
+      <p:ext uri="{BB962C8B-B14F-4D97-AF65-F5344CB8AC3E}">
+        <p14:creationId xmlns:p14="http://schemas.microsoft.com/office/powerpoint/2010/main" val="2991669465"/>
+      </p:ext>
+    </p:extLst>
+  </p:cSld>
+  <p:clrMapOvr>
+    <a:masterClrMapping/>
+  </p:clrMapOvr>
+</p:sld>
+</file>
+
+<file path=ppt/slides/slide15.xml><?xml version="1.0" encoding="utf-8"?>
+<p:sld xmlns:a="http://schemas.openxmlformats.org/drawingml/2006/main" xmlns:r="http://schemas.openxmlformats.org/officeDocument/2006/relationships" xmlns:p="http://schemas.openxmlformats.org/presentationml/2006/main">
+  <p:cSld>
+    <p:spTree>
+      <p:nvGrpSpPr>
+        <p:cNvPr id="1" name="">
+          <a:extLst>
+            <a:ext uri="{FF2B5EF4-FFF2-40B4-BE49-F238E27FC236}">
+              <a16:creationId xmlns:a16="http://schemas.microsoft.com/office/drawing/2014/main" id="{F04D0F50-CECC-9353-87D6-41A81A2B4F19}"/>
+            </a:ext>
+          </a:extLst>
+        </p:cNvPr>
+        <p:cNvGrpSpPr/>
+        <p:nvPr/>
+      </p:nvGrpSpPr>
+      <p:grpSpPr>
+        <a:xfrm>
+          <a:off x="0" y="0"/>
+          <a:ext cx="0" cy="0"/>
+          <a:chOff x="0" y="0"/>
+          <a:chExt cx="0" cy="0"/>
+        </a:xfrm>
+      </p:grpSpPr>
+      <p:sp>
+        <p:nvSpPr>
+          <p:cNvPr id="2" name="Title 1">
+            <a:extLst>
+              <a:ext uri="{FF2B5EF4-FFF2-40B4-BE49-F238E27FC236}">
+                <a16:creationId xmlns:a16="http://schemas.microsoft.com/office/drawing/2014/main" id="{511A0BC9-13F5-D2FB-42E8-9876589E7591}"/>
+              </a:ext>
+            </a:extLst>
+          </p:cNvPr>
+          <p:cNvSpPr>
+            <a:spLocks noGrp="1"/>
+          </p:cNvSpPr>
+          <p:nvPr>
+            <p:ph type="title"/>
+          </p:nvPr>
+        </p:nvSpPr>
+        <p:spPr/>
+        <p:txBody>
+          <a:bodyPr/>
+          <a:lstStyle/>
+          <a:p>
+            <a:r>
+              <a:rPr lang="en-US" dirty="0"/>
+              <a:t>“Push” your image to Docker Hub</a:t>
+            </a:r>
+          </a:p>
+        </p:txBody>
+      </p:sp>
+      <p:sp>
+        <p:nvSpPr>
+          <p:cNvPr id="3" name="Text Placeholder 2">
+            <a:extLst>
+              <a:ext uri="{FF2B5EF4-FFF2-40B4-BE49-F238E27FC236}">
+                <a16:creationId xmlns:a16="http://schemas.microsoft.com/office/drawing/2014/main" id="{201634F7-8D6F-438A-6192-933CB9D0A70D}"/>
+              </a:ext>
+            </a:extLst>
+          </p:cNvPr>
+          <p:cNvSpPr>
+            <a:spLocks noGrp="1"/>
+          </p:cNvSpPr>
+          <p:nvPr>
+            <p:ph type="body" idx="1"/>
+          </p:nvPr>
+        </p:nvSpPr>
+        <p:spPr/>
+        <p:txBody>
+          <a:bodyPr/>
+          <a:lstStyle/>
+          <a:p>
+            <a:r>
+              <a:rPr lang="en-US" dirty="0"/>
+              <a:t>And “pull” as well</a:t>
+            </a:r>
+          </a:p>
+        </p:txBody>
+      </p:sp>
+    </p:spTree>
+    <p:extLst>
+      <p:ext uri="{BB962C8B-B14F-4D97-AF65-F5344CB8AC3E}">
+        <p14:creationId xmlns:p14="http://schemas.microsoft.com/office/powerpoint/2010/main" val="2996435431"/>
+      </p:ext>
+    </p:extLst>
+  </p:cSld>
+  <p:clrMapOvr>
+    <a:masterClrMapping/>
+  </p:clrMapOvr>
+</p:sld>
+</file>
+
+<file path=ppt/slides/slide16.xml><?xml version="1.0" encoding="utf-8"?>
+<p:sld xmlns:a="http://schemas.openxmlformats.org/drawingml/2006/main" xmlns:r="http://schemas.openxmlformats.org/officeDocument/2006/relationships" xmlns:p="http://schemas.openxmlformats.org/presentationml/2006/main">
+  <p:cSld>
+    <p:spTree>
+      <p:nvGrpSpPr>
+        <p:cNvPr id="1" name=""/>
+        <p:cNvGrpSpPr/>
+        <p:nvPr/>
+      </p:nvGrpSpPr>
+      <p:grpSpPr>
+        <a:xfrm>
+          <a:off x="0" y="0"/>
+          <a:ext cx="0" cy="0"/>
+          <a:chOff x="0" y="0"/>
+          <a:chExt cx="0" cy="0"/>
+        </a:xfrm>
+      </p:grpSpPr>
+      <p:sp>
+        <p:nvSpPr>
+          <p:cNvPr id="2" name="Title 1">
+            <a:extLst>
+              <a:ext uri="{FF2B5EF4-FFF2-40B4-BE49-F238E27FC236}">
+                <a16:creationId xmlns:a16="http://schemas.microsoft.com/office/drawing/2014/main" id="{5F8FEDA5-FB5C-220A-90C6-60F4684BEA95}"/>
+              </a:ext>
+            </a:extLst>
+          </p:cNvPr>
+          <p:cNvSpPr>
+            <a:spLocks noGrp="1"/>
+          </p:cNvSpPr>
+          <p:nvPr>
+            <p:ph type="title"/>
+          </p:nvPr>
+        </p:nvSpPr>
+        <p:spPr/>
+        <p:txBody>
+          <a:bodyPr/>
+          <a:lstStyle/>
+          <a:p>
+            <a:r>
+              <a:rPr lang="en-US" dirty="0" err="1">
+                <a:solidFill>
+                  <a:schemeClr val="tx2"/>
+                </a:solidFill>
+              </a:rPr>
+              <a:t>Hub.docker.com</a:t>
+            </a:r>
+            <a:r>
+              <a:rPr lang="en-US" dirty="0">
+                <a:solidFill>
+                  <a:schemeClr val="tx2"/>
+                </a:solidFill>
+              </a:rPr>
+              <a:t> </a:t>
+            </a:r>
+            <a:r>
+              <a:rPr lang="en-US" dirty="0"/>
+              <a:t>is one of many public docker repos</a:t>
+            </a:r>
+          </a:p>
+        </p:txBody>
+      </p:sp>
+      <p:pic>
+        <p:nvPicPr>
+          <p:cNvPr id="3" name="Picture 2">
+            <a:extLst>
+              <a:ext uri="{FF2B5EF4-FFF2-40B4-BE49-F238E27FC236}">
+                <a16:creationId xmlns:a16="http://schemas.microsoft.com/office/drawing/2014/main" id="{08AADA56-BB02-728B-D61A-DDFA87EFB0FB}"/>
+              </a:ext>
+            </a:extLst>
+          </p:cNvPr>
+          <p:cNvPicPr>
+            <a:picLocks noChangeAspect="1"/>
+          </p:cNvPicPr>
+          <p:nvPr/>
+        </p:nvPicPr>
+        <p:blipFill>
+          <a:blip r:embed="rId2"/>
+          <a:stretch>
+            <a:fillRect/>
+          </a:stretch>
+        </p:blipFill>
+        <p:spPr>
+          <a:xfrm>
+            <a:off x="3833110" y="2061149"/>
+            <a:ext cx="7772400" cy="3392926"/>
+          </a:xfrm>
+          <a:prstGeom prst="rect">
+            <a:avLst/>
+          </a:prstGeom>
+          <a:ln>
+            <a:noFill/>
+          </a:ln>
+          <a:effectLst>
+            <a:outerShdw blurRad="292100" dist="139700" dir="2700000" algn="tl" rotWithShape="0">
+              <a:srgbClr val="333333">
+                <a:alpha val="65000"/>
+              </a:srgbClr>
+            </a:outerShdw>
+          </a:effectLst>
+        </p:spPr>
+      </p:pic>
+      <p:pic>
+        <p:nvPicPr>
+          <p:cNvPr id="5" name="Graphic 4" descr="Laptop outline">
+            <a:extLst>
+              <a:ext uri="{FF2B5EF4-FFF2-40B4-BE49-F238E27FC236}">
+                <a16:creationId xmlns:a16="http://schemas.microsoft.com/office/drawing/2014/main" id="{10319B9F-7E89-36EF-0293-C1EF627D097B}"/>
+              </a:ext>
+            </a:extLst>
+          </p:cNvPr>
+          <p:cNvPicPr>
+            <a:picLocks noChangeAspect="1"/>
+          </p:cNvPicPr>
+          <p:nvPr/>
+        </p:nvPicPr>
+        <p:blipFill>
+          <a:blip r:embed="rId3">
+            <a:extLst>
+              <a:ext uri="{96DAC541-7B7A-43D3-8B79-37D633B846F1}">
+                <asvg:svgBlip xmlns:asvg="http://schemas.microsoft.com/office/drawing/2016/SVG/main" r:embed="rId4"/>
+              </a:ext>
+            </a:extLst>
+          </a:blip>
+          <a:stretch>
+            <a:fillRect/>
+          </a:stretch>
+        </p:blipFill>
+        <p:spPr>
+          <a:xfrm>
+            <a:off x="695872" y="3290977"/>
+            <a:ext cx="477321" cy="477321"/>
+          </a:xfrm>
+          <a:prstGeom prst="rect">
+            <a:avLst/>
+          </a:prstGeom>
+        </p:spPr>
+      </p:pic>
+      <p:pic>
+        <p:nvPicPr>
+          <p:cNvPr id="7" name="Graphic 6" descr="Server outline">
+            <a:extLst>
+              <a:ext uri="{FF2B5EF4-FFF2-40B4-BE49-F238E27FC236}">
+                <a16:creationId xmlns:a16="http://schemas.microsoft.com/office/drawing/2014/main" id="{A188CD55-4A44-7533-1014-084063434C8A}"/>
+              </a:ext>
+            </a:extLst>
+          </p:cNvPr>
+          <p:cNvPicPr>
+            <a:picLocks noChangeAspect="1"/>
+          </p:cNvPicPr>
+          <p:nvPr/>
+        </p:nvPicPr>
+        <p:blipFill>
+          <a:blip r:embed="rId5">
+            <a:extLst>
+              <a:ext uri="{96DAC541-7B7A-43D3-8B79-37D633B846F1}">
+                <asvg:svgBlip xmlns:asvg="http://schemas.microsoft.com/office/drawing/2016/SVG/main" r:embed="rId6"/>
+              </a:ext>
+            </a:extLst>
+          </a:blip>
+          <a:stretch>
+            <a:fillRect/>
+          </a:stretch>
+        </p:blipFill>
+        <p:spPr>
+          <a:xfrm>
+            <a:off x="1588752" y="2169544"/>
+            <a:ext cx="914400" cy="914400"/>
+          </a:xfrm>
+          <a:prstGeom prst="rect">
+            <a:avLst/>
+          </a:prstGeom>
+        </p:spPr>
+      </p:pic>
+      <p:pic>
+        <p:nvPicPr>
+          <p:cNvPr id="9" name="Graphic 8" descr="Laptop outline">
+            <a:extLst>
+              <a:ext uri="{FF2B5EF4-FFF2-40B4-BE49-F238E27FC236}">
+                <a16:creationId xmlns:a16="http://schemas.microsoft.com/office/drawing/2014/main" id="{F15D6982-3D26-9D95-EFAD-C5F529D18CC6}"/>
+              </a:ext>
+            </a:extLst>
+          </p:cNvPr>
+          <p:cNvPicPr>
+            <a:picLocks noChangeAspect="1"/>
+          </p:cNvPicPr>
+          <p:nvPr/>
+        </p:nvPicPr>
+        <p:blipFill>
+          <a:blip r:embed="rId3">
+            <a:extLst>
+              <a:ext uri="{96DAC541-7B7A-43D3-8B79-37D633B846F1}">
+                <asvg:svgBlip xmlns:asvg="http://schemas.microsoft.com/office/drawing/2016/SVG/main" r:embed="rId4"/>
+              </a:ext>
+            </a:extLst>
+          </a:blip>
+          <a:stretch>
+            <a:fillRect/>
+          </a:stretch>
+        </p:blipFill>
+        <p:spPr>
+          <a:xfrm>
+            <a:off x="2476970" y="4404182"/>
+            <a:ext cx="477321" cy="477321"/>
+          </a:xfrm>
+          <a:prstGeom prst="rect">
+            <a:avLst/>
+          </a:prstGeom>
+        </p:spPr>
+      </p:pic>
+      <p:pic>
+        <p:nvPicPr>
+          <p:cNvPr id="10" name="Graphic 9" descr="Laptop outline">
+            <a:extLst>
+              <a:ext uri="{FF2B5EF4-FFF2-40B4-BE49-F238E27FC236}">
+                <a16:creationId xmlns:a16="http://schemas.microsoft.com/office/drawing/2014/main" id="{6DCD4242-2D98-E9A2-B4F5-6916E1F243CF}"/>
+              </a:ext>
+            </a:extLst>
+          </p:cNvPr>
+          <p:cNvPicPr>
+            <a:picLocks noChangeAspect="1"/>
+          </p:cNvPicPr>
+          <p:nvPr/>
+        </p:nvPicPr>
+        <p:blipFill>
+          <a:blip r:embed="rId3">
+            <a:extLst>
+              <a:ext uri="{96DAC541-7B7A-43D3-8B79-37D633B846F1}">
+                <asvg:svgBlip xmlns:asvg="http://schemas.microsoft.com/office/drawing/2016/SVG/main" r:embed="rId4"/>
+              </a:ext>
+            </a:extLst>
+          </a:blip>
+          <a:stretch>
+            <a:fillRect/>
+          </a:stretch>
+        </p:blipFill>
+        <p:spPr>
+          <a:xfrm>
+            <a:off x="1709444" y="4419690"/>
+            <a:ext cx="477321" cy="477321"/>
+          </a:xfrm>
+          <a:prstGeom prst="rect">
+            <a:avLst/>
+          </a:prstGeom>
+        </p:spPr>
+      </p:pic>
+      <p:pic>
+        <p:nvPicPr>
+          <p:cNvPr id="11" name="Graphic 10" descr="Laptop outline">
+            <a:extLst>
+              <a:ext uri="{FF2B5EF4-FFF2-40B4-BE49-F238E27FC236}">
+                <a16:creationId xmlns:a16="http://schemas.microsoft.com/office/drawing/2014/main" id="{E1738949-BA23-D2E8-1CD4-3370AA75DB1E}"/>
+              </a:ext>
+            </a:extLst>
+          </p:cNvPr>
+          <p:cNvPicPr>
+            <a:picLocks noChangeAspect="1"/>
+          </p:cNvPicPr>
+          <p:nvPr/>
+        </p:nvPicPr>
+        <p:blipFill>
+          <a:blip r:embed="rId3">
+            <a:extLst>
+              <a:ext uri="{96DAC541-7B7A-43D3-8B79-37D633B846F1}">
+                <asvg:svgBlip xmlns:asvg="http://schemas.microsoft.com/office/drawing/2016/SVG/main" r:embed="rId4"/>
+              </a:ext>
+            </a:extLst>
+          </a:blip>
+          <a:stretch>
+            <a:fillRect/>
+          </a:stretch>
+        </p:blipFill>
+        <p:spPr>
+          <a:xfrm>
+            <a:off x="1470784" y="3834437"/>
+            <a:ext cx="477321" cy="477321"/>
+          </a:xfrm>
+          <a:prstGeom prst="rect">
+            <a:avLst/>
+          </a:prstGeom>
+        </p:spPr>
+      </p:pic>
+      <p:pic>
+        <p:nvPicPr>
+          <p:cNvPr id="12" name="Graphic 11" descr="Laptop outline">
+            <a:extLst>
+              <a:ext uri="{FF2B5EF4-FFF2-40B4-BE49-F238E27FC236}">
+                <a16:creationId xmlns:a16="http://schemas.microsoft.com/office/drawing/2014/main" id="{28168382-C34C-6C53-504D-3FA11084B7D4}"/>
+              </a:ext>
+            </a:extLst>
+          </p:cNvPr>
+          <p:cNvPicPr>
+            <a:picLocks noChangeAspect="1"/>
+          </p:cNvPicPr>
+          <p:nvPr/>
+        </p:nvPicPr>
+        <p:blipFill>
+          <a:blip r:embed="rId3">
+            <a:extLst>
+              <a:ext uri="{96DAC541-7B7A-43D3-8B79-37D633B846F1}">
+                <asvg:svgBlip xmlns:asvg="http://schemas.microsoft.com/office/drawing/2016/SVG/main" r:embed="rId4"/>
+              </a:ext>
+            </a:extLst>
+          </a:blip>
+          <a:stretch>
+            <a:fillRect/>
+          </a:stretch>
+        </p:blipFill>
+        <p:spPr>
+          <a:xfrm>
+            <a:off x="2053107" y="3834437"/>
+            <a:ext cx="477321" cy="477321"/>
+          </a:xfrm>
+          <a:prstGeom prst="rect">
+            <a:avLst/>
+          </a:prstGeom>
+        </p:spPr>
+      </p:pic>
+      <p:pic>
+        <p:nvPicPr>
+          <p:cNvPr id="13" name="Graphic 12" descr="Laptop outline">
+            <a:extLst>
+              <a:ext uri="{FF2B5EF4-FFF2-40B4-BE49-F238E27FC236}">
+                <a16:creationId xmlns:a16="http://schemas.microsoft.com/office/drawing/2014/main" id="{E21ECF47-4516-B78D-3FDC-D2D43F998A7B}"/>
+              </a:ext>
+            </a:extLst>
+          </p:cNvPr>
+          <p:cNvPicPr>
+            <a:picLocks noChangeAspect="1"/>
+          </p:cNvPicPr>
+          <p:nvPr/>
+        </p:nvPicPr>
+        <p:blipFill>
+          <a:blip r:embed="rId3">
+            <a:extLst>
+              <a:ext uri="{96DAC541-7B7A-43D3-8B79-37D633B846F1}">
+                <asvg:svgBlip xmlns:asvg="http://schemas.microsoft.com/office/drawing/2016/SVG/main" r:embed="rId4"/>
+              </a:ext>
+            </a:extLst>
+          </a:blip>
+          <a:stretch>
+            <a:fillRect/>
+          </a:stretch>
+        </p:blipFill>
+        <p:spPr>
+          <a:xfrm>
+            <a:off x="2635430" y="3834437"/>
+            <a:ext cx="477321" cy="477321"/>
+          </a:xfrm>
+          <a:prstGeom prst="rect">
+            <a:avLst/>
+          </a:prstGeom>
+        </p:spPr>
+      </p:pic>
+      <p:cxnSp>
+        <p:nvCxnSpPr>
+          <p:cNvPr id="15" name="Straight Arrow Connector 14">
+            <a:extLst>
+              <a:ext uri="{FF2B5EF4-FFF2-40B4-BE49-F238E27FC236}">
+                <a16:creationId xmlns:a16="http://schemas.microsoft.com/office/drawing/2014/main" id="{4A47D8C2-F9CF-B22A-3E06-C27914868025}"/>
+              </a:ext>
+            </a:extLst>
+          </p:cNvPr>
+          <p:cNvCxnSpPr>
+            <a:stCxn id="5" idx="0"/>
+          </p:cNvCxnSpPr>
+          <p:nvPr/>
+        </p:nvCxnSpPr>
+        <p:spPr>
+          <a:xfrm flipV="1">
+            <a:off x="934533" y="2626744"/>
+            <a:ext cx="715673" cy="664233"/>
+          </a:xfrm>
+          <a:prstGeom prst="straightConnector1">
+            <a:avLst/>
+          </a:prstGeom>
+          <a:ln>
+            <a:tailEnd type="triangle"/>
+          </a:ln>
+        </p:spPr>
+        <p:style>
+          <a:lnRef idx="1">
+            <a:schemeClr val="accent1"/>
+          </a:lnRef>
+          <a:fillRef idx="0">
+            <a:schemeClr val="accent1"/>
+          </a:fillRef>
+          <a:effectRef idx="0">
+            <a:schemeClr val="accent1"/>
+          </a:effectRef>
+          <a:fontRef idx="minor">
+            <a:schemeClr val="tx1"/>
+          </a:fontRef>
+        </p:style>
+      </p:cxnSp>
+      <p:cxnSp>
+        <p:nvCxnSpPr>
+          <p:cNvPr id="17" name="Straight Arrow Connector 16">
+            <a:extLst>
+              <a:ext uri="{FF2B5EF4-FFF2-40B4-BE49-F238E27FC236}">
+                <a16:creationId xmlns:a16="http://schemas.microsoft.com/office/drawing/2014/main" id="{9B9F7D14-DC83-2E87-8460-6A1CC0FD3D61}"/>
+              </a:ext>
+            </a:extLst>
+          </p:cNvPr>
+          <p:cNvCxnSpPr>
+            <a:endCxn id="11" idx="0"/>
+          </p:cNvCxnSpPr>
+          <p:nvPr/>
+        </p:nvCxnSpPr>
+        <p:spPr>
+          <a:xfrm flipH="1">
+            <a:off x="1709445" y="3028950"/>
+            <a:ext cx="238659" cy="805487"/>
+          </a:xfrm>
+          <a:prstGeom prst="straightConnector1">
+            <a:avLst/>
+          </a:prstGeom>
+          <a:ln>
+            <a:tailEnd type="triangle"/>
+          </a:ln>
+        </p:spPr>
+        <p:style>
+          <a:lnRef idx="1">
+            <a:schemeClr val="accent1"/>
+          </a:lnRef>
+          <a:fillRef idx="0">
+            <a:schemeClr val="accent1"/>
+          </a:fillRef>
+          <a:effectRef idx="0">
+            <a:schemeClr val="accent1"/>
+          </a:effectRef>
+          <a:fontRef idx="minor">
+            <a:schemeClr val="tx1"/>
+          </a:fontRef>
+        </p:style>
+      </p:cxnSp>
+      <p:cxnSp>
+        <p:nvCxnSpPr>
+          <p:cNvPr id="18" name="Straight Arrow Connector 17">
+            <a:extLst>
+              <a:ext uri="{FF2B5EF4-FFF2-40B4-BE49-F238E27FC236}">
+                <a16:creationId xmlns:a16="http://schemas.microsoft.com/office/drawing/2014/main" id="{073682DF-9DEA-99C8-1D64-179631984ED9}"/>
+              </a:ext>
+            </a:extLst>
+          </p:cNvPr>
+          <p:cNvCxnSpPr>
+            <a:cxnSpLocks/>
+          </p:cNvCxnSpPr>
+          <p:nvPr/>
+        </p:nvCxnSpPr>
+        <p:spPr>
+          <a:xfrm>
+            <a:off x="2089781" y="3053736"/>
+            <a:ext cx="201986" cy="780701"/>
+          </a:xfrm>
+          <a:prstGeom prst="straightConnector1">
+            <a:avLst/>
+          </a:prstGeom>
+          <a:ln>
+            <a:tailEnd type="triangle"/>
+          </a:ln>
+        </p:spPr>
+        <p:style>
+          <a:lnRef idx="1">
+            <a:schemeClr val="accent1"/>
+          </a:lnRef>
+          <a:fillRef idx="0">
+            <a:schemeClr val="accent1"/>
+          </a:fillRef>
+          <a:effectRef idx="0">
+            <a:schemeClr val="accent1"/>
+          </a:effectRef>
+          <a:fontRef idx="minor">
+            <a:schemeClr val="tx1"/>
+          </a:fontRef>
+        </p:style>
+      </p:cxnSp>
+      <p:cxnSp>
+        <p:nvCxnSpPr>
+          <p:cNvPr id="20" name="Straight Arrow Connector 19">
+            <a:extLst>
+              <a:ext uri="{FF2B5EF4-FFF2-40B4-BE49-F238E27FC236}">
+                <a16:creationId xmlns:a16="http://schemas.microsoft.com/office/drawing/2014/main" id="{5D261342-F7EF-148D-A2BF-6245F4DC29CF}"/>
+              </a:ext>
+            </a:extLst>
+          </p:cNvPr>
+          <p:cNvCxnSpPr>
+            <a:cxnSpLocks/>
+            <a:endCxn id="13" idx="0"/>
+          </p:cNvCxnSpPr>
+          <p:nvPr/>
+        </p:nvCxnSpPr>
+        <p:spPr>
+          <a:xfrm>
+            <a:off x="2220263" y="3038649"/>
+            <a:ext cx="653828" cy="795788"/>
+          </a:xfrm>
+          <a:prstGeom prst="straightConnector1">
+            <a:avLst/>
+          </a:prstGeom>
+          <a:ln>
+            <a:tailEnd type="triangle"/>
+          </a:ln>
+        </p:spPr>
+        <p:style>
+          <a:lnRef idx="1">
+            <a:schemeClr val="accent1"/>
+          </a:lnRef>
+          <a:fillRef idx="0">
+            <a:schemeClr val="accent1"/>
+          </a:fillRef>
+          <a:effectRef idx="0">
+            <a:schemeClr val="accent1"/>
+          </a:effectRef>
+          <a:fontRef idx="minor">
+            <a:schemeClr val="tx1"/>
+          </a:fontRef>
+        </p:style>
+      </p:cxnSp>
+      <p:cxnSp>
+        <p:nvCxnSpPr>
+          <p:cNvPr id="22" name="Straight Arrow Connector 21">
+            <a:extLst>
+              <a:ext uri="{FF2B5EF4-FFF2-40B4-BE49-F238E27FC236}">
+                <a16:creationId xmlns:a16="http://schemas.microsoft.com/office/drawing/2014/main" id="{4A14C503-5700-40A6-9B22-677D83BB8573}"/>
+              </a:ext>
+            </a:extLst>
+          </p:cNvPr>
+          <p:cNvCxnSpPr>
+            <a:cxnSpLocks/>
+          </p:cNvCxnSpPr>
+          <p:nvPr/>
+        </p:nvCxnSpPr>
+        <p:spPr>
+          <a:xfrm flipH="1">
+            <a:off x="1992554" y="3053736"/>
+            <a:ext cx="37541" cy="1365954"/>
+          </a:xfrm>
+          <a:prstGeom prst="straightConnector1">
+            <a:avLst/>
+          </a:prstGeom>
+          <a:ln>
+            <a:tailEnd type="triangle"/>
+          </a:ln>
+        </p:spPr>
+        <p:style>
+          <a:lnRef idx="1">
+            <a:schemeClr val="accent1"/>
+          </a:lnRef>
+          <a:fillRef idx="0">
+            <a:schemeClr val="accent1"/>
+          </a:fillRef>
+          <a:effectRef idx="0">
+            <a:schemeClr val="accent1"/>
+          </a:effectRef>
+          <a:fontRef idx="minor">
+            <a:schemeClr val="tx1"/>
+          </a:fontRef>
+        </p:style>
+      </p:cxnSp>
+      <p:cxnSp>
+        <p:nvCxnSpPr>
+          <p:cNvPr id="25" name="Straight Arrow Connector 24">
+            <a:extLst>
+              <a:ext uri="{FF2B5EF4-FFF2-40B4-BE49-F238E27FC236}">
+                <a16:creationId xmlns:a16="http://schemas.microsoft.com/office/drawing/2014/main" id="{BF422DBB-0388-1E3A-481E-8BE3E6F5CE17}"/>
+              </a:ext>
+            </a:extLst>
+          </p:cNvPr>
+          <p:cNvCxnSpPr>
+            <a:cxnSpLocks/>
+          </p:cNvCxnSpPr>
+          <p:nvPr/>
+        </p:nvCxnSpPr>
+        <p:spPr>
+          <a:xfrm>
+            <a:off x="2160577" y="3053736"/>
+            <a:ext cx="547509" cy="1365954"/>
+          </a:xfrm>
+          <a:prstGeom prst="straightConnector1">
+            <a:avLst/>
+          </a:prstGeom>
+          <a:ln>
+            <a:tailEnd type="triangle"/>
+          </a:ln>
+        </p:spPr>
+        <p:style>
+          <a:lnRef idx="1">
+            <a:schemeClr val="accent1"/>
+          </a:lnRef>
+          <a:fillRef idx="0">
+            <a:schemeClr val="accent1"/>
+          </a:fillRef>
+          <a:effectRef idx="0">
+            <a:schemeClr val="accent1"/>
+          </a:effectRef>
+          <a:fontRef idx="minor">
+            <a:schemeClr val="tx1"/>
+          </a:fontRef>
+        </p:style>
+      </p:cxnSp>
+      <p:sp>
+        <p:nvSpPr>
+          <p:cNvPr id="28" name="TextBox 27">
+            <a:extLst>
+              <a:ext uri="{FF2B5EF4-FFF2-40B4-BE49-F238E27FC236}">
+                <a16:creationId xmlns:a16="http://schemas.microsoft.com/office/drawing/2014/main" id="{EDBFC8FB-9DB4-E7F7-B80B-9E8F19DCFAD8}"/>
+              </a:ext>
+            </a:extLst>
+          </p:cNvPr>
+          <p:cNvSpPr txBox="1"/>
+          <p:nvPr/>
+        </p:nvSpPr>
+        <p:spPr>
+          <a:xfrm rot="18986538">
+            <a:off x="695604" y="2747711"/>
+            <a:ext cx="960519" cy="246221"/>
+          </a:xfrm>
+          <a:prstGeom prst="rect">
+            <a:avLst/>
+          </a:prstGeom>
+          <a:noFill/>
+        </p:spPr>
+        <p:txBody>
+          <a:bodyPr wrap="none" rtlCol="0">
+            <a:spAutoFit/>
+          </a:bodyPr>
+          <a:lstStyle/>
+          <a:p>
+            <a:r>
+              <a:rPr lang="en-US" sz="1000" dirty="0">
+                <a:latin typeface="Consolas" panose="020B0609020204030204" pitchFamily="49" charset="0"/>
+                <a:cs typeface="Consolas" panose="020B0609020204030204" pitchFamily="49" charset="0"/>
+              </a:rPr>
+              <a:t>docker push</a:t>
+            </a:r>
+          </a:p>
+        </p:txBody>
+      </p:sp>
+      <p:sp>
+        <p:nvSpPr>
+          <p:cNvPr id="29" name="TextBox 28">
+            <a:extLst>
+              <a:ext uri="{FF2B5EF4-FFF2-40B4-BE49-F238E27FC236}">
+                <a16:creationId xmlns:a16="http://schemas.microsoft.com/office/drawing/2014/main" id="{B3BA792C-B0EF-56A4-92F0-AB645EDCC8D7}"/>
+              </a:ext>
+            </a:extLst>
+          </p:cNvPr>
+          <p:cNvSpPr txBox="1"/>
+          <p:nvPr/>
+        </p:nvSpPr>
+        <p:spPr>
+          <a:xfrm>
+            <a:off x="1727353" y="3410949"/>
+            <a:ext cx="960519" cy="246221"/>
+          </a:xfrm>
+          <a:prstGeom prst="rect">
+            <a:avLst/>
+          </a:prstGeom>
+          <a:noFill/>
+        </p:spPr>
+        <p:txBody>
+          <a:bodyPr wrap="none" rtlCol="0">
+            <a:spAutoFit/>
+          </a:bodyPr>
+          <a:lstStyle/>
+          <a:p>
+            <a:r>
+              <a:rPr lang="en-US" sz="1000" dirty="0">
+                <a:latin typeface="Consolas" panose="020B0609020204030204" pitchFamily="49" charset="0"/>
+                <a:cs typeface="Consolas" panose="020B0609020204030204" pitchFamily="49" charset="0"/>
+              </a:rPr>
+              <a:t>docker pull</a:t>
+            </a:r>
+          </a:p>
+        </p:txBody>
+      </p:sp>
+      <p:sp>
+        <p:nvSpPr>
+          <p:cNvPr id="30" name="Down Arrow 29">
+            <a:extLst>
+              <a:ext uri="{FF2B5EF4-FFF2-40B4-BE49-F238E27FC236}">
+                <a16:creationId xmlns:a16="http://schemas.microsoft.com/office/drawing/2014/main" id="{721EA1D1-9DD9-957A-C66A-54451CA3BD01}"/>
+              </a:ext>
+            </a:extLst>
+          </p:cNvPr>
+          <p:cNvSpPr/>
+          <p:nvPr/>
+        </p:nvSpPr>
+        <p:spPr>
+          <a:xfrm rot="1279297">
+            <a:off x="11000161" y="2867522"/>
+            <a:ext cx="185737" cy="428625"/>
+          </a:xfrm>
+          <a:prstGeom prst="downArrow">
+            <a:avLst/>
+          </a:prstGeom>
+        </p:spPr>
+        <p:style>
+          <a:lnRef idx="2">
+            <a:schemeClr val="accent1">
+              <a:shade val="15000"/>
+            </a:schemeClr>
+          </a:lnRef>
+          <a:fillRef idx="1">
+            <a:schemeClr val="accent1"/>
+          </a:fillRef>
+          <a:effectRef idx="0">
+            <a:schemeClr val="accent1"/>
+          </a:effectRef>
+          <a:fontRef idx="minor">
+            <a:schemeClr val="lt1"/>
+          </a:fontRef>
+        </p:style>
+        <p:txBody>
+          <a:bodyPr rtlCol="0" anchor="ctr"/>
+          <a:lstStyle/>
+          <a:p>
+            <a:pPr algn="ctr"/>
+            <a:endParaRPr lang="en-US"/>
+          </a:p>
+        </p:txBody>
+      </p:sp>
+    </p:spTree>
+    <p:extLst>
+      <p:ext uri="{BB962C8B-B14F-4D97-AF65-F5344CB8AC3E}">
+        <p14:creationId xmlns:p14="http://schemas.microsoft.com/office/powerpoint/2010/main" val="3996101465"/>
+      </p:ext>
+    </p:extLst>
+  </p:cSld>
+  <p:clrMapOvr>
+    <a:masterClrMapping/>
+  </p:clrMapOvr>
+</p:sld>
+</file>
+
+<file path=ppt/slides/slide17.xml><?xml version="1.0" encoding="utf-8"?>
+<p:sld xmlns:a="http://schemas.openxmlformats.org/drawingml/2006/main" xmlns:r="http://schemas.openxmlformats.org/officeDocument/2006/relationships" xmlns:p="http://schemas.openxmlformats.org/presentationml/2006/main">
+  <p:cSld>
+    <p:spTree>
+      <p:nvGrpSpPr>
+        <p:cNvPr id="1" name=""/>
+        <p:cNvGrpSpPr/>
+        <p:nvPr/>
+      </p:nvGrpSpPr>
+      <p:grpSpPr>
+        <a:xfrm>
+          <a:off x="0" y="0"/>
+          <a:ext cx="0" cy="0"/>
+          <a:chOff x="0" y="0"/>
+          <a:chExt cx="0" cy="0"/>
+        </a:xfrm>
+      </p:grpSpPr>
+      <p:sp>
+        <p:nvSpPr>
+          <p:cNvPr id="2" name="Title 1">
+            <a:extLst>
+              <a:ext uri="{FF2B5EF4-FFF2-40B4-BE49-F238E27FC236}">
+                <a16:creationId xmlns:a16="http://schemas.microsoft.com/office/drawing/2014/main" id="{A74E9B5C-8491-5C8E-2F71-104E6AAF8ACB}"/>
+              </a:ext>
+            </a:extLst>
+          </p:cNvPr>
+          <p:cNvSpPr>
+            <a:spLocks noGrp="1"/>
+          </p:cNvSpPr>
+          <p:nvPr>
+            <p:ph type="title"/>
+          </p:nvPr>
+        </p:nvSpPr>
+        <p:spPr/>
+        <p:txBody>
+          <a:bodyPr/>
+          <a:lstStyle/>
+          <a:p>
+            <a:r>
+              <a:rPr lang="en-US" dirty="0"/>
+              <a:t>First, create a repository</a:t>
+            </a:r>
+          </a:p>
+        </p:txBody>
+      </p:sp>
+      <p:pic>
+        <p:nvPicPr>
+          <p:cNvPr id="3" name="Picture 2">
+            <a:extLst>
+              <a:ext uri="{FF2B5EF4-FFF2-40B4-BE49-F238E27FC236}">
+                <a16:creationId xmlns:a16="http://schemas.microsoft.com/office/drawing/2014/main" id="{35181A40-6DD9-9442-5F70-65801E395022}"/>
+              </a:ext>
+            </a:extLst>
+          </p:cNvPr>
+          <p:cNvPicPr>
+            <a:picLocks noChangeAspect="1"/>
+          </p:cNvPicPr>
+          <p:nvPr/>
+        </p:nvPicPr>
+        <p:blipFill>
+          <a:blip r:embed="rId2"/>
+          <a:stretch>
+            <a:fillRect/>
+          </a:stretch>
+        </p:blipFill>
+        <p:spPr>
+          <a:xfrm>
+            <a:off x="3607280" y="1936043"/>
+            <a:ext cx="7772400" cy="4366142"/>
+          </a:xfrm>
+          <a:prstGeom prst="rect">
+            <a:avLst/>
+          </a:prstGeom>
+          <a:ln>
+            <a:noFill/>
+          </a:ln>
+          <a:effectLst>
+            <a:outerShdw blurRad="292100" dist="139700" dir="2700000" algn="tl" rotWithShape="0">
+              <a:srgbClr val="333333">
+                <a:alpha val="65000"/>
+              </a:srgbClr>
+            </a:outerShdw>
+          </a:effectLst>
+        </p:spPr>
+      </p:pic>
+      <p:cxnSp>
+        <p:nvCxnSpPr>
+          <p:cNvPr id="5" name="Straight Arrow Connector 4">
+            <a:extLst>
+              <a:ext uri="{FF2B5EF4-FFF2-40B4-BE49-F238E27FC236}">
+                <a16:creationId xmlns:a16="http://schemas.microsoft.com/office/drawing/2014/main" id="{EBFEA81A-6F28-4D03-54CD-4162992E1ED3}"/>
+              </a:ext>
+            </a:extLst>
+          </p:cNvPr>
+          <p:cNvCxnSpPr/>
+          <p:nvPr/>
+        </p:nvCxnSpPr>
+        <p:spPr>
+          <a:xfrm flipV="1">
+            <a:off x="2721769" y="2778919"/>
+            <a:ext cx="1428750" cy="721519"/>
+          </a:xfrm>
+          <a:prstGeom prst="straightConnector1">
+            <a:avLst/>
+          </a:prstGeom>
+          <a:ln>
+            <a:tailEnd type="triangle"/>
+          </a:ln>
+        </p:spPr>
+        <p:style>
+          <a:lnRef idx="1">
+            <a:schemeClr val="accent1"/>
+          </a:lnRef>
+          <a:fillRef idx="0">
+            <a:schemeClr val="accent1"/>
+          </a:fillRef>
+          <a:effectRef idx="0">
+            <a:schemeClr val="accent1"/>
+          </a:effectRef>
+          <a:fontRef idx="minor">
+            <a:schemeClr val="tx1"/>
+          </a:fontRef>
+        </p:style>
+      </p:cxnSp>
+      <p:sp>
+        <p:nvSpPr>
+          <p:cNvPr id="6" name="TextBox 5">
+            <a:extLst>
+              <a:ext uri="{FF2B5EF4-FFF2-40B4-BE49-F238E27FC236}">
+                <a16:creationId xmlns:a16="http://schemas.microsoft.com/office/drawing/2014/main" id="{3359157C-A43A-73E8-B853-71A9EB2CA214}"/>
+              </a:ext>
+            </a:extLst>
+          </p:cNvPr>
+          <p:cNvSpPr txBox="1"/>
+          <p:nvPr/>
+        </p:nvSpPr>
+        <p:spPr>
+          <a:xfrm>
+            <a:off x="1893094" y="3428999"/>
+            <a:ext cx="1628775" cy="646331"/>
+          </a:xfrm>
+          <a:prstGeom prst="rect">
+            <a:avLst/>
+          </a:prstGeom>
+          <a:noFill/>
+        </p:spPr>
+        <p:txBody>
+          <a:bodyPr wrap="square" rtlCol="0">
+            <a:spAutoFit/>
+          </a:bodyPr>
+          <a:lstStyle/>
+          <a:p>
+            <a:r>
+              <a:rPr lang="en-US" dirty="0">
+                <a:solidFill>
+                  <a:schemeClr val="tx1">
+                    <a:lumMod val="75000"/>
+                    <a:lumOff val="25000"/>
+                  </a:schemeClr>
+                </a:solidFill>
+              </a:rPr>
+              <a:t>Notice the user name</a:t>
+            </a:r>
+          </a:p>
+        </p:txBody>
+      </p:sp>
+    </p:spTree>
+    <p:extLst>
+      <p:ext uri="{BB962C8B-B14F-4D97-AF65-F5344CB8AC3E}">
+        <p14:creationId xmlns:p14="http://schemas.microsoft.com/office/powerpoint/2010/main" val="1040568137"/>
+      </p:ext>
+    </p:extLst>
+  </p:cSld>
+  <p:clrMapOvr>
+    <a:masterClrMapping/>
+  </p:clrMapOvr>
+</p:sld>
+</file>
+
+<file path=ppt/slides/slide18.xml><?xml version="1.0" encoding="utf-8"?>
+<p:sld xmlns:a="http://schemas.openxmlformats.org/drawingml/2006/main" xmlns:r="http://schemas.openxmlformats.org/officeDocument/2006/relationships" xmlns:p="http://schemas.openxmlformats.org/presentationml/2006/main">
+  <p:cSld>
+    <p:spTree>
+      <p:nvGrpSpPr>
+        <p:cNvPr id="1" name="">
+          <a:extLst>
+            <a:ext uri="{FF2B5EF4-FFF2-40B4-BE49-F238E27FC236}">
+              <a16:creationId xmlns:a16="http://schemas.microsoft.com/office/drawing/2014/main" id="{651716FB-FA21-156B-0109-484045F25E86}"/>
+            </a:ext>
+          </a:extLst>
+        </p:cNvPr>
+        <p:cNvGrpSpPr/>
+        <p:nvPr/>
+      </p:nvGrpSpPr>
+      <p:grpSpPr>
+        <a:xfrm>
+          <a:off x="0" y="0"/>
+          <a:ext cx="0" cy="0"/>
+          <a:chOff x="0" y="0"/>
+          <a:chExt cx="0" cy="0"/>
+        </a:xfrm>
+      </p:grpSpPr>
+      <p:sp>
+        <p:nvSpPr>
+          <p:cNvPr id="2" name="Title 1">
+            <a:extLst>
+              <a:ext uri="{FF2B5EF4-FFF2-40B4-BE49-F238E27FC236}">
+                <a16:creationId xmlns:a16="http://schemas.microsoft.com/office/drawing/2014/main" id="{1F847778-4C91-24E0-C591-48EC2E07173D}"/>
+              </a:ext>
+            </a:extLst>
+          </p:cNvPr>
+          <p:cNvSpPr>
+            <a:spLocks noGrp="1"/>
+          </p:cNvSpPr>
+          <p:nvPr>
+            <p:ph type="title"/>
+          </p:nvPr>
+        </p:nvSpPr>
+        <p:spPr/>
+        <p:txBody>
+          <a:bodyPr/>
+          <a:lstStyle/>
+          <a:p>
+            <a:r>
+              <a:rPr lang="en-US" dirty="0"/>
+              <a:t>Tag your image</a:t>
+            </a:r>
+          </a:p>
+        </p:txBody>
+      </p:sp>
+      <p:pic>
+        <p:nvPicPr>
+          <p:cNvPr id="6" name="Picture 5">
+            <a:extLst>
+              <a:ext uri="{FF2B5EF4-FFF2-40B4-BE49-F238E27FC236}">
+                <a16:creationId xmlns:a16="http://schemas.microsoft.com/office/drawing/2014/main" id="{764234FB-EDB4-F713-92E7-19F4445FE581}"/>
+              </a:ext>
+            </a:extLst>
+          </p:cNvPr>
+          <p:cNvPicPr>
+            <a:picLocks noChangeAspect="1"/>
+          </p:cNvPicPr>
+          <p:nvPr/>
+        </p:nvPicPr>
+        <p:blipFill>
+          <a:blip r:embed="rId2"/>
+          <a:srcRect t="13653"/>
+          <a:stretch>
+            <a:fillRect/>
+          </a:stretch>
+        </p:blipFill>
+        <p:spPr>
+          <a:xfrm>
+            <a:off x="3976647" y="800098"/>
+            <a:ext cx="6108700" cy="1458488"/>
+          </a:xfrm>
+          <a:prstGeom prst="rect">
+            <a:avLst/>
+          </a:prstGeom>
+          <a:ln>
+            <a:noFill/>
+          </a:ln>
+          <a:effectLst>
+            <a:outerShdw blurRad="292100" dist="139700" dir="2700000" algn="tl" rotWithShape="0">
+              <a:srgbClr val="333333">
+                <a:alpha val="65000"/>
+              </a:srgbClr>
+            </a:outerShdw>
+          </a:effectLst>
+        </p:spPr>
+      </p:pic>
+      <p:pic>
+        <p:nvPicPr>
+          <p:cNvPr id="7" name="Picture 6">
+            <a:extLst>
+              <a:ext uri="{FF2B5EF4-FFF2-40B4-BE49-F238E27FC236}">
+                <a16:creationId xmlns:a16="http://schemas.microsoft.com/office/drawing/2014/main" id="{9B3876D7-B842-B761-4C6F-A2E651A1C745}"/>
+              </a:ext>
+            </a:extLst>
+          </p:cNvPr>
+          <p:cNvPicPr>
+            <a:picLocks noChangeAspect="1"/>
+          </p:cNvPicPr>
+          <p:nvPr/>
+        </p:nvPicPr>
+        <p:blipFill>
+          <a:blip r:embed="rId3"/>
+          <a:srcRect t="46664"/>
+          <a:stretch>
+            <a:fillRect/>
+          </a:stretch>
+        </p:blipFill>
+        <p:spPr>
+          <a:xfrm>
+            <a:off x="711933" y="2336168"/>
+            <a:ext cx="6108700" cy="243851"/>
+          </a:xfrm>
+          <a:prstGeom prst="rect">
+            <a:avLst/>
+          </a:prstGeom>
+          <a:ln>
+            <a:noFill/>
+          </a:ln>
+          <a:effectLst>
+            <a:outerShdw blurRad="292100" dist="139700" dir="2700000" algn="tl" rotWithShape="0">
+              <a:srgbClr val="333333">
+                <a:alpha val="65000"/>
+              </a:srgbClr>
+            </a:outerShdw>
+          </a:effectLst>
+        </p:spPr>
+      </p:pic>
+      <p:pic>
+        <p:nvPicPr>
+          <p:cNvPr id="8" name="Picture 7">
+            <a:extLst>
+              <a:ext uri="{FF2B5EF4-FFF2-40B4-BE49-F238E27FC236}">
+                <a16:creationId xmlns:a16="http://schemas.microsoft.com/office/drawing/2014/main" id="{2FD5CB78-F1A5-CDFC-011A-6F1D34EB1A57}"/>
+              </a:ext>
+            </a:extLst>
+          </p:cNvPr>
+          <p:cNvPicPr>
+            <a:picLocks noChangeAspect="1"/>
+          </p:cNvPicPr>
+          <p:nvPr/>
+        </p:nvPicPr>
+        <p:blipFill>
+          <a:blip r:embed="rId4"/>
+          <a:stretch>
+            <a:fillRect/>
+          </a:stretch>
+        </p:blipFill>
+        <p:spPr>
+          <a:xfrm>
+            <a:off x="3976647" y="2637138"/>
+            <a:ext cx="6248400" cy="1638300"/>
+          </a:xfrm>
+          <a:prstGeom prst="rect">
+            <a:avLst/>
+          </a:prstGeom>
+          <a:ln>
+            <a:noFill/>
+          </a:ln>
+          <a:effectLst>
+            <a:outerShdw blurRad="292100" dist="139700" dir="2700000" algn="tl" rotWithShape="0">
+              <a:srgbClr val="333333">
+                <a:alpha val="65000"/>
+              </a:srgbClr>
+            </a:outerShdw>
+          </a:effectLst>
+        </p:spPr>
+      </p:pic>
+      <p:sp>
+        <p:nvSpPr>
+          <p:cNvPr id="9" name="Rounded Rectangle 8">
+            <a:extLst>
+              <a:ext uri="{FF2B5EF4-FFF2-40B4-BE49-F238E27FC236}">
+                <a16:creationId xmlns:a16="http://schemas.microsoft.com/office/drawing/2014/main" id="{42731B7F-E4DB-278E-4C16-9B5623FB30CB}"/>
+              </a:ext>
+            </a:extLst>
+          </p:cNvPr>
+          <p:cNvSpPr/>
+          <p:nvPr/>
+        </p:nvSpPr>
+        <p:spPr>
+          <a:xfrm>
+            <a:off x="3982550" y="1406892"/>
+            <a:ext cx="6029864" cy="226252"/>
+          </a:xfrm>
+          <a:prstGeom prst="roundRect">
+            <a:avLst/>
+          </a:prstGeom>
+          <a:solidFill>
+            <a:srgbClr val="1CADE4">
+              <a:alpha val="18824"/>
+            </a:srgbClr>
+          </a:solidFill>
+        </p:spPr>
+        <p:style>
+          <a:lnRef idx="2">
+            <a:schemeClr val="accent1">
+              <a:shade val="15000"/>
+            </a:schemeClr>
+          </a:lnRef>
+          <a:fillRef idx="1">
+            <a:schemeClr val="accent1"/>
+          </a:fillRef>
+          <a:effectRef idx="0">
+            <a:schemeClr val="accent1"/>
+          </a:effectRef>
+          <a:fontRef idx="minor">
+            <a:schemeClr val="lt1"/>
+          </a:fontRef>
+        </p:style>
+        <p:txBody>
+          <a:bodyPr rtlCol="0" anchor="ctr"/>
+          <a:lstStyle/>
+          <a:p>
+            <a:pPr algn="ctr"/>
+            <a:endParaRPr lang="en-US"/>
+          </a:p>
+        </p:txBody>
+      </p:sp>
+      <p:sp>
+        <p:nvSpPr>
+          <p:cNvPr id="10" name="Rounded Rectangle 9">
+            <a:extLst>
+              <a:ext uri="{FF2B5EF4-FFF2-40B4-BE49-F238E27FC236}">
+                <a16:creationId xmlns:a16="http://schemas.microsoft.com/office/drawing/2014/main" id="{18B79E4B-EAC0-6DF0-430E-EF3F9AC55D1A}"/>
+              </a:ext>
+            </a:extLst>
+          </p:cNvPr>
+          <p:cNvSpPr/>
+          <p:nvPr/>
+        </p:nvSpPr>
+        <p:spPr>
+          <a:xfrm>
+            <a:off x="3982549" y="3230036"/>
+            <a:ext cx="6175837" cy="226252"/>
+          </a:xfrm>
+          <a:prstGeom prst="roundRect">
+            <a:avLst/>
+          </a:prstGeom>
+          <a:solidFill>
+            <a:srgbClr val="1CADE4">
+              <a:alpha val="18824"/>
+            </a:srgbClr>
+          </a:solidFill>
+        </p:spPr>
+        <p:style>
+          <a:lnRef idx="2">
+            <a:schemeClr val="accent1">
+              <a:shade val="15000"/>
+            </a:schemeClr>
+          </a:lnRef>
+          <a:fillRef idx="1">
+            <a:schemeClr val="accent1"/>
+          </a:fillRef>
+          <a:effectRef idx="0">
+            <a:schemeClr val="accent1"/>
+          </a:effectRef>
+          <a:fontRef idx="minor">
+            <a:schemeClr val="lt1"/>
+          </a:fontRef>
+        </p:style>
+        <p:txBody>
+          <a:bodyPr rtlCol="0" anchor="ctr"/>
+          <a:lstStyle/>
+          <a:p>
+            <a:pPr algn="ctr"/>
+            <a:endParaRPr lang="en-US"/>
+          </a:p>
+        </p:txBody>
+      </p:sp>
+      <p:sp>
+        <p:nvSpPr>
+          <p:cNvPr id="11" name="Rounded Rectangle 10">
+            <a:extLst>
+              <a:ext uri="{FF2B5EF4-FFF2-40B4-BE49-F238E27FC236}">
+                <a16:creationId xmlns:a16="http://schemas.microsoft.com/office/drawing/2014/main" id="{5DE3ED49-6D81-2C27-84F3-517F86F8525B}"/>
+              </a:ext>
+            </a:extLst>
+          </p:cNvPr>
+          <p:cNvSpPr/>
+          <p:nvPr/>
+        </p:nvSpPr>
+        <p:spPr>
+          <a:xfrm>
+            <a:off x="3983791" y="3456288"/>
+            <a:ext cx="6175837" cy="226252"/>
+          </a:xfrm>
+          <a:prstGeom prst="roundRect">
+            <a:avLst/>
+          </a:prstGeom>
+          <a:solidFill>
+            <a:schemeClr val="accent5">
+              <a:alpha val="18824"/>
+            </a:schemeClr>
+          </a:solidFill>
+        </p:spPr>
+        <p:style>
+          <a:lnRef idx="2">
+            <a:schemeClr val="accent1">
+              <a:shade val="15000"/>
+            </a:schemeClr>
+          </a:lnRef>
+          <a:fillRef idx="1">
+            <a:schemeClr val="accent1"/>
+          </a:fillRef>
+          <a:effectRef idx="0">
+            <a:schemeClr val="accent1"/>
+          </a:effectRef>
+          <a:fontRef idx="minor">
+            <a:schemeClr val="lt1"/>
+          </a:fontRef>
+        </p:style>
+        <p:txBody>
+          <a:bodyPr rtlCol="0" anchor="ctr"/>
+          <a:lstStyle/>
+          <a:p>
+            <a:pPr algn="ctr"/>
+            <a:endParaRPr lang="en-US"/>
+          </a:p>
+        </p:txBody>
+      </p:sp>
+      <p:pic>
+        <p:nvPicPr>
+          <p:cNvPr id="12" name="Picture 11">
+            <a:extLst>
+              <a:ext uri="{FF2B5EF4-FFF2-40B4-BE49-F238E27FC236}">
+                <a16:creationId xmlns:a16="http://schemas.microsoft.com/office/drawing/2014/main" id="{10A79B91-E9DC-54A7-E418-7604CA9D6EC1}"/>
+              </a:ext>
+            </a:extLst>
+          </p:cNvPr>
+          <p:cNvPicPr>
+            <a:picLocks noChangeAspect="1"/>
+          </p:cNvPicPr>
+          <p:nvPr/>
+        </p:nvPicPr>
+        <p:blipFill>
+          <a:blip r:embed="rId5"/>
+          <a:stretch>
+            <a:fillRect/>
+          </a:stretch>
+        </p:blipFill>
+        <p:spPr>
+          <a:xfrm>
+            <a:off x="3988594" y="4461357"/>
+            <a:ext cx="7772400" cy="2007219"/>
+          </a:xfrm>
+          <a:prstGeom prst="rect">
+            <a:avLst/>
+          </a:prstGeom>
+          <a:ln>
+            <a:noFill/>
+          </a:ln>
+          <a:effectLst>
+            <a:outerShdw blurRad="292100" dist="139700" dir="2700000" algn="tl" rotWithShape="0">
+              <a:srgbClr val="333333">
+                <a:alpha val="65000"/>
+              </a:srgbClr>
+            </a:outerShdw>
+          </a:effectLst>
+        </p:spPr>
+      </p:pic>
+      <p:cxnSp>
+        <p:nvCxnSpPr>
+          <p:cNvPr id="13" name="Straight Arrow Connector 12">
+            <a:extLst>
+              <a:ext uri="{FF2B5EF4-FFF2-40B4-BE49-F238E27FC236}">
+                <a16:creationId xmlns:a16="http://schemas.microsoft.com/office/drawing/2014/main" id="{3301A559-1F26-3E65-C194-35D0CE6027F5}"/>
+              </a:ext>
+            </a:extLst>
+          </p:cNvPr>
+          <p:cNvCxnSpPr>
+            <a:cxnSpLocks/>
+          </p:cNvCxnSpPr>
+          <p:nvPr/>
+        </p:nvCxnSpPr>
+        <p:spPr>
+          <a:xfrm flipV="1">
+            <a:off x="2721769" y="2637138"/>
+            <a:ext cx="471487" cy="863300"/>
+          </a:xfrm>
+          <a:prstGeom prst="straightConnector1">
+            <a:avLst/>
+          </a:prstGeom>
+          <a:ln>
+            <a:tailEnd type="triangle"/>
+          </a:ln>
+        </p:spPr>
+        <p:style>
+          <a:lnRef idx="1">
+            <a:schemeClr val="accent1"/>
+          </a:lnRef>
+          <a:fillRef idx="0">
+            <a:schemeClr val="accent1"/>
+          </a:fillRef>
+          <a:effectRef idx="0">
+            <a:schemeClr val="accent1"/>
+          </a:effectRef>
+          <a:fontRef idx="minor">
+            <a:schemeClr val="tx1"/>
+          </a:fontRef>
+        </p:style>
+      </p:cxnSp>
+      <p:sp>
+        <p:nvSpPr>
+          <p:cNvPr id="14" name="TextBox 13">
+            <a:extLst>
+              <a:ext uri="{FF2B5EF4-FFF2-40B4-BE49-F238E27FC236}">
+                <a16:creationId xmlns:a16="http://schemas.microsoft.com/office/drawing/2014/main" id="{22B9894A-7320-0023-2516-22FE6C1B656B}"/>
+              </a:ext>
+            </a:extLst>
+          </p:cNvPr>
+          <p:cNvSpPr txBox="1"/>
+          <p:nvPr/>
+        </p:nvSpPr>
+        <p:spPr>
+          <a:xfrm>
+            <a:off x="1893094" y="3428999"/>
+            <a:ext cx="1628775" cy="646331"/>
+          </a:xfrm>
+          <a:prstGeom prst="rect">
+            <a:avLst/>
+          </a:prstGeom>
+          <a:noFill/>
+        </p:spPr>
+        <p:txBody>
+          <a:bodyPr wrap="square" rtlCol="0">
+            <a:spAutoFit/>
+          </a:bodyPr>
+          <a:lstStyle/>
+          <a:p>
+            <a:r>
+              <a:rPr lang="en-US" dirty="0">
+                <a:solidFill>
+                  <a:schemeClr val="tx1">
+                    <a:lumMod val="75000"/>
+                    <a:lumOff val="25000"/>
+                  </a:schemeClr>
+                </a:solidFill>
+              </a:rPr>
+              <a:t>Notice the user name</a:t>
+            </a:r>
+          </a:p>
+        </p:txBody>
+      </p:sp>
+    </p:spTree>
+    <p:extLst>
+      <p:ext uri="{BB962C8B-B14F-4D97-AF65-F5344CB8AC3E}">
+        <p14:creationId xmlns:p14="http://schemas.microsoft.com/office/powerpoint/2010/main" val="1447454002"/>
+      </p:ext>
+    </p:extLst>
+  </p:cSld>
+  <p:clrMapOvr>
+    <a:masterClrMapping/>
+  </p:clrMapOvr>
+</p:sld>
+</file>
+
+<file path=ppt/slides/slide19.xml><?xml version="1.0" encoding="utf-8"?>
+<p:sld xmlns:a="http://schemas.openxmlformats.org/drawingml/2006/main" xmlns:r="http://schemas.openxmlformats.org/officeDocument/2006/relationships" xmlns:p="http://schemas.openxmlformats.org/presentationml/2006/main">
+  <p:cSld>
+    <p:spTree>
+      <p:nvGrpSpPr>
+        <p:cNvPr id="1" name=""/>
+        <p:cNvGrpSpPr/>
+        <p:nvPr/>
+      </p:nvGrpSpPr>
+      <p:grpSpPr>
+        <a:xfrm>
+          <a:off x="0" y="0"/>
+          <a:ext cx="0" cy="0"/>
+          <a:chOff x="0" y="0"/>
+          <a:chExt cx="0" cy="0"/>
+        </a:xfrm>
+      </p:grpSpPr>
+      <p:sp>
+        <p:nvSpPr>
+          <p:cNvPr id="2" name="Title 1">
+            <a:extLst>
+              <a:ext uri="{FF2B5EF4-FFF2-40B4-BE49-F238E27FC236}">
+                <a16:creationId xmlns:a16="http://schemas.microsoft.com/office/drawing/2014/main" id="{3BFF4FAF-1974-438F-BD0F-0F60249E1F8B}"/>
+              </a:ext>
+            </a:extLst>
+          </p:cNvPr>
+          <p:cNvSpPr>
+            <a:spLocks noGrp="1"/>
+          </p:cNvSpPr>
+          <p:nvPr>
+            <p:ph type="title"/>
+          </p:nvPr>
+        </p:nvSpPr>
+        <p:spPr/>
+        <p:txBody>
+          <a:bodyPr/>
+          <a:lstStyle/>
+          <a:p>
+            <a:r>
+              <a:rPr lang="en-US" dirty="0"/>
+              <a:t>Your image is now available for others to “pull”</a:t>
+            </a:r>
+          </a:p>
+        </p:txBody>
+      </p:sp>
+      <p:pic>
+        <p:nvPicPr>
+          <p:cNvPr id="3" name="Picture 2">
+            <a:extLst>
+              <a:ext uri="{FF2B5EF4-FFF2-40B4-BE49-F238E27FC236}">
+                <a16:creationId xmlns:a16="http://schemas.microsoft.com/office/drawing/2014/main" id="{17AD26A9-8CB4-FB29-F2F0-E0D5C3E9038D}"/>
+              </a:ext>
+            </a:extLst>
+          </p:cNvPr>
+          <p:cNvPicPr>
+            <a:picLocks noChangeAspect="1"/>
+          </p:cNvPicPr>
+          <p:nvPr/>
+        </p:nvPicPr>
+        <p:blipFill>
+          <a:blip r:embed="rId2"/>
+          <a:stretch>
+            <a:fillRect/>
+          </a:stretch>
+        </p:blipFill>
+        <p:spPr>
+          <a:xfrm>
+            <a:off x="2110192" y="1965036"/>
+            <a:ext cx="7772400" cy="4013287"/>
+          </a:xfrm>
+          <a:prstGeom prst="rect">
+            <a:avLst/>
+          </a:prstGeom>
+          <a:ln>
+            <a:noFill/>
+          </a:ln>
+          <a:effectLst>
+            <a:outerShdw blurRad="292100" dist="139700" dir="2700000" algn="tl" rotWithShape="0">
+              <a:srgbClr val="333333">
+                <a:alpha val="65000"/>
+              </a:srgbClr>
+            </a:outerShdw>
+          </a:effectLst>
+        </p:spPr>
+      </p:pic>
+    </p:spTree>
+    <p:extLst>
+      <p:ext uri="{BB962C8B-B14F-4D97-AF65-F5344CB8AC3E}">
+        <p14:creationId xmlns:p14="http://schemas.microsoft.com/office/powerpoint/2010/main" val="2390206493"/>
       </p:ext>
     </p:extLst>
   </p:cSld>
@@ -5375,6 +8493,627 @@
     <p:extLst>
       <p:ext uri="{BB962C8B-B14F-4D97-AF65-F5344CB8AC3E}">
         <p14:creationId xmlns:p14="http://schemas.microsoft.com/office/powerpoint/2010/main" val="4177777697"/>
+      </p:ext>
+    </p:extLst>
+  </p:cSld>
+  <p:clrMapOvr>
+    <a:masterClrMapping/>
+  </p:clrMapOvr>
+</p:sld>
+</file>
+
+<file path=ppt/slides/slide20.xml><?xml version="1.0" encoding="utf-8"?>
+<p:sld xmlns:a="http://schemas.openxmlformats.org/drawingml/2006/main" xmlns:r="http://schemas.openxmlformats.org/officeDocument/2006/relationships" xmlns:p="http://schemas.openxmlformats.org/presentationml/2006/main">
+  <p:cSld>
+    <p:spTree>
+      <p:nvGrpSpPr>
+        <p:cNvPr id="1" name=""/>
+        <p:cNvGrpSpPr/>
+        <p:nvPr/>
+      </p:nvGrpSpPr>
+      <p:grpSpPr>
+        <a:xfrm>
+          <a:off x="0" y="0"/>
+          <a:ext cx="0" cy="0"/>
+          <a:chOff x="0" y="0"/>
+          <a:chExt cx="0" cy="0"/>
+        </a:xfrm>
+      </p:grpSpPr>
+      <p:sp>
+        <p:nvSpPr>
+          <p:cNvPr id="2" name="Title 1">
+            <a:extLst>
+              <a:ext uri="{FF2B5EF4-FFF2-40B4-BE49-F238E27FC236}">
+                <a16:creationId xmlns:a16="http://schemas.microsoft.com/office/drawing/2014/main" id="{870240DB-0FC7-53FF-D713-68422BF790E5}"/>
+              </a:ext>
+            </a:extLst>
+          </p:cNvPr>
+          <p:cNvSpPr>
+            <a:spLocks noGrp="1"/>
+          </p:cNvSpPr>
+          <p:nvPr>
+            <p:ph type="title"/>
+          </p:nvPr>
+        </p:nvSpPr>
+        <p:spPr/>
+        <p:txBody>
+          <a:bodyPr/>
+          <a:lstStyle/>
+          <a:p>
+            <a:r>
+              <a:rPr lang="en-US" dirty="0"/>
+              <a:t>You can also use docker desktop to push</a:t>
+            </a:r>
+          </a:p>
+        </p:txBody>
+      </p:sp>
+      <p:pic>
+        <p:nvPicPr>
+          <p:cNvPr id="3" name="Picture 2">
+            <a:extLst>
+              <a:ext uri="{FF2B5EF4-FFF2-40B4-BE49-F238E27FC236}">
+                <a16:creationId xmlns:a16="http://schemas.microsoft.com/office/drawing/2014/main" id="{580C86DA-2636-EFCD-9ABF-5B638E9E4EBF}"/>
+              </a:ext>
+            </a:extLst>
+          </p:cNvPr>
+          <p:cNvPicPr>
+            <a:picLocks noChangeAspect="1"/>
+          </p:cNvPicPr>
+          <p:nvPr/>
+        </p:nvPicPr>
+        <p:blipFill>
+          <a:blip r:embed="rId2"/>
+          <a:stretch>
+            <a:fillRect/>
+          </a:stretch>
+        </p:blipFill>
+        <p:spPr>
+          <a:xfrm>
+            <a:off x="1821207" y="1907637"/>
+            <a:ext cx="7772400" cy="4464466"/>
+          </a:xfrm>
+          <a:prstGeom prst="rect">
+            <a:avLst/>
+          </a:prstGeom>
+          <a:ln>
+            <a:noFill/>
+          </a:ln>
+          <a:effectLst>
+            <a:outerShdw blurRad="292100" dist="139700" dir="2700000" algn="tl" rotWithShape="0">
+              <a:srgbClr val="333333">
+                <a:alpha val="65000"/>
+              </a:srgbClr>
+            </a:outerShdw>
+          </a:effectLst>
+        </p:spPr>
+      </p:pic>
+    </p:spTree>
+    <p:extLst>
+      <p:ext uri="{BB962C8B-B14F-4D97-AF65-F5344CB8AC3E}">
+        <p14:creationId xmlns:p14="http://schemas.microsoft.com/office/powerpoint/2010/main" val="1585701046"/>
+      </p:ext>
+    </p:extLst>
+  </p:cSld>
+  <p:clrMapOvr>
+    <a:masterClrMapping/>
+  </p:clrMapOvr>
+</p:sld>
+</file>
+
+<file path=ppt/slides/slide21.xml><?xml version="1.0" encoding="utf-8"?>
+<p:sld xmlns:a="http://schemas.openxmlformats.org/drawingml/2006/main" xmlns:r="http://schemas.openxmlformats.org/officeDocument/2006/relationships" xmlns:p="http://schemas.openxmlformats.org/presentationml/2006/main">
+  <p:cSld>
+    <p:spTree>
+      <p:nvGrpSpPr>
+        <p:cNvPr id="1" name=""/>
+        <p:cNvGrpSpPr/>
+        <p:nvPr/>
+      </p:nvGrpSpPr>
+      <p:grpSpPr>
+        <a:xfrm>
+          <a:off x="0" y="0"/>
+          <a:ext cx="0" cy="0"/>
+          <a:chOff x="0" y="0"/>
+          <a:chExt cx="0" cy="0"/>
+        </a:xfrm>
+      </p:grpSpPr>
+      <p:sp>
+        <p:nvSpPr>
+          <p:cNvPr id="2" name="Title 1">
+            <a:extLst>
+              <a:ext uri="{FF2B5EF4-FFF2-40B4-BE49-F238E27FC236}">
+                <a16:creationId xmlns:a16="http://schemas.microsoft.com/office/drawing/2014/main" id="{92827A17-55A8-A889-FC18-6CBCDDF09CB9}"/>
+              </a:ext>
+            </a:extLst>
+          </p:cNvPr>
+          <p:cNvSpPr>
+            <a:spLocks noGrp="1"/>
+          </p:cNvSpPr>
+          <p:nvPr>
+            <p:ph type="title"/>
+          </p:nvPr>
+        </p:nvSpPr>
+        <p:spPr/>
+        <p:txBody>
+          <a:bodyPr/>
+          <a:lstStyle/>
+          <a:p>
+            <a:r>
+              <a:rPr lang="en-US" dirty="0"/>
+              <a:t>Using and abusing Docker</a:t>
+            </a:r>
+          </a:p>
+        </p:txBody>
+      </p:sp>
+      <p:sp>
+        <p:nvSpPr>
+          <p:cNvPr id="3" name="Content Placeholder 2">
+            <a:extLst>
+              <a:ext uri="{FF2B5EF4-FFF2-40B4-BE49-F238E27FC236}">
+                <a16:creationId xmlns:a16="http://schemas.microsoft.com/office/drawing/2014/main" id="{E227966A-464E-4CEB-29B6-305DE2C019BD}"/>
+              </a:ext>
+            </a:extLst>
+          </p:cNvPr>
+          <p:cNvSpPr>
+            <a:spLocks noGrp="1"/>
+          </p:cNvSpPr>
+          <p:nvPr>
+            <p:ph idx="1"/>
+          </p:nvPr>
+        </p:nvSpPr>
+        <p:spPr/>
+        <p:txBody>
+          <a:bodyPr anchor="t"/>
+          <a:lstStyle/>
+          <a:p>
+            <a:r>
+              <a:rPr lang="en-US" dirty="0"/>
+              <a:t>Docker is based on a set of </a:t>
+            </a:r>
+            <a:r>
+              <a:rPr lang="en-US" dirty="0" err="1"/>
+              <a:t>linux</a:t>
+            </a:r>
+            <a:r>
+              <a:rPr lang="en-US" dirty="0"/>
+              <a:t> technologies which allow the operating system to isolate processes and make them believe they are the only ones running.</a:t>
+            </a:r>
+          </a:p>
+          <a:p>
+            <a:pPr lvl="1"/>
+            <a:r>
+              <a:rPr lang="en-US" dirty="0"/>
+              <a:t>Compare this with normal </a:t>
+            </a:r>
+            <a:r>
+              <a:rPr lang="en-US" dirty="0" err="1"/>
+              <a:t>linux</a:t>
+            </a:r>
+            <a:r>
+              <a:rPr lang="en-US" dirty="0"/>
+              <a:t> accounts where you can see that there are other user on </a:t>
+            </a:r>
+            <a:r>
+              <a:rPr lang="en-US" b="0" dirty="0">
+                <a:solidFill>
+                  <a:srgbClr val="679C00"/>
+                </a:solidFill>
+                <a:effectLst/>
+                <a:latin typeface="Consolas" panose="020B0609020204030204" pitchFamily="49" charset="0"/>
+              </a:rPr>
+              <a:t>/home</a:t>
+            </a:r>
+            <a:r>
+              <a:rPr lang="en-US" dirty="0"/>
+              <a:t> and other processes running via </a:t>
+            </a:r>
+            <a:r>
+              <a:rPr lang="en-US" b="0" dirty="0" err="1">
+                <a:solidFill>
+                  <a:srgbClr val="679C00"/>
+                </a:solidFill>
+                <a:effectLst/>
+                <a:latin typeface="Consolas" panose="020B0609020204030204" pitchFamily="49" charset="0"/>
+              </a:rPr>
+              <a:t>ps</a:t>
+            </a:r>
+            <a:r>
+              <a:rPr lang="en-US" b="0" dirty="0">
+                <a:solidFill>
+                  <a:srgbClr val="333333"/>
+                </a:solidFill>
+                <a:effectLst/>
+                <a:latin typeface="Consolas" panose="020B0609020204030204" pitchFamily="49" charset="0"/>
+              </a:rPr>
+              <a:t> </a:t>
+            </a:r>
+            <a:r>
+              <a:rPr lang="en-US" b="0" dirty="0">
+                <a:solidFill>
+                  <a:srgbClr val="684D99"/>
+                </a:solidFill>
+                <a:effectLst/>
+                <a:latin typeface="Consolas" panose="020B0609020204030204" pitchFamily="49" charset="0"/>
+              </a:rPr>
+              <a:t>-</a:t>
+            </a:r>
+            <a:r>
+              <a:rPr lang="en-US" b="0" dirty="0" err="1">
+                <a:solidFill>
+                  <a:srgbClr val="684D99"/>
+                </a:solidFill>
+                <a:effectLst/>
+                <a:latin typeface="Consolas" panose="020B0609020204030204" pitchFamily="49" charset="0"/>
+              </a:rPr>
+              <a:t>ef</a:t>
+            </a:r>
+            <a:endParaRPr lang="en-US" b="0" dirty="0">
+              <a:solidFill>
+                <a:srgbClr val="333333"/>
+              </a:solidFill>
+              <a:effectLst/>
+              <a:latin typeface="Consolas" panose="020B0609020204030204" pitchFamily="49" charset="0"/>
+            </a:endParaRPr>
+          </a:p>
+          <a:p>
+            <a:pPr lvl="1"/>
+            <a:r>
+              <a:rPr lang="en-US" b="1" dirty="0"/>
+              <a:t>When we run Docker on Windows or Mac, </a:t>
+            </a:r>
+            <a:r>
+              <a:rPr lang="en-US" b="1" dirty="0" err="1"/>
+              <a:t>linux</a:t>
+            </a:r>
+            <a:r>
+              <a:rPr lang="en-US" b="1" dirty="0"/>
+              <a:t> is being virtualized first, then docker is being run inside it!</a:t>
+            </a:r>
+          </a:p>
+          <a:p>
+            <a:pPr lvl="1"/>
+            <a:endParaRPr lang="en-US" dirty="0"/>
+          </a:p>
+          <a:p>
+            <a:r>
+              <a:rPr lang="en-US" dirty="0"/>
+              <a:t>Docker environment </a:t>
+            </a:r>
+            <a:r>
+              <a:rPr lang="en-US" b="1" dirty="0"/>
+              <a:t>should be set up entirely via </a:t>
+            </a:r>
+            <a:r>
+              <a:rPr lang="en-US" b="1" dirty="0" err="1"/>
+              <a:t>Dockerfile</a:t>
+            </a:r>
+            <a:r>
+              <a:rPr lang="en-US" dirty="0"/>
+              <a:t>. Do NOT execute commands on the shell to update the environment. That defeats the purpose of docker. I have seen this in online tutorials</a:t>
+            </a:r>
+          </a:p>
+          <a:p>
+            <a:pPr lvl="1"/>
+            <a:r>
+              <a:rPr lang="en-US" dirty="0"/>
+              <a:t>But you can enter the shell, as if you were ssh into a remote machine: </a:t>
+            </a:r>
+            <a:r>
+              <a:rPr lang="en-US" b="0" dirty="0">
+                <a:solidFill>
+                  <a:srgbClr val="679C00"/>
+                </a:solidFill>
+                <a:effectLst/>
+                <a:latin typeface="Consolas" panose="020B0609020204030204" pitchFamily="49" charset="0"/>
+              </a:rPr>
+              <a:t>docker</a:t>
+            </a:r>
+            <a:r>
+              <a:rPr lang="en-US" b="0" dirty="0">
+                <a:solidFill>
+                  <a:srgbClr val="333333"/>
+                </a:solidFill>
+                <a:effectLst/>
+                <a:latin typeface="Consolas" panose="020B0609020204030204" pitchFamily="49" charset="0"/>
+              </a:rPr>
+              <a:t> </a:t>
+            </a:r>
+            <a:r>
+              <a:rPr lang="en-US" b="0" dirty="0">
+                <a:solidFill>
+                  <a:srgbClr val="998F2F"/>
+                </a:solidFill>
+                <a:effectLst/>
+                <a:latin typeface="Consolas" panose="020B0609020204030204" pitchFamily="49" charset="0"/>
+              </a:rPr>
+              <a:t>exec</a:t>
+            </a:r>
+            <a:r>
+              <a:rPr lang="en-US" b="0" dirty="0">
+                <a:solidFill>
+                  <a:srgbClr val="333333"/>
+                </a:solidFill>
+                <a:effectLst/>
+                <a:latin typeface="Consolas" panose="020B0609020204030204" pitchFamily="49" charset="0"/>
+              </a:rPr>
+              <a:t> </a:t>
+            </a:r>
+            <a:r>
+              <a:rPr lang="en-US" b="0" dirty="0">
+                <a:solidFill>
+                  <a:srgbClr val="684D99"/>
+                </a:solidFill>
+                <a:effectLst/>
+                <a:latin typeface="Consolas" panose="020B0609020204030204" pitchFamily="49" charset="0"/>
+              </a:rPr>
+              <a:t>-it</a:t>
+            </a:r>
+            <a:r>
+              <a:rPr lang="en-US" b="0" dirty="0">
+                <a:solidFill>
+                  <a:srgbClr val="333333"/>
+                </a:solidFill>
+                <a:effectLst/>
+                <a:latin typeface="Consolas" panose="020B0609020204030204" pitchFamily="49" charset="0"/>
+              </a:rPr>
+              <a:t> </a:t>
+            </a:r>
+            <a:r>
+              <a:rPr lang="en-US" b="0" dirty="0">
+                <a:solidFill>
+                  <a:srgbClr val="F9005A"/>
+                </a:solidFill>
+                <a:effectLst/>
+                <a:latin typeface="Consolas" panose="020B0609020204030204" pitchFamily="49" charset="0"/>
+              </a:rPr>
+              <a:t>&lt;</a:t>
+            </a:r>
+            <a:r>
+              <a:rPr lang="en-US" b="0" dirty="0" err="1">
+                <a:solidFill>
+                  <a:srgbClr val="998F2F"/>
+                </a:solidFill>
+                <a:effectLst/>
+                <a:latin typeface="Consolas" panose="020B0609020204030204" pitchFamily="49" charset="0"/>
+              </a:rPr>
+              <a:t>container_name</a:t>
+            </a:r>
+            <a:r>
+              <a:rPr lang="en-US" b="0" dirty="0">
+                <a:solidFill>
+                  <a:srgbClr val="F9005A"/>
+                </a:solidFill>
+                <a:effectLst/>
+                <a:latin typeface="Consolas" panose="020B0609020204030204" pitchFamily="49" charset="0"/>
+              </a:rPr>
+              <a:t>&gt;</a:t>
+            </a:r>
+            <a:r>
+              <a:rPr lang="en-US" b="0" dirty="0">
+                <a:solidFill>
+                  <a:srgbClr val="333333"/>
+                </a:solidFill>
+                <a:effectLst/>
+                <a:latin typeface="Consolas" panose="020B0609020204030204" pitchFamily="49" charset="0"/>
+              </a:rPr>
+              <a:t> </a:t>
+            </a:r>
+            <a:r>
+              <a:rPr lang="en-US" b="0" dirty="0" err="1">
+                <a:solidFill>
+                  <a:srgbClr val="998F2F"/>
+                </a:solidFill>
+                <a:effectLst/>
+                <a:latin typeface="Consolas" panose="020B0609020204030204" pitchFamily="49" charset="0"/>
+              </a:rPr>
+              <a:t>sh</a:t>
+            </a:r>
+            <a:endParaRPr lang="en-US" dirty="0"/>
+          </a:p>
+          <a:p>
+            <a:pPr lvl="1"/>
+            <a:endParaRPr lang="en-US" dirty="0"/>
+          </a:p>
+        </p:txBody>
+      </p:sp>
+    </p:spTree>
+    <p:extLst>
+      <p:ext uri="{BB962C8B-B14F-4D97-AF65-F5344CB8AC3E}">
+        <p14:creationId xmlns:p14="http://schemas.microsoft.com/office/powerpoint/2010/main" val="692693259"/>
+      </p:ext>
+    </p:extLst>
+  </p:cSld>
+  <p:clrMapOvr>
+    <a:masterClrMapping/>
+  </p:clrMapOvr>
+</p:sld>
+</file>
+
+<file path=ppt/slides/slide22.xml><?xml version="1.0" encoding="utf-8"?>
+<p:sld xmlns:a="http://schemas.openxmlformats.org/drawingml/2006/main" xmlns:r="http://schemas.openxmlformats.org/officeDocument/2006/relationships" xmlns:p="http://schemas.openxmlformats.org/presentationml/2006/main">
+  <p:cSld>
+    <p:spTree>
+      <p:nvGrpSpPr>
+        <p:cNvPr id="1" name=""/>
+        <p:cNvGrpSpPr/>
+        <p:nvPr/>
+      </p:nvGrpSpPr>
+      <p:grpSpPr>
+        <a:xfrm>
+          <a:off x="0" y="0"/>
+          <a:ext cx="0" cy="0"/>
+          <a:chOff x="0" y="0"/>
+          <a:chExt cx="0" cy="0"/>
+        </a:xfrm>
+      </p:grpSpPr>
+      <p:sp>
+        <p:nvSpPr>
+          <p:cNvPr id="2" name="Title 1">
+            <a:extLst>
+              <a:ext uri="{FF2B5EF4-FFF2-40B4-BE49-F238E27FC236}">
+                <a16:creationId xmlns:a16="http://schemas.microsoft.com/office/drawing/2014/main" id="{379BE4A2-B369-E243-AC44-BC180708B979}"/>
+              </a:ext>
+            </a:extLst>
+          </p:cNvPr>
+          <p:cNvSpPr>
+            <a:spLocks noGrp="1"/>
+          </p:cNvSpPr>
+          <p:nvPr>
+            <p:ph type="ctrTitle"/>
+          </p:nvPr>
+        </p:nvSpPr>
+        <p:spPr/>
+        <p:txBody>
+          <a:bodyPr/>
+          <a:lstStyle/>
+          <a:p>
+            <a:r>
+              <a:rPr lang="en-US" dirty="0"/>
+              <a:t>On to </a:t>
+            </a:r>
+            <a:r>
+              <a:rPr lang="en-US" dirty="0" err="1"/>
+              <a:t>kubernetes</a:t>
+            </a:r>
+            <a:endParaRPr lang="en-US" dirty="0"/>
+          </a:p>
+        </p:txBody>
+      </p:sp>
+      <p:sp>
+        <p:nvSpPr>
+          <p:cNvPr id="3" name="Subtitle 2">
+            <a:extLst>
+              <a:ext uri="{FF2B5EF4-FFF2-40B4-BE49-F238E27FC236}">
+                <a16:creationId xmlns:a16="http://schemas.microsoft.com/office/drawing/2014/main" id="{BCBB03AB-38E0-9F93-30F5-5D823F09109F}"/>
+              </a:ext>
+            </a:extLst>
+          </p:cNvPr>
+          <p:cNvSpPr>
+            <a:spLocks noGrp="1"/>
+          </p:cNvSpPr>
+          <p:nvPr>
+            <p:ph type="subTitle" idx="1"/>
+          </p:nvPr>
+        </p:nvSpPr>
+        <p:spPr/>
+        <p:txBody>
+          <a:bodyPr/>
+          <a:lstStyle/>
+          <a:p>
+            <a:r>
+              <a:rPr lang="en-US" dirty="0"/>
+              <a:t>Run docker across a cluster</a:t>
+            </a:r>
+          </a:p>
+        </p:txBody>
+      </p:sp>
+    </p:spTree>
+    <p:extLst>
+      <p:ext uri="{BB962C8B-B14F-4D97-AF65-F5344CB8AC3E}">
+        <p14:creationId xmlns:p14="http://schemas.microsoft.com/office/powerpoint/2010/main" val="2848600197"/>
+      </p:ext>
+    </p:extLst>
+  </p:cSld>
+  <p:clrMapOvr>
+    <a:masterClrMapping/>
+  </p:clrMapOvr>
+</p:sld>
+</file>
+
+<file path=ppt/slides/slide23.xml><?xml version="1.0" encoding="utf-8"?>
+<p:sld xmlns:a="http://schemas.openxmlformats.org/drawingml/2006/main" xmlns:r="http://schemas.openxmlformats.org/officeDocument/2006/relationships" xmlns:p="http://schemas.openxmlformats.org/presentationml/2006/main">
+  <p:cSld>
+    <p:spTree>
+      <p:nvGrpSpPr>
+        <p:cNvPr id="1" name=""/>
+        <p:cNvGrpSpPr/>
+        <p:nvPr/>
+      </p:nvGrpSpPr>
+      <p:grpSpPr>
+        <a:xfrm>
+          <a:off x="0" y="0"/>
+          <a:ext cx="0" cy="0"/>
+          <a:chOff x="0" y="0"/>
+          <a:chExt cx="0" cy="0"/>
+        </a:xfrm>
+      </p:grpSpPr>
+      <p:sp>
+        <p:nvSpPr>
+          <p:cNvPr id="2" name="Title 1">
+            <a:extLst>
+              <a:ext uri="{FF2B5EF4-FFF2-40B4-BE49-F238E27FC236}">
+                <a16:creationId xmlns:a16="http://schemas.microsoft.com/office/drawing/2014/main" id="{44F47490-76C9-9FCB-876D-A6C07A5649EB}"/>
+              </a:ext>
+            </a:extLst>
+          </p:cNvPr>
+          <p:cNvSpPr>
+            <a:spLocks noGrp="1"/>
+          </p:cNvSpPr>
+          <p:nvPr>
+            <p:ph type="title"/>
+          </p:nvPr>
+        </p:nvSpPr>
+        <p:spPr/>
+        <p:txBody>
+          <a:bodyPr/>
+          <a:lstStyle/>
+          <a:p>
+            <a:r>
+              <a:rPr lang="en-US" dirty="0"/>
+              <a:t>Enable </a:t>
+            </a:r>
+            <a:r>
+              <a:rPr lang="en-US" dirty="0" err="1"/>
+              <a:t>kubernetes</a:t>
+            </a:r>
+            <a:endParaRPr lang="en-US" dirty="0"/>
+          </a:p>
+        </p:txBody>
+      </p:sp>
+      <p:pic>
+        <p:nvPicPr>
+          <p:cNvPr id="4" name="Picture 3">
+            <a:extLst>
+              <a:ext uri="{FF2B5EF4-FFF2-40B4-BE49-F238E27FC236}">
+                <a16:creationId xmlns:a16="http://schemas.microsoft.com/office/drawing/2014/main" id="{0C51F4D6-6136-4528-07C5-B53C76DB3E1F}"/>
+              </a:ext>
+            </a:extLst>
+          </p:cNvPr>
+          <p:cNvPicPr>
+            <a:picLocks noChangeAspect="1"/>
+          </p:cNvPicPr>
+          <p:nvPr/>
+        </p:nvPicPr>
+        <p:blipFill>
+          <a:blip r:embed="rId2"/>
+          <a:stretch>
+            <a:fillRect/>
+          </a:stretch>
+        </p:blipFill>
+        <p:spPr>
+          <a:xfrm>
+            <a:off x="2486442" y="1870390"/>
+            <a:ext cx="7208520" cy="4717255"/>
+          </a:xfrm>
+          <a:prstGeom prst="rect">
+            <a:avLst/>
+          </a:prstGeom>
+          <a:ln>
+            <a:noFill/>
+          </a:ln>
+          <a:effectLst>
+            <a:outerShdw blurRad="292100" dist="139700" dir="2700000" algn="tl" rotWithShape="0">
+              <a:srgbClr val="333333">
+                <a:alpha val="65000"/>
+              </a:srgbClr>
+            </a:outerShdw>
+          </a:effectLst>
+        </p:spPr>
+      </p:pic>
+    </p:spTree>
+    <p:extLst>
+      <p:ext uri="{BB962C8B-B14F-4D97-AF65-F5344CB8AC3E}">
+        <p14:creationId xmlns:p14="http://schemas.microsoft.com/office/powerpoint/2010/main" val="753723386"/>
       </p:ext>
     </p:extLst>
   </p:cSld>
@@ -8461,8 +12200,8 @@
         </p:nvSpPr>
         <p:spPr>
           <a:xfrm>
-            <a:off x="978745" y="5347593"/>
-            <a:ext cx="1297096" cy="646176"/>
+            <a:off x="873760" y="5347593"/>
+            <a:ext cx="1402081" cy="646176"/>
           </a:xfrm>
           <a:prstGeom prst="rect">
             <a:avLst/>
@@ -9199,8 +12938,8 @@
         </p:nvSpPr>
         <p:spPr>
           <a:xfrm>
-            <a:off x="9734593" y="3555772"/>
-            <a:ext cx="1297096" cy="646176"/>
+            <a:off x="9621520" y="3555772"/>
+            <a:ext cx="1410169" cy="646176"/>
           </a:xfrm>
           <a:prstGeom prst="rect">
             <a:avLst/>
@@ -10889,6 +14628,15 @@
 </file>
 
 <file path=customXml/item1.xml><?xml version="1.0" encoding="utf-8"?>
+<?mso-contentType ?>
+<FormTemplates xmlns="http://schemas.microsoft.com/sharepoint/v3/contenttype/forms">
+  <Display>DocumentLibraryForm</Display>
+  <Edit>DocumentLibraryForm</Edit>
+  <New>DocumentLibraryForm</New>
+</FormTemplates>
+</file>
+
+<file path=customXml/item2.xml><?xml version="1.0" encoding="utf-8"?>
 <ct:contentTypeSchema xmlns:ct="http://schemas.microsoft.com/office/2006/metadata/contentType" xmlns:ma="http://schemas.microsoft.com/office/2006/metadata/properties/metaAttributes" ct:_="" ma:_="" ma:contentTypeName="Document" ma:contentTypeID="0x01010079F111ED35F8CC479449609E8A0923A6" ma:contentTypeVersion="12" ma:contentTypeDescription="Create a new document." ma:contentTypeScope="" ma:versionID="a410dd7f93c95333ffa1b60ed6adedd1">
   <xsd:schema xmlns:xsd="http://www.w3.org/2001/XMLSchema" xmlns:xs="http://www.w3.org/2001/XMLSchema" xmlns:p="http://schemas.microsoft.com/office/2006/metadata/properties" xmlns:ns2="71af3243-3dd4-4a8d-8c0d-dd76da1f02a5" xmlns:ns3="16c05727-aa75-4e4a-9b5f-8a80a1165891" targetNamespace="http://schemas.microsoft.com/office/2006/metadata/properties" ma:root="true" ma:fieldsID="a936d9baba76aa3866493feff160faab" ns2:_="" ns3:_="">
     <xsd:import namespace="71af3243-3dd4-4a8d-8c0d-dd76da1f02a5"/>
@@ -11109,15 +14857,6 @@
 </ct:contentTypeSchema>
 </file>
 
-<file path=customXml/item2.xml><?xml version="1.0" encoding="utf-8"?>
-<?mso-contentType ?>
-<FormTemplates xmlns="http://schemas.microsoft.com/sharepoint/v3/contenttype/forms">
-  <Display>DocumentLibraryForm</Display>
-  <Edit>DocumentLibraryForm</Edit>
-  <New>DocumentLibraryForm</New>
-</FormTemplates>
-</file>
-
 <file path=customXml/item3.xml><?xml version="1.0" encoding="utf-8"?>
 <p:properties xmlns:p="http://schemas.microsoft.com/office/2006/metadata/properties" xmlns:xsi="http://www.w3.org/2001/XMLSchema-instance" xmlns:pc="http://schemas.microsoft.com/office/infopath/2007/PartnerControls">
   <documentManagement>
@@ -11128,6 +14867,14 @@
 </file>
 
 <file path=customXml/itemProps1.xml><?xml version="1.0" encoding="utf-8"?>
+<ds:datastoreItem xmlns:ds="http://schemas.openxmlformats.org/officeDocument/2006/customXml" ds:itemID="{927BD4C1-B6B1-4715-ABF9-E660A51A4EA0}">
+  <ds:schemaRefs>
+    <ds:schemaRef ds:uri="http://schemas.microsoft.com/sharepoint/v3/contenttype/forms"/>
+  </ds:schemaRefs>
+</ds:datastoreItem>
+</file>
+
+<file path=customXml/itemProps2.xml><?xml version="1.0" encoding="utf-8"?>
 <ds:datastoreItem xmlns:ds="http://schemas.openxmlformats.org/officeDocument/2006/customXml" ds:itemID="{41E7CA09-9778-4414-AE97-8064B12DA30E}">
   <ds:schemaRefs>
     <ds:schemaRef ds:uri="http://schemas.microsoft.com/office/2006/metadata/contentType"/>
@@ -11146,14 +14893,6 @@
 </ds:datastoreItem>
 </file>
 
-<file path=customXml/itemProps2.xml><?xml version="1.0" encoding="utf-8"?>
-<ds:datastoreItem xmlns:ds="http://schemas.openxmlformats.org/officeDocument/2006/customXml" ds:itemID="{927BD4C1-B6B1-4715-ABF9-E660A51A4EA0}">
-  <ds:schemaRefs>
-    <ds:schemaRef ds:uri="http://schemas.microsoft.com/sharepoint/v3/contenttype/forms"/>
-  </ds:schemaRefs>
-</ds:datastoreItem>
-</file>
-
 <file path=customXml/itemProps3.xml><?xml version="1.0" encoding="utf-8"?>
 <ds:datastoreItem xmlns:ds="http://schemas.openxmlformats.org/officeDocument/2006/customXml" ds:itemID="{8D289AE2-D2AE-49D1-AFAC-3A79F6794255}">
   <ds:schemaRefs>

</xml_diff>